<commit_message>
New server and client
</commit_message>
<xml_diff>
--- a/SDJ2 Assignment Group 4 - VIA Engineering/SDJ Assignment 1 Presentation.pptx
+++ b/SDJ2 Assignment Group 4 - VIA Engineering/SDJ Assignment 1 Presentation.pptx
@@ -24,7 +24,7 @@
     <p:sldId id="269" r:id="rId15"/>
     <p:sldId id="270" r:id="rId16"/>
     <p:sldId id="273" r:id="rId17"/>
-    <p:sldId id="275" r:id="rId18"/>
+    <p:sldId id="276" r:id="rId18"/>
     <p:sldId id="272" r:id="rId19"/>
     <p:sldId id="274" r:id="rId20"/>
   </p:sldIdLst>
@@ -9698,7 +9698,7 @@
           <a:p>
             <a:fld id="{97620C65-498F-4DEE-94AA-5E3B7423FAA0}" type="datetimeFigureOut">
               <a:rPr lang="aa-ET" smtClean="0"/>
-              <a:t>05/09/2018</a:t>
+              <a:t>05/16/2018</a:t>
             </a:fld>
             <a:endParaRPr lang="aa-ET"/>
           </a:p>
@@ -9857,7 +9857,7 @@
           <a:p>
             <a:fld id="{B6262096-A332-4542-8F23-8598EC47EEF0}" type="slidenum">
               <a:rPr lang="aa-ET" smtClean="0"/>
-              <a:t>‹#›</a:t>
+              <a:t>‹nr.›</a:t>
             </a:fld>
             <a:endParaRPr lang="aa-ET"/>
           </a:p>
@@ -10125,6 +10125,90 @@
     <p:extLst>
       <p:ext uri="{BB962C8B-B14F-4D97-AF65-F5344CB8AC3E}">
         <p14:creationId xmlns:p14="http://schemas.microsoft.com/office/powerpoint/2010/main" val="3035695367"/>
+      </p:ext>
+    </p:extLst>
+  </p:cSld>
+  <p:clrMapOvr>
+    <a:masterClrMapping/>
+  </p:clrMapOvr>
+</p:notes>
+</file>
+
+<file path=ppt/notesSlides/notesSlide3.xml><?xml version="1.0" encoding="utf-8"?>
+<p:notes xmlns:a="http://schemas.openxmlformats.org/drawingml/2006/main" xmlns:r="http://schemas.openxmlformats.org/officeDocument/2006/relationships" xmlns:p="http://schemas.openxmlformats.org/presentationml/2006/main">
+  <p:cSld>
+    <p:spTree>
+      <p:nvGrpSpPr>
+        <p:cNvPr id="1" name=""/>
+        <p:cNvGrpSpPr/>
+        <p:nvPr/>
+      </p:nvGrpSpPr>
+      <p:grpSpPr>
+        <a:xfrm>
+          <a:off x="0" y="0"/>
+          <a:ext cx="0" cy="0"/>
+          <a:chOff x="0" y="0"/>
+          <a:chExt cx="0" cy="0"/>
+        </a:xfrm>
+      </p:grpSpPr>
+      <p:sp>
+        <p:nvSpPr>
+          <p:cNvPr id="2" name="Pladsholder til slidebillede 1"/>
+          <p:cNvSpPr>
+            <a:spLocks noGrp="1" noRot="1" noChangeAspect="1"/>
+          </p:cNvSpPr>
+          <p:nvPr>
+            <p:ph type="sldImg"/>
+          </p:nvPr>
+        </p:nvSpPr>
+        <p:spPr/>
+      </p:sp>
+      <p:sp>
+        <p:nvSpPr>
+          <p:cNvPr id="3" name="Pladsholder til noter 2"/>
+          <p:cNvSpPr>
+            <a:spLocks noGrp="1"/>
+          </p:cNvSpPr>
+          <p:nvPr>
+            <p:ph type="body" idx="1"/>
+          </p:nvPr>
+        </p:nvSpPr>
+        <p:spPr/>
+        <p:txBody>
+          <a:bodyPr/>
+          <a:lstStyle/>
+          <a:p>
+            <a:endParaRPr lang="en-GB" dirty="0"/>
+          </a:p>
+        </p:txBody>
+      </p:sp>
+      <p:sp>
+        <p:nvSpPr>
+          <p:cNvPr id="4" name="Pladsholder til slidenummer 3"/>
+          <p:cNvSpPr>
+            <a:spLocks noGrp="1"/>
+          </p:cNvSpPr>
+          <p:nvPr>
+            <p:ph type="sldNum" sz="quarter" idx="10"/>
+          </p:nvPr>
+        </p:nvSpPr>
+        <p:spPr/>
+        <p:txBody>
+          <a:bodyPr/>
+          <a:lstStyle/>
+          <a:p>
+            <a:fld id="{B6262096-A332-4542-8F23-8598EC47EEF0}" type="slidenum">
+              <a:rPr lang="aa-ET" smtClean="0"/>
+              <a:t>18</a:t>
+            </a:fld>
+            <a:endParaRPr lang="aa-ET"/>
+          </a:p>
+        </p:txBody>
+      </p:sp>
+    </p:spTree>
+    <p:extLst>
+      <p:ext uri="{BB962C8B-B14F-4D97-AF65-F5344CB8AC3E}">
+        <p14:creationId xmlns:p14="http://schemas.microsoft.com/office/powerpoint/2010/main" val="3242782743"/>
       </p:ext>
     </p:extLst>
   </p:cSld>
@@ -10465,7 +10549,7 @@
           <a:p>
             <a:fld id="{1DAA98A6-9CDE-4C4B-96AD-64651D9891DB}" type="datetimeFigureOut">
               <a:rPr lang="aa-ET" smtClean="0"/>
-              <a:t>05/09/2018</a:t>
+              <a:t>05/16/2018</a:t>
             </a:fld>
             <a:endParaRPr lang="aa-ET"/>
           </a:p>
@@ -10517,7 +10601,7 @@
           <a:p>
             <a:fld id="{BB4E0C7B-466A-4CBA-8DAA-31FBE5C17616}" type="slidenum">
               <a:rPr lang="aa-ET" smtClean="0"/>
-              <a:t>‹#›</a:t>
+              <a:t>‹nr.›</a:t>
             </a:fld>
             <a:endParaRPr lang="aa-ET"/>
           </a:p>
@@ -10789,7 +10873,7 @@
           <a:p>
             <a:fld id="{1DAA98A6-9CDE-4C4B-96AD-64651D9891DB}" type="datetimeFigureOut">
               <a:rPr lang="aa-ET" smtClean="0"/>
-              <a:t>05/09/2018</a:t>
+              <a:t>05/16/2018</a:t>
             </a:fld>
             <a:endParaRPr lang="aa-ET"/>
           </a:p>
@@ -10831,7 +10915,7 @@
           <a:p>
             <a:fld id="{BB4E0C7B-466A-4CBA-8DAA-31FBE5C17616}" type="slidenum">
               <a:rPr lang="aa-ET" smtClean="0"/>
-              <a:t>‹#›</a:t>
+              <a:t>‹nr.›</a:t>
             </a:fld>
             <a:endParaRPr lang="aa-ET"/>
           </a:p>
@@ -11037,7 +11121,7 @@
           <a:p>
             <a:fld id="{1DAA98A6-9CDE-4C4B-96AD-64651D9891DB}" type="datetimeFigureOut">
               <a:rPr lang="aa-ET" smtClean="0"/>
-              <a:t>05/09/2018</a:t>
+              <a:t>05/16/2018</a:t>
             </a:fld>
             <a:endParaRPr lang="aa-ET"/>
           </a:p>
@@ -11079,7 +11163,7 @@
           <a:p>
             <a:fld id="{BB4E0C7B-466A-4CBA-8DAA-31FBE5C17616}" type="slidenum">
               <a:rPr lang="aa-ET" smtClean="0"/>
-              <a:t>‹#›</a:t>
+              <a:t>‹nr.›</a:t>
             </a:fld>
             <a:endParaRPr lang="aa-ET"/>
           </a:p>
@@ -11376,7 +11460,7 @@
           <a:p>
             <a:fld id="{1DAA98A6-9CDE-4C4B-96AD-64651D9891DB}" type="datetimeFigureOut">
               <a:rPr lang="aa-ET" smtClean="0"/>
-              <a:t>05/09/2018</a:t>
+              <a:t>05/16/2018</a:t>
             </a:fld>
             <a:endParaRPr lang="aa-ET"/>
           </a:p>
@@ -11418,7 +11502,7 @@
           <a:p>
             <a:fld id="{BB4E0C7B-466A-4CBA-8DAA-31FBE5C17616}" type="slidenum">
               <a:rPr lang="aa-ET" smtClean="0"/>
-              <a:t>‹#›</a:t>
+              <a:t>‹nr.›</a:t>
             </a:fld>
             <a:endParaRPr lang="aa-ET"/>
           </a:p>
@@ -11723,7 +11807,7 @@
           <a:p>
             <a:fld id="{1DAA98A6-9CDE-4C4B-96AD-64651D9891DB}" type="datetimeFigureOut">
               <a:rPr lang="aa-ET" smtClean="0"/>
-              <a:t>05/09/2018</a:t>
+              <a:t>05/16/2018</a:t>
             </a:fld>
             <a:endParaRPr lang="aa-ET"/>
           </a:p>
@@ -11765,7 +11849,7 @@
           <a:p>
             <a:fld id="{BB4E0C7B-466A-4CBA-8DAA-31FBE5C17616}" type="slidenum">
               <a:rPr lang="aa-ET" smtClean="0"/>
-              <a:t>‹#›</a:t>
+              <a:t>‹nr.›</a:t>
             </a:fld>
             <a:endParaRPr lang="aa-ET"/>
           </a:p>
@@ -12097,7 +12181,7 @@
           <a:p>
             <a:fld id="{1DAA98A6-9CDE-4C4B-96AD-64651D9891DB}" type="datetimeFigureOut">
               <a:rPr lang="aa-ET" smtClean="0"/>
-              <a:t>05/09/2018</a:t>
+              <a:t>05/16/2018</a:t>
             </a:fld>
             <a:endParaRPr lang="aa-ET"/>
           </a:p>
@@ -12139,7 +12223,7 @@
           <a:p>
             <a:fld id="{BB4E0C7B-466A-4CBA-8DAA-31FBE5C17616}" type="slidenum">
               <a:rPr lang="aa-ET" smtClean="0"/>
-              <a:t>‹#›</a:t>
+              <a:t>‹nr.›</a:t>
             </a:fld>
             <a:endParaRPr lang="aa-ET"/>
           </a:p>
@@ -12567,7 +12651,7 @@
           <a:p>
             <a:fld id="{1DAA98A6-9CDE-4C4B-96AD-64651D9891DB}" type="datetimeFigureOut">
               <a:rPr lang="aa-ET" smtClean="0"/>
-              <a:t>05/09/2018</a:t>
+              <a:t>05/16/2018</a:t>
             </a:fld>
             <a:endParaRPr lang="aa-ET"/>
           </a:p>
@@ -12609,7 +12693,7 @@
           <a:p>
             <a:fld id="{BB4E0C7B-466A-4CBA-8DAA-31FBE5C17616}" type="slidenum">
               <a:rPr lang="aa-ET" smtClean="0"/>
-              <a:t>‹#›</a:t>
+              <a:t>‹nr.›</a:t>
             </a:fld>
             <a:endParaRPr lang="aa-ET"/>
           </a:p>
@@ -12772,7 +12856,7 @@
           <a:p>
             <a:fld id="{1DAA98A6-9CDE-4C4B-96AD-64651D9891DB}" type="datetimeFigureOut">
               <a:rPr lang="aa-ET" smtClean="0"/>
-              <a:t>05/09/2018</a:t>
+              <a:t>05/16/2018</a:t>
             </a:fld>
             <a:endParaRPr lang="aa-ET"/>
           </a:p>
@@ -12814,7 +12898,7 @@
           <a:p>
             <a:fld id="{BB4E0C7B-466A-4CBA-8DAA-31FBE5C17616}" type="slidenum">
               <a:rPr lang="aa-ET" smtClean="0"/>
-              <a:t>‹#›</a:t>
+              <a:t>‹nr.›</a:t>
             </a:fld>
             <a:endParaRPr lang="aa-ET"/>
           </a:p>
@@ -12983,7 +13067,7 @@
           <a:p>
             <a:fld id="{1DAA98A6-9CDE-4C4B-96AD-64651D9891DB}" type="datetimeFigureOut">
               <a:rPr lang="aa-ET" smtClean="0"/>
-              <a:t>05/09/2018</a:t>
+              <a:t>05/16/2018</a:t>
             </a:fld>
             <a:endParaRPr lang="aa-ET"/>
           </a:p>
@@ -13025,7 +13109,7 @@
           <a:p>
             <a:fld id="{BB4E0C7B-466A-4CBA-8DAA-31FBE5C17616}" type="slidenum">
               <a:rPr lang="aa-ET" smtClean="0"/>
-              <a:t>‹#›</a:t>
+              <a:t>‹nr.›</a:t>
             </a:fld>
             <a:endParaRPr lang="aa-ET"/>
           </a:p>
@@ -13215,7 +13299,7 @@
           <a:p>
             <a:fld id="{1DAA98A6-9CDE-4C4B-96AD-64651D9891DB}" type="datetimeFigureOut">
               <a:rPr lang="aa-ET" smtClean="0"/>
-              <a:t>05/09/2018</a:t>
+              <a:t>05/16/2018</a:t>
             </a:fld>
             <a:endParaRPr lang="aa-ET"/>
           </a:p>
@@ -13257,7 +13341,7 @@
           <a:p>
             <a:fld id="{BB4E0C7B-466A-4CBA-8DAA-31FBE5C17616}" type="slidenum">
               <a:rPr lang="aa-ET" smtClean="0"/>
-              <a:t>‹#›</a:t>
+              <a:t>‹nr.›</a:t>
             </a:fld>
             <a:endParaRPr lang="aa-ET"/>
           </a:p>
@@ -13463,7 +13547,7 @@
           <a:p>
             <a:fld id="{1DAA98A6-9CDE-4C4B-96AD-64651D9891DB}" type="datetimeFigureOut">
               <a:rPr lang="aa-ET" smtClean="0"/>
-              <a:t>05/09/2018</a:t>
+              <a:t>05/16/2018</a:t>
             </a:fld>
             <a:endParaRPr lang="aa-ET"/>
           </a:p>
@@ -13505,7 +13589,7 @@
           <a:p>
             <a:fld id="{BB4E0C7B-466A-4CBA-8DAA-31FBE5C17616}" type="slidenum">
               <a:rPr lang="aa-ET" smtClean="0"/>
-              <a:t>‹#›</a:t>
+              <a:t>‹nr.›</a:t>
             </a:fld>
             <a:endParaRPr lang="aa-ET"/>
           </a:p>
@@ -13761,7 +13845,7 @@
           <a:p>
             <a:fld id="{1DAA98A6-9CDE-4C4B-96AD-64651D9891DB}" type="datetimeFigureOut">
               <a:rPr lang="aa-ET" smtClean="0"/>
-              <a:t>05/09/2018</a:t>
+              <a:t>05/16/2018</a:t>
             </a:fld>
             <a:endParaRPr lang="aa-ET"/>
           </a:p>
@@ -13803,7 +13887,7 @@
           <a:p>
             <a:fld id="{BB4E0C7B-466A-4CBA-8DAA-31FBE5C17616}" type="slidenum">
               <a:rPr lang="aa-ET" smtClean="0"/>
-              <a:t>‹#›</a:t>
+              <a:t>‹nr.›</a:t>
             </a:fld>
             <a:endParaRPr lang="aa-ET"/>
           </a:p>
@@ -14155,7 +14239,7 @@
           <a:p>
             <a:fld id="{1DAA98A6-9CDE-4C4B-96AD-64651D9891DB}" type="datetimeFigureOut">
               <a:rPr lang="aa-ET" smtClean="0"/>
-              <a:t>05/09/2018</a:t>
+              <a:t>05/16/2018</a:t>
             </a:fld>
             <a:endParaRPr lang="aa-ET"/>
           </a:p>
@@ -14197,7 +14281,7 @@
           <a:p>
             <a:fld id="{BB4E0C7B-466A-4CBA-8DAA-31FBE5C17616}" type="slidenum">
               <a:rPr lang="aa-ET" smtClean="0"/>
-              <a:t>‹#›</a:t>
+              <a:t>‹nr.›</a:t>
             </a:fld>
             <a:endParaRPr lang="aa-ET"/>
           </a:p>
@@ -14304,7 +14388,7 @@
           <a:p>
             <a:fld id="{1DAA98A6-9CDE-4C4B-96AD-64651D9891DB}" type="datetimeFigureOut">
               <a:rPr lang="aa-ET" smtClean="0"/>
-              <a:t>05/09/2018</a:t>
+              <a:t>05/16/2018</a:t>
             </a:fld>
             <a:endParaRPr lang="aa-ET"/>
           </a:p>
@@ -14346,7 +14430,7 @@
           <a:p>
             <a:fld id="{BB4E0C7B-466A-4CBA-8DAA-31FBE5C17616}" type="slidenum">
               <a:rPr lang="aa-ET" smtClean="0"/>
-              <a:t>‹#›</a:t>
+              <a:t>‹nr.›</a:t>
             </a:fld>
             <a:endParaRPr lang="aa-ET"/>
           </a:p>
@@ -14430,7 +14514,7 @@
           <a:p>
             <a:fld id="{1DAA98A6-9CDE-4C4B-96AD-64651D9891DB}" type="datetimeFigureOut">
               <a:rPr lang="aa-ET" smtClean="0"/>
-              <a:t>05/09/2018</a:t>
+              <a:t>05/16/2018</a:t>
             </a:fld>
             <a:endParaRPr lang="aa-ET"/>
           </a:p>
@@ -14472,7 +14556,7 @@
           <a:p>
             <a:fld id="{BB4E0C7B-466A-4CBA-8DAA-31FBE5C17616}" type="slidenum">
               <a:rPr lang="aa-ET" smtClean="0"/>
-              <a:t>‹#›</a:t>
+              <a:t>‹nr.›</a:t>
             </a:fld>
             <a:endParaRPr lang="aa-ET"/>
           </a:p>
@@ -14685,7 +14769,7 @@
           <a:p>
             <a:fld id="{1DAA98A6-9CDE-4C4B-96AD-64651D9891DB}" type="datetimeFigureOut">
               <a:rPr lang="aa-ET" smtClean="0"/>
-              <a:t>05/09/2018</a:t>
+              <a:t>05/16/2018</a:t>
             </a:fld>
             <a:endParaRPr lang="aa-ET"/>
           </a:p>
@@ -14727,7 +14811,7 @@
           <a:p>
             <a:fld id="{BB4E0C7B-466A-4CBA-8DAA-31FBE5C17616}" type="slidenum">
               <a:rPr lang="aa-ET" smtClean="0"/>
-              <a:t>‹#›</a:t>
+              <a:t>‹nr.›</a:t>
             </a:fld>
             <a:endParaRPr lang="aa-ET"/>
           </a:p>
@@ -15000,7 +15084,7 @@
           <a:p>
             <a:fld id="{1DAA98A6-9CDE-4C4B-96AD-64651D9891DB}" type="datetimeFigureOut">
               <a:rPr lang="aa-ET" smtClean="0"/>
-              <a:t>05/09/2018</a:t>
+              <a:t>05/16/2018</a:t>
             </a:fld>
             <a:endParaRPr lang="aa-ET"/>
           </a:p>
@@ -15042,7 +15126,7 @@
           <a:p>
             <a:fld id="{BB4E0C7B-466A-4CBA-8DAA-31FBE5C17616}" type="slidenum">
               <a:rPr lang="aa-ET" smtClean="0"/>
-              <a:t>‹#›</a:t>
+              <a:t>‹nr.›</a:t>
             </a:fld>
             <a:endParaRPr lang="aa-ET"/>
           </a:p>
@@ -15351,7 +15435,7 @@
           <a:p>
             <a:fld id="{1DAA98A6-9CDE-4C4B-96AD-64651D9891DB}" type="datetimeFigureOut">
               <a:rPr lang="aa-ET" smtClean="0"/>
-              <a:t>05/09/2018</a:t>
+              <a:t>05/16/2018</a:t>
             </a:fld>
             <a:endParaRPr lang="aa-ET"/>
           </a:p>
@@ -15429,7 +15513,7 @@
           <a:p>
             <a:fld id="{BB4E0C7B-466A-4CBA-8DAA-31FBE5C17616}" type="slidenum">
               <a:rPr lang="aa-ET" smtClean="0"/>
-              <a:t>‹#›</a:t>
+              <a:t>‹nr.›</a:t>
             </a:fld>
             <a:endParaRPr lang="aa-ET"/>
           </a:p>
@@ -17178,42 +17262,6 @@
           </a:p>
         </p:txBody>
       </p:sp>
-      <p:pic>
-        <p:nvPicPr>
-          <p:cNvPr id="5" name="Picture 4">
-            <a:extLst>
-              <a:ext uri="{FF2B5EF4-FFF2-40B4-BE49-F238E27FC236}">
-                <a16:creationId xmlns:a16="http://schemas.microsoft.com/office/drawing/2014/main" id="{692FC4EF-4715-4893-A80D-153A38D508EF}"/>
-              </a:ext>
-            </a:extLst>
-          </p:cNvPr>
-          <p:cNvPicPr>
-            <a:picLocks noChangeAspect="1"/>
-          </p:cNvPicPr>
-          <p:nvPr/>
-        </p:nvPicPr>
-        <p:blipFill>
-          <a:blip r:embed="rId7" cstate="print">
-            <a:extLst>
-              <a:ext uri="{28A0092B-C50C-407E-A947-70E740481C1C}">
-                <a14:useLocalDpi xmlns:a14="http://schemas.microsoft.com/office/drawing/2010/main" val="0"/>
-              </a:ext>
-            </a:extLst>
-          </a:blip>
-          <a:stretch>
-            <a:fillRect/>
-          </a:stretch>
-        </p:blipFill>
-        <p:spPr>
-          <a:xfrm>
-            <a:off x="1412683" y="1806816"/>
-            <a:ext cx="5784083" cy="3065563"/>
-          </a:xfrm>
-          <a:prstGeom prst="rect">
-            <a:avLst/>
-          </a:prstGeom>
-        </p:spPr>
-      </p:pic>
       <p:cxnSp>
         <p:nvCxnSpPr>
           <p:cNvPr id="36" name="Straight Connector 27">
@@ -17297,6 +17345,42 @@
           </a:p>
         </p:txBody>
       </p:sp>
+      <p:pic>
+        <p:nvPicPr>
+          <p:cNvPr id="19" name="Billede 18">
+            <a:extLst>
+              <a:ext uri="{FF2B5EF4-FFF2-40B4-BE49-F238E27FC236}">
+                <a16:creationId xmlns:a16="http://schemas.microsoft.com/office/drawing/2014/main" id="{296B4C75-90B8-421C-9EAB-1EB268D9D10C}"/>
+              </a:ext>
+            </a:extLst>
+          </p:cNvPr>
+          <p:cNvPicPr>
+            <a:picLocks noChangeAspect="1"/>
+          </p:cNvPicPr>
+          <p:nvPr/>
+        </p:nvPicPr>
+        <p:blipFill>
+          <a:blip r:embed="rId7">
+            <a:extLst>
+              <a:ext uri="{28A0092B-C50C-407E-A947-70E740481C1C}">
+                <a14:useLocalDpi xmlns:a14="http://schemas.microsoft.com/office/drawing/2010/main" val="0"/>
+              </a:ext>
+            </a:extLst>
+          </a:blip>
+          <a:stretch>
+            <a:fillRect/>
+          </a:stretch>
+        </p:blipFill>
+        <p:spPr>
+          <a:xfrm>
+            <a:off x="1153756" y="1250696"/>
+            <a:ext cx="6237661" cy="4256286"/>
+          </a:xfrm>
+          <a:prstGeom prst="rect">
+            <a:avLst/>
+          </a:prstGeom>
+        </p:spPr>
+      </p:pic>
     </p:spTree>
     <p:extLst>
       <p:ext uri="{BB962C8B-B14F-4D97-AF65-F5344CB8AC3E}">
@@ -17343,10 +17427,13 @@
       </p:grpSpPr>
       <p:grpSp>
         <p:nvGrpSpPr>
-          <p:cNvPr id="29" name="Group 8">
+          <p:cNvPr id="62" name="Group 61">
             <a:extLst>
               <a:ext uri="{FF2B5EF4-FFF2-40B4-BE49-F238E27FC236}">
                 <a16:creationId xmlns:a16="http://schemas.microsoft.com/office/drawing/2014/main" id="{749C117F-F390-437B-ADB0-57E87EFF34F5}"/>
+              </a:ext>
+              <a:ext uri="{C183D7F6-B498-43B3-948B-1728B52AA6E4}">
+                <adec:decorative xmlns:adec="http://schemas.microsoft.com/office/drawing/2017/decorative" val="1"/>
               </a:ext>
             </a:extLst>
           </p:cNvPr>
@@ -17371,10 +17458,13 @@
         </p:grpSpPr>
         <p:pic>
           <p:nvPicPr>
-            <p:cNvPr id="10" name="Picture 9">
+            <p:cNvPr id="63" name="Picture 62">
               <a:extLst>
                 <a:ext uri="{FF2B5EF4-FFF2-40B4-BE49-F238E27FC236}">
                   <a16:creationId xmlns:a16="http://schemas.microsoft.com/office/drawing/2014/main" id="{A7EF42F8-2417-49A6-95CE-DE9503B0AA66}"/>
+                </a:ext>
+                <a:ext uri="{C183D7F6-B498-43B3-948B-1728B52AA6E4}">
+                  <adec:decorative xmlns:adec="http://schemas.microsoft.com/office/drawing/2017/decorative" val="1"/>
                 </a:ext>
               </a:extLst>
             </p:cNvPr>
@@ -17413,10 +17503,13 @@
         </p:pic>
         <p:sp>
           <p:nvSpPr>
-            <p:cNvPr id="11" name="Rectangle 10">
+            <p:cNvPr id="64" name="Rectangle 63">
               <a:extLst>
                 <a:ext uri="{FF2B5EF4-FFF2-40B4-BE49-F238E27FC236}">
                   <a16:creationId xmlns:a16="http://schemas.microsoft.com/office/drawing/2014/main" id="{AC6F623B-2003-4AED-B02F-541A150EC143}"/>
+                </a:ext>
+                <a:ext uri="{C183D7F6-B498-43B3-948B-1728B52AA6E4}">
+                  <adec:decorative xmlns:adec="http://schemas.microsoft.com/office/drawing/2017/decorative" val="1"/>
                 </a:ext>
               </a:extLst>
             </p:cNvPr>
@@ -17459,10 +17552,13 @@
         </p:sp>
         <p:pic>
           <p:nvPicPr>
-            <p:cNvPr id="12" name="Picture 11">
+            <p:cNvPr id="65" name="Picture 64">
               <a:extLst>
                 <a:ext uri="{FF2B5EF4-FFF2-40B4-BE49-F238E27FC236}">
                   <a16:creationId xmlns:a16="http://schemas.microsoft.com/office/drawing/2014/main" id="{CD11837A-4F3D-419F-ACE2-E80B1EA2846F}"/>
+                </a:ext>
+                <a:ext uri="{C183D7F6-B498-43B3-948B-1728B52AA6E4}">
+                  <adec:decorative xmlns:adec="http://schemas.microsoft.com/office/drawing/2017/decorative" val="1"/>
                 </a:ext>
               </a:extLst>
             </p:cNvPr>
@@ -17500,10 +17596,13 @@
         </p:pic>
         <p:pic>
           <p:nvPicPr>
-            <p:cNvPr id="13" name="Picture 12">
+            <p:cNvPr id="66" name="Picture 65">
               <a:extLst>
                 <a:ext uri="{FF2B5EF4-FFF2-40B4-BE49-F238E27FC236}">
                   <a16:creationId xmlns:a16="http://schemas.microsoft.com/office/drawing/2014/main" id="{B9411D1A-7E2C-4A36-BE32-BF7A8E130723}"/>
+                </a:ext>
+                <a:ext uri="{C183D7F6-B498-43B3-948B-1728B52AA6E4}">
+                  <adec:decorative xmlns:adec="http://schemas.microsoft.com/office/drawing/2017/decorative" val="1"/>
                 </a:ext>
               </a:extLst>
             </p:cNvPr>
@@ -17542,10 +17641,13 @@
       </p:grpSp>
       <p:cxnSp>
         <p:nvCxnSpPr>
-          <p:cNvPr id="30" name="Straight Connector 14">
+          <p:cNvPr id="68" name="Straight Connector 67">
             <a:extLst>
               <a:ext uri="{FF2B5EF4-FFF2-40B4-BE49-F238E27FC236}">
                 <a16:creationId xmlns:a16="http://schemas.microsoft.com/office/drawing/2014/main" id="{20742BC3-654B-4E41-9A6A-73A42E477639}"/>
+              </a:ext>
+              <a:ext uri="{C183D7F6-B498-43B3-948B-1728B52AA6E4}">
+                <adec:decorative xmlns:adec="http://schemas.microsoft.com/office/drawing/2017/decorative" val="1"/>
               </a:ext>
             </a:extLst>
           </p:cNvPr>
@@ -17586,10 +17688,13 @@
       </p:cxnSp>
       <p:sp useBgFill="1">
         <p:nvSpPr>
-          <p:cNvPr id="31" name="Rectangle 16">
+          <p:cNvPr id="70" name="Rectangle 69">
             <a:extLst>
               <a:ext uri="{FF2B5EF4-FFF2-40B4-BE49-F238E27FC236}">
-                <a16:creationId xmlns:a16="http://schemas.microsoft.com/office/drawing/2014/main" id="{28FA177F-145C-478A-A7ED-8D021CE76B3B}"/>
+                <a16:creationId xmlns:a16="http://schemas.microsoft.com/office/drawing/2014/main" id="{575E71FA-50BD-43F8-8C98-04339283A93D}"/>
+              </a:ext>
+              <a:ext uri="{C183D7F6-B498-43B3-948B-1728B52AA6E4}">
+                <adec:decorative xmlns:adec="http://schemas.microsoft.com/office/drawing/2017/decorative" val="1"/>
               </a:ext>
             </a:extLst>
           </p:cNvPr>
@@ -17643,10 +17748,13 @@
       </p:sp>
       <p:grpSp>
         <p:nvGrpSpPr>
-          <p:cNvPr id="32" name="Group 18">
+          <p:cNvPr id="72" name="Group 71">
             <a:extLst>
               <a:ext uri="{FF2B5EF4-FFF2-40B4-BE49-F238E27FC236}">
-                <a16:creationId xmlns:a16="http://schemas.microsoft.com/office/drawing/2014/main" id="{1A96A522-1258-462E-AFC5-F5E3F14110E3}"/>
+                <a16:creationId xmlns:a16="http://schemas.microsoft.com/office/drawing/2014/main" id="{CF1AA7F6-A589-4BC8-BC72-2CA6DC908398}"/>
+              </a:ext>
+              <a:ext uri="{C183D7F6-B498-43B3-948B-1728B52AA6E4}">
+                <adec:decorative xmlns:adec="http://schemas.microsoft.com/office/drawing/2017/decorative" val="1"/>
               </a:ext>
             </a:extLst>
           </p:cNvPr>
@@ -17671,10 +17779,13 @@
         </p:grpSpPr>
         <p:pic>
           <p:nvPicPr>
-            <p:cNvPr id="20" name="Picture 19">
+            <p:cNvPr id="73" name="Picture 72">
               <a:extLst>
                 <a:ext uri="{FF2B5EF4-FFF2-40B4-BE49-F238E27FC236}">
-                  <a16:creationId xmlns:a16="http://schemas.microsoft.com/office/drawing/2014/main" id="{ECD43597-59D1-4246-A90D-26FE2B6081B0}"/>
+                  <a16:creationId xmlns:a16="http://schemas.microsoft.com/office/drawing/2014/main" id="{53F5243F-7E41-439E-8991-C4F246D88F68}"/>
+                </a:ext>
+                <a:ext uri="{C183D7F6-B498-43B3-948B-1728B52AA6E4}">
+                  <adec:decorative xmlns:adec="http://schemas.microsoft.com/office/drawing/2017/decorative" val="1"/>
                 </a:ext>
               </a:extLst>
             </p:cNvPr>
@@ -17713,10 +17824,13 @@
         </p:pic>
         <p:sp>
           <p:nvSpPr>
-            <p:cNvPr id="21" name="Rectangle 20">
+            <p:cNvPr id="74" name="Rectangle 73">
               <a:extLst>
                 <a:ext uri="{FF2B5EF4-FFF2-40B4-BE49-F238E27FC236}">
-                  <a16:creationId xmlns:a16="http://schemas.microsoft.com/office/drawing/2014/main" id="{2ED48CD8-BE7A-4992-8570-58DEE9826AAB}"/>
+                  <a16:creationId xmlns:a16="http://schemas.microsoft.com/office/drawing/2014/main" id="{401A6B5F-1CF1-43AD-9E85-94E187210CFC}"/>
+                </a:ext>
+                <a:ext uri="{C183D7F6-B498-43B3-948B-1728B52AA6E4}">
+                  <adec:decorative xmlns:adec="http://schemas.microsoft.com/office/drawing/2017/decorative" val="1"/>
                 </a:ext>
               </a:extLst>
             </p:cNvPr>
@@ -17759,10 +17873,13 @@
         </p:sp>
         <p:pic>
           <p:nvPicPr>
-            <p:cNvPr id="22" name="Picture 21">
+            <p:cNvPr id="75" name="Picture 74">
               <a:extLst>
                 <a:ext uri="{FF2B5EF4-FFF2-40B4-BE49-F238E27FC236}">
-                  <a16:creationId xmlns:a16="http://schemas.microsoft.com/office/drawing/2014/main" id="{9A68BD7C-72FC-4E92-88BB-3401D485D2B7}"/>
+                  <a16:creationId xmlns:a16="http://schemas.microsoft.com/office/drawing/2014/main" id="{2F682A59-7E20-407C-A7F8-582295AC687C}"/>
+                </a:ext>
+                <a:ext uri="{C183D7F6-B498-43B3-948B-1728B52AA6E4}">
+                  <adec:decorative xmlns:adec="http://schemas.microsoft.com/office/drawing/2017/decorative" val="1"/>
                 </a:ext>
               </a:extLst>
             </p:cNvPr>
@@ -17800,10 +17917,13 @@
         </p:pic>
         <p:pic>
           <p:nvPicPr>
-            <p:cNvPr id="23" name="Picture 22">
+            <p:cNvPr id="76" name="Picture 75">
               <a:extLst>
                 <a:ext uri="{FF2B5EF4-FFF2-40B4-BE49-F238E27FC236}">
-                  <a16:creationId xmlns:a16="http://schemas.microsoft.com/office/drawing/2014/main" id="{C8B73423-E00D-4FC9-9873-0C259A14BC19}"/>
+                  <a16:creationId xmlns:a16="http://schemas.microsoft.com/office/drawing/2014/main" id="{5E4AC24E-0670-406E-822F-AAA6DA2010D3}"/>
+                </a:ext>
+                <a:ext uri="{C183D7F6-B498-43B3-948B-1728B52AA6E4}">
+                  <adec:decorative xmlns:adec="http://schemas.microsoft.com/office/drawing/2017/decorative" val="1"/>
                 </a:ext>
               </a:extLst>
             </p:cNvPr>
@@ -17842,1462 +17962,13 @@
       </p:grpSp>
       <p:sp>
         <p:nvSpPr>
-          <p:cNvPr id="33" name="Rectangle 24">
-            <a:extLst>
-              <a:ext uri="{FF2B5EF4-FFF2-40B4-BE49-F238E27FC236}">
-                <a16:creationId xmlns:a16="http://schemas.microsoft.com/office/drawing/2014/main" id="{22EEABFB-D1AB-4BFF-84FC-449548E93E09}"/>
-              </a:ext>
-            </a:extLst>
-          </p:cNvPr>
-          <p:cNvSpPr>
-            <a:spLocks noGrp="1" noRot="1" noChangeAspect="1" noMove="1" noResize="1" noEditPoints="1" noAdjustHandles="1" noChangeArrowheads="1" noChangeShapeType="1" noTextEdit="1"/>
-          </p:cNvSpPr>
-          <p:nvPr>
-            <p:extLst>
-              <p:ext uri="{386F3935-93C4-4BCD-93E2-E3B085C9AB24}">
-                <p16:designElem xmlns:p16="http://schemas.microsoft.com/office/powerpoint/2015/main" val="1"/>
-              </p:ext>
-            </p:extLst>
-          </p:nvPr>
-        </p:nvSpPr>
-        <p:spPr>
-          <a:xfrm>
-            <a:off x="1092644" y="1092200"/>
-            <a:ext cx="4976494" cy="4515104"/>
-          </a:xfrm>
-          <a:prstGeom prst="rect">
-            <a:avLst/>
-          </a:prstGeom>
-          <a:solidFill>
-            <a:schemeClr val="bg1"/>
-          </a:solidFill>
-          <a:ln w="57150" cmpd="thickThin">
-            <a:solidFill>
-              <a:schemeClr val="tx1">
-                <a:lumMod val="50000"/>
-                <a:lumOff val="50000"/>
-              </a:schemeClr>
-            </a:solidFill>
-            <a:miter lim="800000"/>
-          </a:ln>
-        </p:spPr>
-        <p:style>
-          <a:lnRef idx="2">
-            <a:schemeClr val="accent1">
-              <a:shade val="50000"/>
-            </a:schemeClr>
-          </a:lnRef>
-          <a:fillRef idx="1">
-            <a:schemeClr val="accent1"/>
-          </a:fillRef>
-          <a:effectRef idx="0">
-            <a:schemeClr val="accent1"/>
-          </a:effectRef>
-          <a:fontRef idx="minor">
-            <a:schemeClr val="lt1"/>
-          </a:fontRef>
-        </p:style>
-        <p:txBody>
-          <a:bodyPr rtlCol="0" anchor="ctr"/>
-          <a:lstStyle/>
-          <a:p>
-            <a:pPr algn="ctr"/>
-            <a:endParaRPr lang="en-US"/>
-          </a:p>
-        </p:txBody>
-      </p:sp>
-      <p:pic>
-        <p:nvPicPr>
-          <p:cNvPr id="4" name="Picture 3">
-            <a:extLst>
-              <a:ext uri="{FF2B5EF4-FFF2-40B4-BE49-F238E27FC236}">
-                <a16:creationId xmlns:a16="http://schemas.microsoft.com/office/drawing/2014/main" id="{29688EDD-86B9-4893-BEEC-D48A2715C0EF}"/>
-              </a:ext>
-            </a:extLst>
-          </p:cNvPr>
-          <p:cNvPicPr/>
-          <p:nvPr/>
-        </p:nvPicPr>
-        <p:blipFill>
-          <a:blip r:embed="rId7">
-            <a:extLst>
-              <a:ext uri="{28A0092B-C50C-407E-A947-70E740481C1C}">
-                <a14:useLocalDpi xmlns:a14="http://schemas.microsoft.com/office/drawing/2010/main" val="0"/>
-              </a:ext>
-            </a:extLst>
-          </a:blip>
-          <a:stretch>
-            <a:fillRect/>
-          </a:stretch>
-        </p:blipFill>
-        <p:spPr>
-          <a:xfrm>
-            <a:off x="1412683" y="2731934"/>
-            <a:ext cx="4348925" cy="1215327"/>
-          </a:xfrm>
-          <a:prstGeom prst="rect">
-            <a:avLst/>
-          </a:prstGeom>
-        </p:spPr>
-      </p:pic>
-      <p:cxnSp>
-        <p:nvCxnSpPr>
-          <p:cNvPr id="34" name="Straight Connector 26">
-            <a:extLst>
-              <a:ext uri="{FF2B5EF4-FFF2-40B4-BE49-F238E27FC236}">
-                <a16:creationId xmlns:a16="http://schemas.microsoft.com/office/drawing/2014/main" id="{4231BC86-8965-4F95-9FD9-76313A7D601B}"/>
-              </a:ext>
-            </a:extLst>
-          </p:cNvPr>
-          <p:cNvCxnSpPr>
-            <a:cxnSpLocks noGrp="1" noRot="1" noChangeAspect="1" noMove="1" noResize="1" noEditPoints="1" noAdjustHandles="1" noChangeArrowheads="1" noChangeShapeType="1"/>
-          </p:cNvCxnSpPr>
-          <p:nvPr>
-            <p:extLst>
-              <p:ext uri="{386F3935-93C4-4BCD-93E2-E3B085C9AB24}">
-                <p16:designElem xmlns:p16="http://schemas.microsoft.com/office/powerpoint/2015/main" val="1"/>
-              </p:ext>
-            </p:extLst>
-          </p:nvPr>
-        </p:nvCxnSpPr>
-        <p:spPr>
-          <a:xfrm>
-            <a:off x="6553770" y="3522131"/>
-            <a:ext cx="4520638" cy="0"/>
-          </a:xfrm>
-          <a:prstGeom prst="line">
-            <a:avLst/>
-          </a:prstGeom>
-        </p:spPr>
-        <p:style>
-          <a:lnRef idx="2">
-            <a:schemeClr val="accent1"/>
-          </a:lnRef>
-          <a:fillRef idx="0">
-            <a:schemeClr val="accent1"/>
-          </a:fillRef>
-          <a:effectRef idx="1">
-            <a:schemeClr val="accent1"/>
-          </a:effectRef>
-          <a:fontRef idx="minor">
-            <a:schemeClr val="tx1"/>
-          </a:fontRef>
-        </p:style>
-      </p:cxnSp>
-      <p:sp>
-        <p:nvSpPr>
-          <p:cNvPr id="2" name="Title 1">
-            <a:extLst>
-              <a:ext uri="{FF2B5EF4-FFF2-40B4-BE49-F238E27FC236}">
-                <a16:creationId xmlns:a16="http://schemas.microsoft.com/office/drawing/2014/main" id="{562308BA-7D7D-40A4-BB40-4B95E4FD1A21}"/>
-              </a:ext>
-            </a:extLst>
-          </p:cNvPr>
-          <p:cNvSpPr>
-            <a:spLocks noGrp="1"/>
-          </p:cNvSpPr>
-          <p:nvPr>
-            <p:ph type="title"/>
-          </p:nvPr>
-        </p:nvSpPr>
-        <p:spPr>
-          <a:xfrm>
-            <a:off x="6553770" y="1041401"/>
-            <a:ext cx="4538526" cy="2345264"/>
-          </a:xfrm>
-        </p:spPr>
-        <p:txBody>
-          <a:bodyPr vert="horz" lIns="91440" tIns="45720" rIns="91440" bIns="45720" rtlCol="0" anchor="b">
-            <a:normAutofit/>
-          </a:bodyPr>
-          <a:lstStyle/>
-          <a:p>
-            <a:r>
-              <a:rPr lang="en-US" sz="5400" b="1">
-                <a:solidFill>
-                  <a:srgbClr val="262626"/>
-                </a:solidFill>
-              </a:rPr>
-              <a:t>Singleton</a:t>
-            </a:r>
-          </a:p>
-        </p:txBody>
-      </p:sp>
-    </p:spTree>
-    <p:extLst>
-      <p:ext uri="{BB962C8B-B14F-4D97-AF65-F5344CB8AC3E}">
-        <p14:creationId xmlns:p14="http://schemas.microsoft.com/office/powerpoint/2010/main" val="3841609833"/>
-      </p:ext>
-    </p:extLst>
-  </p:cSld>
-  <p:clrMapOvr>
-    <a:masterClrMapping/>
-  </p:clrMapOvr>
-  <p:transition spd="med">
-    <p:pull/>
-  </p:transition>
-</p:sld>
-</file>
-
-<file path=ppt/slides/slide13.xml><?xml version="1.0" encoding="utf-8"?>
-<p:sld xmlns:a="http://schemas.openxmlformats.org/drawingml/2006/main" xmlns:r="http://schemas.openxmlformats.org/officeDocument/2006/relationships" xmlns:p="http://schemas.openxmlformats.org/presentationml/2006/main">
-  <p:cSld>
-    <p:bg>
-      <p:bgPr>
-        <a:blipFill>
-          <a:blip r:embed="rId2">
-            <a:extLst/>
-          </a:blip>
-          <a:stretch/>
-        </a:blipFill>
-        <a:effectLst/>
-      </p:bgPr>
-    </p:bg>
-    <p:spTree>
-      <p:nvGrpSpPr>
-        <p:cNvPr id="1" name=""/>
-        <p:cNvGrpSpPr/>
-        <p:nvPr/>
-      </p:nvGrpSpPr>
-      <p:grpSpPr>
-        <a:xfrm>
-          <a:off x="0" y="0"/>
-          <a:ext cx="0" cy="0"/>
-          <a:chOff x="0" y="0"/>
-          <a:chExt cx="0" cy="0"/>
-        </a:xfrm>
-      </p:grpSpPr>
-      <p:grpSp>
-        <p:nvGrpSpPr>
-          <p:cNvPr id="9" name="Group 8">
-            <a:extLst>
-              <a:ext uri="{FF2B5EF4-FFF2-40B4-BE49-F238E27FC236}">
-                <a16:creationId xmlns:a16="http://schemas.microsoft.com/office/drawing/2014/main" id="{749C117F-F390-437B-ADB0-57E87EFF34F5}"/>
-              </a:ext>
-            </a:extLst>
-          </p:cNvPr>
-          <p:cNvGrpSpPr>
-            <a:grpSpLocks noGrp="1" noUngrp="1" noRot="1" noChangeAspect="1" noMove="1" noResize="1"/>
-          </p:cNvGrpSpPr>
-          <p:nvPr>
-            <p:extLst>
-              <p:ext uri="{386F3935-93C4-4BCD-93E2-E3B085C9AB24}">
-                <p16:designElem xmlns:p16="http://schemas.microsoft.com/office/powerpoint/2015/main" val="1"/>
-              </p:ext>
-            </p:extLst>
-          </p:nvPr>
-        </p:nvGrpSpPr>
-        <p:grpSpPr>
-          <a:xfrm>
-            <a:off x="-16934" y="0"/>
-            <a:ext cx="12231160" cy="6856214"/>
-            <a:chOff x="-16934" y="0"/>
-            <a:chExt cx="12231160" cy="6856214"/>
-          </a:xfrm>
-        </p:grpSpPr>
-        <p:pic>
-          <p:nvPicPr>
-            <p:cNvPr id="10" name="Picture 9">
-              <a:extLst>
-                <a:ext uri="{FF2B5EF4-FFF2-40B4-BE49-F238E27FC236}">
-                  <a16:creationId xmlns:a16="http://schemas.microsoft.com/office/drawing/2014/main" id="{A7EF42F8-2417-49A6-95CE-DE9503B0AA66}"/>
-                </a:ext>
-              </a:extLst>
-            </p:cNvPr>
-            <p:cNvPicPr>
-              <a:picLocks noChangeAspect="1"/>
-            </p:cNvPicPr>
-            <p:nvPr>
-              <p:extLst>
-                <p:ext uri="{386F3935-93C4-4BCD-93E2-E3B085C9AB24}">
-                  <p16:designElem xmlns:p16="http://schemas.microsoft.com/office/powerpoint/2015/main" val="1"/>
-                </p:ext>
-              </p:extLst>
-            </p:nvPr>
-          </p:nvPicPr>
-          <p:blipFill>
-            <a:blip r:embed="rId3">
-              <a:extLst>
-                <a:ext uri="{28A0092B-C50C-407E-A947-70E740481C1C}">
-                  <a14:useLocalDpi xmlns:a14="http://schemas.microsoft.com/office/drawing/2010/main" val="0"/>
-                </a:ext>
-              </a:extLst>
-            </a:blip>
-            <a:stretch>
-              <a:fillRect/>
-            </a:stretch>
-          </p:blipFill>
-          <p:spPr>
-            <a:xfrm>
-              <a:off x="0" y="0"/>
-              <a:ext cx="12188825" cy="6856214"/>
-            </a:xfrm>
-            <a:prstGeom prst="rect">
-              <a:avLst/>
-            </a:prstGeom>
-          </p:spPr>
-        </p:pic>
-        <p:sp>
-          <p:nvSpPr>
-            <p:cNvPr id="11" name="Rectangle 10">
-              <a:extLst>
-                <a:ext uri="{FF2B5EF4-FFF2-40B4-BE49-F238E27FC236}">
-                  <a16:creationId xmlns:a16="http://schemas.microsoft.com/office/drawing/2014/main" id="{AC6F623B-2003-4AED-B02F-541A150EC143}"/>
-                </a:ext>
-              </a:extLst>
-            </p:cNvPr>
-            <p:cNvSpPr/>
-            <p:nvPr>
-              <p:extLst>
-                <p:ext uri="{386F3935-93C4-4BCD-93E2-E3B085C9AB24}">
-                  <p16:designElem xmlns:p16="http://schemas.microsoft.com/office/powerpoint/2015/main" val="1"/>
-                </p:ext>
-              </p:extLst>
-            </p:nvPr>
-          </p:nvSpPr>
-          <p:spPr>
-            <a:xfrm>
-              <a:off x="2328332" y="1540931"/>
-              <a:ext cx="7543802" cy="3835401"/>
-            </a:xfrm>
-            <a:prstGeom prst="rect">
-              <a:avLst/>
-            </a:prstGeom>
-            <a:noFill/>
-            <a:ln w="15875">
-              <a:miter lim="800000"/>
-            </a:ln>
-          </p:spPr>
-          <p:style>
-            <a:lnRef idx="1">
-              <a:schemeClr val="accent1"/>
-            </a:lnRef>
-            <a:fillRef idx="3">
-              <a:schemeClr val="accent1"/>
-            </a:fillRef>
-            <a:effectRef idx="2">
-              <a:schemeClr val="accent1"/>
-            </a:effectRef>
-            <a:fontRef idx="minor">
-              <a:schemeClr val="lt1"/>
-            </a:fontRef>
-          </p:style>
-        </p:sp>
-        <p:pic>
-          <p:nvPicPr>
-            <p:cNvPr id="12" name="Picture 11">
-              <a:extLst>
-                <a:ext uri="{FF2B5EF4-FFF2-40B4-BE49-F238E27FC236}">
-                  <a16:creationId xmlns:a16="http://schemas.microsoft.com/office/drawing/2014/main" id="{CD11837A-4F3D-419F-ACE2-E80B1EA2846F}"/>
-                </a:ext>
-              </a:extLst>
-            </p:cNvPr>
-            <p:cNvPicPr>
-              <a:picLocks noChangeAspect="1"/>
-            </p:cNvPicPr>
-            <p:nvPr>
-              <p:extLst>
-                <p:ext uri="{386F3935-93C4-4BCD-93E2-E3B085C9AB24}">
-                  <p16:designElem xmlns:p16="http://schemas.microsoft.com/office/powerpoint/2015/main" val="1"/>
-                </p:ext>
-              </p:extLst>
-            </p:nvPr>
-          </p:nvPicPr>
-          <p:blipFill rotWithShape="1">
-            <a:blip r:embed="rId4">
-              <a:extLst>
-                <a:ext uri="{28A0092B-C50C-407E-A947-70E740481C1C}">
-                  <a14:useLocalDpi xmlns:a14="http://schemas.microsoft.com/office/drawing/2010/main" val="0"/>
-                </a:ext>
-              </a:extLst>
-            </a:blip>
-            <a:srcRect/>
-            <a:stretch/>
-          </p:blipFill>
-          <p:spPr>
-            <a:xfrm>
-              <a:off x="-16934" y="3147609"/>
-              <a:ext cx="2478024" cy="612648"/>
-            </a:xfrm>
-            <a:prstGeom prst="rect">
-              <a:avLst/>
-            </a:prstGeom>
-          </p:spPr>
-        </p:pic>
-        <p:pic>
-          <p:nvPicPr>
-            <p:cNvPr id="13" name="Picture 12">
-              <a:extLst>
-                <a:ext uri="{FF2B5EF4-FFF2-40B4-BE49-F238E27FC236}">
-                  <a16:creationId xmlns:a16="http://schemas.microsoft.com/office/drawing/2014/main" id="{B9411D1A-7E2C-4A36-BE32-BF7A8E130723}"/>
-                </a:ext>
-              </a:extLst>
-            </p:cNvPr>
-            <p:cNvPicPr>
-              <a:picLocks noChangeAspect="1"/>
-            </p:cNvPicPr>
-            <p:nvPr>
-              <p:extLst>
-                <p:ext uri="{386F3935-93C4-4BCD-93E2-E3B085C9AB24}">
-                  <p16:designElem xmlns:p16="http://schemas.microsoft.com/office/powerpoint/2015/main" val="1"/>
-                </p:ext>
-              </p:extLst>
-            </p:nvPr>
-          </p:nvPicPr>
-          <p:blipFill rotWithShape="1">
-            <a:blip r:embed="rId4">
-              <a:extLst>
-                <a:ext uri="{28A0092B-C50C-407E-A947-70E740481C1C}">
-                  <a14:useLocalDpi xmlns:a14="http://schemas.microsoft.com/office/drawing/2010/main" val="0"/>
-                </a:ext>
-              </a:extLst>
-            </a:blip>
-            <a:srcRect/>
-            <a:stretch/>
-          </p:blipFill>
-          <p:spPr>
-            <a:xfrm>
-              <a:off x="9736202" y="3147609"/>
-              <a:ext cx="2478024" cy="612648"/>
-            </a:xfrm>
-            <a:prstGeom prst="rect">
-              <a:avLst/>
-            </a:prstGeom>
-          </p:spPr>
-        </p:pic>
-      </p:grpSp>
-      <p:cxnSp>
-        <p:nvCxnSpPr>
-          <p:cNvPr id="15" name="Straight Connector 14">
-            <a:extLst>
-              <a:ext uri="{FF2B5EF4-FFF2-40B4-BE49-F238E27FC236}">
-                <a16:creationId xmlns:a16="http://schemas.microsoft.com/office/drawing/2014/main" id="{20742BC3-654B-4E41-9A6A-73A42E477639}"/>
-              </a:ext>
-            </a:extLst>
-          </p:cNvPr>
-          <p:cNvCxnSpPr>
-            <a:cxnSpLocks noGrp="1" noRot="1" noChangeAspect="1" noMove="1" noResize="1" noEditPoints="1" noAdjustHandles="1" noChangeArrowheads="1" noChangeShapeType="1"/>
-          </p:cNvCxnSpPr>
-          <p:nvPr>
-            <p:extLst>
-              <p:ext uri="{386F3935-93C4-4BCD-93E2-E3B085C9AB24}">
-                <p16:designElem xmlns:p16="http://schemas.microsoft.com/office/powerpoint/2015/main" val="1"/>
-              </p:ext>
-            </p:extLst>
-          </p:nvPr>
-        </p:nvCxnSpPr>
-        <p:spPr>
-          <a:xfrm>
-            <a:off x="2692399" y="3522131"/>
-            <a:ext cx="6815668" cy="0"/>
-          </a:xfrm>
-          <a:prstGeom prst="line">
-            <a:avLst/>
-          </a:prstGeom>
-        </p:spPr>
-        <p:style>
-          <a:lnRef idx="2">
-            <a:schemeClr val="accent1"/>
-          </a:lnRef>
-          <a:fillRef idx="0">
-            <a:schemeClr val="accent1"/>
-          </a:fillRef>
-          <a:effectRef idx="1">
-            <a:schemeClr val="accent1"/>
-          </a:effectRef>
-          <a:fontRef idx="minor">
-            <a:schemeClr val="tx1"/>
-          </a:fontRef>
-        </p:style>
-      </p:cxnSp>
-      <p:sp useBgFill="1">
-        <p:nvSpPr>
-          <p:cNvPr id="17" name="Rectangle 16">
-            <a:extLst>
-              <a:ext uri="{FF2B5EF4-FFF2-40B4-BE49-F238E27FC236}">
-                <a16:creationId xmlns:a16="http://schemas.microsoft.com/office/drawing/2014/main" id="{28FA177F-145C-478A-A7ED-8D021CE76B3B}"/>
-              </a:ext>
-            </a:extLst>
-          </p:cNvPr>
-          <p:cNvSpPr>
-            <a:spLocks noGrp="1" noRot="1" noChangeAspect="1" noMove="1" noResize="1" noEditPoints="1" noAdjustHandles="1" noChangeArrowheads="1" noChangeShapeType="1" noTextEdit="1"/>
-          </p:cNvSpPr>
-          <p:nvPr>
-            <p:extLst>
-              <p:ext uri="{386F3935-93C4-4BCD-93E2-E3B085C9AB24}">
-                <p16:designElem xmlns:p16="http://schemas.microsoft.com/office/powerpoint/2015/main" val="1"/>
-              </p:ext>
-            </p:extLst>
-          </p:nvPr>
-        </p:nvSpPr>
-        <p:spPr>
-          <a:xfrm>
-            <a:off x="0" y="0"/>
-            <a:ext cx="12188952" cy="6858000"/>
-          </a:xfrm>
-          <a:prstGeom prst="rect">
-            <a:avLst/>
-          </a:prstGeom>
-          <a:ln>
-            <a:noFill/>
-          </a:ln>
-        </p:spPr>
-        <p:style>
-          <a:lnRef idx="2">
-            <a:schemeClr val="accent1">
-              <a:shade val="50000"/>
-            </a:schemeClr>
-          </a:lnRef>
-          <a:fillRef idx="1">
-            <a:schemeClr val="accent1"/>
-          </a:fillRef>
-          <a:effectRef idx="0">
-            <a:schemeClr val="accent1"/>
-          </a:effectRef>
-          <a:fontRef idx="minor">
-            <a:schemeClr val="lt1"/>
-          </a:fontRef>
-        </p:style>
-        <p:txBody>
-          <a:bodyPr rtlCol="0" anchor="ctr"/>
-          <a:lstStyle/>
-          <a:p>
-            <a:pPr algn="ctr"/>
-            <a:endParaRPr lang="en-US"/>
-          </a:p>
-        </p:txBody>
-      </p:sp>
-      <p:grpSp>
-        <p:nvGrpSpPr>
-          <p:cNvPr id="19" name="Group 18">
-            <a:extLst>
-              <a:ext uri="{FF2B5EF4-FFF2-40B4-BE49-F238E27FC236}">
-                <a16:creationId xmlns:a16="http://schemas.microsoft.com/office/drawing/2014/main" id="{1A96A522-1258-462E-AFC5-F5E3F14110E3}"/>
-              </a:ext>
-            </a:extLst>
-          </p:cNvPr>
-          <p:cNvGrpSpPr>
-            <a:grpSpLocks noGrp="1" noUngrp="1" noRot="1" noChangeAspect="1" noMove="1" noResize="1"/>
-          </p:cNvGrpSpPr>
-          <p:nvPr>
-            <p:extLst>
-              <p:ext uri="{386F3935-93C4-4BCD-93E2-E3B085C9AB24}">
-                <p16:designElem xmlns:p16="http://schemas.microsoft.com/office/powerpoint/2015/main" val="1"/>
-              </p:ext>
-            </p:extLst>
-          </p:nvPr>
-        </p:nvGrpSpPr>
-        <p:grpSpPr>
-          <a:xfrm>
-            <a:off x="-15736" y="0"/>
-            <a:ext cx="12229962" cy="6856214"/>
-            <a:chOff x="-15736" y="0"/>
-            <a:chExt cx="12229962" cy="6856214"/>
-          </a:xfrm>
-        </p:grpSpPr>
-        <p:pic>
-          <p:nvPicPr>
-            <p:cNvPr id="20" name="Picture 19">
-              <a:extLst>
-                <a:ext uri="{FF2B5EF4-FFF2-40B4-BE49-F238E27FC236}">
-                  <a16:creationId xmlns:a16="http://schemas.microsoft.com/office/drawing/2014/main" id="{ECD43597-59D1-4246-A90D-26FE2B6081B0}"/>
-                </a:ext>
-              </a:extLst>
-            </p:cNvPr>
-            <p:cNvPicPr>
-              <a:picLocks noChangeAspect="1"/>
-            </p:cNvPicPr>
-            <p:nvPr>
-              <p:extLst>
-                <p:ext uri="{386F3935-93C4-4BCD-93E2-E3B085C9AB24}">
-                  <p16:designElem xmlns:p16="http://schemas.microsoft.com/office/powerpoint/2015/main" val="1"/>
-                </p:ext>
-              </p:extLst>
-            </p:nvPr>
-          </p:nvPicPr>
-          <p:blipFill>
-            <a:blip r:embed="rId5">
-              <a:extLst>
-                <a:ext uri="{28A0092B-C50C-407E-A947-70E740481C1C}">
-                  <a14:useLocalDpi xmlns:a14="http://schemas.microsoft.com/office/drawing/2010/main" val="0"/>
-                </a:ext>
-              </a:extLst>
-            </a:blip>
-            <a:stretch>
-              <a:fillRect/>
-            </a:stretch>
-          </p:blipFill>
-          <p:spPr>
-            <a:xfrm>
-              <a:off x="0" y="0"/>
-              <a:ext cx="12188825" cy="6856214"/>
-            </a:xfrm>
-            <a:prstGeom prst="rect">
-              <a:avLst/>
-            </a:prstGeom>
-          </p:spPr>
-        </p:pic>
-        <p:sp>
-          <p:nvSpPr>
-            <p:cNvPr id="21" name="Rectangle 20">
-              <a:extLst>
-                <a:ext uri="{FF2B5EF4-FFF2-40B4-BE49-F238E27FC236}">
-                  <a16:creationId xmlns:a16="http://schemas.microsoft.com/office/drawing/2014/main" id="{2ED48CD8-BE7A-4992-8570-58DEE9826AAB}"/>
-                </a:ext>
-              </a:extLst>
-            </p:cNvPr>
-            <p:cNvSpPr/>
-            <p:nvPr>
-              <p:extLst>
-                <p:ext uri="{386F3935-93C4-4BCD-93E2-E3B085C9AB24}">
-                  <p16:designElem xmlns:p16="http://schemas.microsoft.com/office/powerpoint/2015/main" val="1"/>
-                </p:ext>
-              </p:extLst>
-            </p:nvPr>
-          </p:nvSpPr>
-          <p:spPr>
-            <a:xfrm>
-              <a:off x="608012" y="609600"/>
-              <a:ext cx="10972800" cy="5638800"/>
-            </a:xfrm>
-            <a:prstGeom prst="rect">
-              <a:avLst/>
-            </a:prstGeom>
-            <a:noFill/>
-            <a:ln w="15875" cap="flat">
-              <a:miter lim="800000"/>
-            </a:ln>
-          </p:spPr>
-          <p:style>
-            <a:lnRef idx="1">
-              <a:schemeClr val="accent1"/>
-            </a:lnRef>
-            <a:fillRef idx="3">
-              <a:schemeClr val="accent1"/>
-            </a:fillRef>
-            <a:effectRef idx="2">
-              <a:schemeClr val="accent1"/>
-            </a:effectRef>
-            <a:fontRef idx="minor">
-              <a:schemeClr val="lt1"/>
-            </a:fontRef>
-          </p:style>
-        </p:sp>
-        <p:pic>
-          <p:nvPicPr>
-            <p:cNvPr id="22" name="Picture 21">
-              <a:extLst>
-                <a:ext uri="{FF2B5EF4-FFF2-40B4-BE49-F238E27FC236}">
-                  <a16:creationId xmlns:a16="http://schemas.microsoft.com/office/drawing/2014/main" id="{9A68BD7C-72FC-4E92-88BB-3401D485D2B7}"/>
-                </a:ext>
-              </a:extLst>
-            </p:cNvPr>
-            <p:cNvPicPr>
-              <a:picLocks noChangeAspect="1"/>
-            </p:cNvPicPr>
-            <p:nvPr>
-              <p:extLst>
-                <p:ext uri="{386F3935-93C4-4BCD-93E2-E3B085C9AB24}">
-                  <p16:designElem xmlns:p16="http://schemas.microsoft.com/office/powerpoint/2015/main" val="1"/>
-                </p:ext>
-              </p:extLst>
-            </p:nvPr>
-          </p:nvPicPr>
-          <p:blipFill rotWithShape="1">
-            <a:blip r:embed="rId6">
-              <a:extLst>
-                <a:ext uri="{28A0092B-C50C-407E-A947-70E740481C1C}">
-                  <a14:useLocalDpi xmlns:a14="http://schemas.microsoft.com/office/drawing/2010/main" val="0"/>
-                </a:ext>
-              </a:extLst>
-            </a:blip>
-            <a:srcRect/>
-            <a:stretch/>
-          </p:blipFill>
-          <p:spPr>
-            <a:xfrm>
-              <a:off x="-15736" y="3153832"/>
-              <a:ext cx="777240" cy="606425"/>
-            </a:xfrm>
-            <a:prstGeom prst="rect">
-              <a:avLst/>
-            </a:prstGeom>
-          </p:spPr>
-        </p:pic>
-        <p:pic>
-          <p:nvPicPr>
-            <p:cNvPr id="23" name="Picture 22">
-              <a:extLst>
-                <a:ext uri="{FF2B5EF4-FFF2-40B4-BE49-F238E27FC236}">
-                  <a16:creationId xmlns:a16="http://schemas.microsoft.com/office/drawing/2014/main" id="{C8B73423-E00D-4FC9-9873-0C259A14BC19}"/>
-                </a:ext>
-              </a:extLst>
-            </p:cNvPr>
-            <p:cNvPicPr>
-              <a:picLocks noChangeAspect="1"/>
-            </p:cNvPicPr>
-            <p:nvPr>
-              <p:extLst>
-                <p:ext uri="{386F3935-93C4-4BCD-93E2-E3B085C9AB24}">
-                  <p16:designElem xmlns:p16="http://schemas.microsoft.com/office/powerpoint/2015/main" val="1"/>
-                </p:ext>
-              </p:extLst>
-            </p:nvPr>
-          </p:nvPicPr>
-          <p:blipFill rotWithShape="1">
-            <a:blip r:embed="rId6">
-              <a:extLst>
-                <a:ext uri="{28A0092B-C50C-407E-A947-70E740481C1C}">
-                  <a14:useLocalDpi xmlns:a14="http://schemas.microsoft.com/office/drawing/2010/main" val="0"/>
-                </a:ext>
-              </a:extLst>
-            </a:blip>
-            <a:srcRect/>
-            <a:stretch/>
-          </p:blipFill>
-          <p:spPr>
-            <a:xfrm>
-              <a:off x="11436986" y="3153832"/>
-              <a:ext cx="777240" cy="606425"/>
-            </a:xfrm>
-            <a:prstGeom prst="rect">
-              <a:avLst/>
-            </a:prstGeom>
-          </p:spPr>
-        </p:pic>
-      </p:grpSp>
-      <p:sp>
-        <p:nvSpPr>
-          <p:cNvPr id="25" name="Rectangle 24">
-            <a:extLst>
-              <a:ext uri="{FF2B5EF4-FFF2-40B4-BE49-F238E27FC236}">
-                <a16:creationId xmlns:a16="http://schemas.microsoft.com/office/drawing/2014/main" id="{22EEABFB-D1AB-4BFF-84FC-449548E93E09}"/>
-              </a:ext>
-            </a:extLst>
-          </p:cNvPr>
-          <p:cNvSpPr>
-            <a:spLocks noGrp="1" noRot="1" noChangeAspect="1" noMove="1" noResize="1" noEditPoints="1" noAdjustHandles="1" noChangeArrowheads="1" noChangeShapeType="1" noTextEdit="1"/>
-          </p:cNvSpPr>
-          <p:nvPr>
-            <p:extLst>
-              <p:ext uri="{386F3935-93C4-4BCD-93E2-E3B085C9AB24}">
-                <p16:designElem xmlns:p16="http://schemas.microsoft.com/office/powerpoint/2015/main" val="1"/>
-              </p:ext>
-            </p:extLst>
-          </p:nvPr>
-        </p:nvSpPr>
-        <p:spPr>
-          <a:xfrm>
-            <a:off x="1092644" y="1092200"/>
-            <a:ext cx="4976494" cy="4515104"/>
-          </a:xfrm>
-          <a:prstGeom prst="rect">
-            <a:avLst/>
-          </a:prstGeom>
-          <a:solidFill>
-            <a:schemeClr val="bg1"/>
-          </a:solidFill>
-          <a:ln w="57150" cmpd="thickThin">
-            <a:solidFill>
-              <a:schemeClr val="tx1">
-                <a:lumMod val="50000"/>
-                <a:lumOff val="50000"/>
-              </a:schemeClr>
-            </a:solidFill>
-            <a:miter lim="800000"/>
-          </a:ln>
-        </p:spPr>
-        <p:style>
-          <a:lnRef idx="2">
-            <a:schemeClr val="accent1">
-              <a:shade val="50000"/>
-            </a:schemeClr>
-          </a:lnRef>
-          <a:fillRef idx="1">
-            <a:schemeClr val="accent1"/>
-          </a:fillRef>
-          <a:effectRef idx="0">
-            <a:schemeClr val="accent1"/>
-          </a:effectRef>
-          <a:fontRef idx="minor">
-            <a:schemeClr val="lt1"/>
-          </a:fontRef>
-        </p:style>
-        <p:txBody>
-          <a:bodyPr rtlCol="0" anchor="ctr"/>
-          <a:lstStyle/>
-          <a:p>
-            <a:pPr algn="ctr"/>
-            <a:endParaRPr lang="en-US"/>
-          </a:p>
-        </p:txBody>
-      </p:sp>
-      <p:pic>
-        <p:nvPicPr>
-          <p:cNvPr id="4" name="Billede 12">
-            <a:extLst>
-              <a:ext uri="{FF2B5EF4-FFF2-40B4-BE49-F238E27FC236}">
-                <a16:creationId xmlns:a16="http://schemas.microsoft.com/office/drawing/2014/main" id="{4F75A8F3-E8EB-41A2-A51A-B4F6D4DE7ECA}"/>
-              </a:ext>
-            </a:extLst>
-          </p:cNvPr>
-          <p:cNvPicPr/>
-          <p:nvPr/>
-        </p:nvPicPr>
-        <p:blipFill>
-          <a:blip r:embed="rId7" cstate="print">
-            <a:extLst>
-              <a:ext uri="{28A0092B-C50C-407E-A947-70E740481C1C}">
-                <a14:useLocalDpi xmlns:a14="http://schemas.microsoft.com/office/drawing/2010/main" val="0"/>
-              </a:ext>
-            </a:extLst>
-          </a:blip>
-          <a:stretch>
-            <a:fillRect/>
-          </a:stretch>
-        </p:blipFill>
-        <p:spPr>
-          <a:xfrm>
-            <a:off x="1412683" y="2219750"/>
-            <a:ext cx="4348925" cy="2239695"/>
-          </a:xfrm>
-          <a:prstGeom prst="rect">
-            <a:avLst/>
-          </a:prstGeom>
-        </p:spPr>
-      </p:pic>
-      <p:cxnSp>
-        <p:nvCxnSpPr>
-          <p:cNvPr id="27" name="Straight Connector 26">
-            <a:extLst>
-              <a:ext uri="{FF2B5EF4-FFF2-40B4-BE49-F238E27FC236}">
-                <a16:creationId xmlns:a16="http://schemas.microsoft.com/office/drawing/2014/main" id="{4231BC86-8965-4F95-9FD9-76313A7D601B}"/>
-              </a:ext>
-            </a:extLst>
-          </p:cNvPr>
-          <p:cNvCxnSpPr>
-            <a:cxnSpLocks noGrp="1" noRot="1" noChangeAspect="1" noMove="1" noResize="1" noEditPoints="1" noAdjustHandles="1" noChangeArrowheads="1" noChangeShapeType="1"/>
-          </p:cNvCxnSpPr>
-          <p:nvPr>
-            <p:extLst>
-              <p:ext uri="{386F3935-93C4-4BCD-93E2-E3B085C9AB24}">
-                <p16:designElem xmlns:p16="http://schemas.microsoft.com/office/powerpoint/2015/main" val="1"/>
-              </p:ext>
-            </p:extLst>
-          </p:nvPr>
-        </p:nvCxnSpPr>
-        <p:spPr>
-          <a:xfrm>
-            <a:off x="6553770" y="3522131"/>
-            <a:ext cx="4520638" cy="0"/>
-          </a:xfrm>
-          <a:prstGeom prst="line">
-            <a:avLst/>
-          </a:prstGeom>
-        </p:spPr>
-        <p:style>
-          <a:lnRef idx="2">
-            <a:schemeClr val="accent1"/>
-          </a:lnRef>
-          <a:fillRef idx="0">
-            <a:schemeClr val="accent1"/>
-          </a:fillRef>
-          <a:effectRef idx="1">
-            <a:schemeClr val="accent1"/>
-          </a:effectRef>
-          <a:fontRef idx="minor">
-            <a:schemeClr val="tx1"/>
-          </a:fontRef>
-        </p:style>
-      </p:cxnSp>
-      <p:sp>
-        <p:nvSpPr>
-          <p:cNvPr id="2" name="Title 1">
-            <a:extLst>
-              <a:ext uri="{FF2B5EF4-FFF2-40B4-BE49-F238E27FC236}">
-                <a16:creationId xmlns:a16="http://schemas.microsoft.com/office/drawing/2014/main" id="{13438430-C715-4EE2-BFA8-D9B41F760649}"/>
-              </a:ext>
-            </a:extLst>
-          </p:cNvPr>
-          <p:cNvSpPr>
-            <a:spLocks noGrp="1"/>
-          </p:cNvSpPr>
-          <p:nvPr>
-            <p:ph type="title"/>
-          </p:nvPr>
-        </p:nvSpPr>
-        <p:spPr>
-          <a:xfrm>
-            <a:off x="6553770" y="1041401"/>
-            <a:ext cx="4538526" cy="2345264"/>
-          </a:xfrm>
-        </p:spPr>
-        <p:txBody>
-          <a:bodyPr vert="horz" lIns="91440" tIns="45720" rIns="91440" bIns="45720" rtlCol="0" anchor="b">
-            <a:normAutofit/>
-          </a:bodyPr>
-          <a:lstStyle/>
-          <a:p>
-            <a:r>
-              <a:rPr lang="en-US" sz="5400" b="1">
-                <a:solidFill>
-                  <a:srgbClr val="262626"/>
-                </a:solidFill>
-              </a:rPr>
-              <a:t>Facade</a:t>
-            </a:r>
-          </a:p>
-        </p:txBody>
-      </p:sp>
-    </p:spTree>
-    <p:extLst>
-      <p:ext uri="{BB962C8B-B14F-4D97-AF65-F5344CB8AC3E}">
-        <p14:creationId xmlns:p14="http://schemas.microsoft.com/office/powerpoint/2010/main" val="732939086"/>
-      </p:ext>
-    </p:extLst>
-  </p:cSld>
-  <p:clrMapOvr>
-    <a:masterClrMapping/>
-  </p:clrMapOvr>
-  <p:transition spd="med">
-    <p:pull/>
-  </p:transition>
-</p:sld>
-</file>
-
-<file path=ppt/slides/slide14.xml><?xml version="1.0" encoding="utf-8"?>
-<p:sld xmlns:a="http://schemas.openxmlformats.org/drawingml/2006/main" xmlns:r="http://schemas.openxmlformats.org/officeDocument/2006/relationships" xmlns:p="http://schemas.openxmlformats.org/presentationml/2006/main">
-  <p:cSld>
-    <p:bg>
-      <p:bgPr>
-        <a:blipFill>
-          <a:blip r:embed="rId2">
-            <a:extLst/>
-          </a:blip>
-          <a:stretch/>
-        </a:blipFill>
-        <a:effectLst/>
-      </p:bgPr>
-    </p:bg>
-    <p:spTree>
-      <p:nvGrpSpPr>
-        <p:cNvPr id="1" name=""/>
-        <p:cNvGrpSpPr/>
-        <p:nvPr/>
-      </p:nvGrpSpPr>
-      <p:grpSpPr>
-        <a:xfrm>
-          <a:off x="0" y="0"/>
-          <a:ext cx="0" cy="0"/>
-          <a:chOff x="0" y="0"/>
-          <a:chExt cx="0" cy="0"/>
-        </a:xfrm>
-      </p:grpSpPr>
-      <p:grpSp>
-        <p:nvGrpSpPr>
-          <p:cNvPr id="9" name="Group 8">
-            <a:extLst>
-              <a:ext uri="{FF2B5EF4-FFF2-40B4-BE49-F238E27FC236}">
-                <a16:creationId xmlns:a16="http://schemas.microsoft.com/office/drawing/2014/main" id="{749C117F-F390-437B-ADB0-57E87EFF34F5}"/>
-              </a:ext>
-            </a:extLst>
-          </p:cNvPr>
-          <p:cNvGrpSpPr>
-            <a:grpSpLocks noGrp="1" noUngrp="1" noRot="1" noChangeAspect="1" noMove="1" noResize="1"/>
-          </p:cNvGrpSpPr>
-          <p:nvPr>
-            <p:extLst>
-              <p:ext uri="{386F3935-93C4-4BCD-93E2-E3B085C9AB24}">
-                <p16:designElem xmlns:p16="http://schemas.microsoft.com/office/powerpoint/2015/main" val="1"/>
-              </p:ext>
-            </p:extLst>
-          </p:nvPr>
-        </p:nvGrpSpPr>
-        <p:grpSpPr>
-          <a:xfrm>
-            <a:off x="-16934" y="0"/>
-            <a:ext cx="12231160" cy="6856214"/>
-            <a:chOff x="-16934" y="0"/>
-            <a:chExt cx="12231160" cy="6856214"/>
-          </a:xfrm>
-        </p:grpSpPr>
-        <p:pic>
-          <p:nvPicPr>
-            <p:cNvPr id="10" name="Picture 9">
-              <a:extLst>
-                <a:ext uri="{FF2B5EF4-FFF2-40B4-BE49-F238E27FC236}">
-                  <a16:creationId xmlns:a16="http://schemas.microsoft.com/office/drawing/2014/main" id="{A7EF42F8-2417-49A6-95CE-DE9503B0AA66}"/>
-                </a:ext>
-              </a:extLst>
-            </p:cNvPr>
-            <p:cNvPicPr>
-              <a:picLocks noChangeAspect="1"/>
-            </p:cNvPicPr>
-            <p:nvPr>
-              <p:extLst>
-                <p:ext uri="{386F3935-93C4-4BCD-93E2-E3B085C9AB24}">
-                  <p16:designElem xmlns:p16="http://schemas.microsoft.com/office/powerpoint/2015/main" val="1"/>
-                </p:ext>
-              </p:extLst>
-            </p:nvPr>
-          </p:nvPicPr>
-          <p:blipFill>
-            <a:blip r:embed="rId3">
-              <a:extLst>
-                <a:ext uri="{28A0092B-C50C-407E-A947-70E740481C1C}">
-                  <a14:useLocalDpi xmlns:a14="http://schemas.microsoft.com/office/drawing/2010/main" val="0"/>
-                </a:ext>
-              </a:extLst>
-            </a:blip>
-            <a:stretch>
-              <a:fillRect/>
-            </a:stretch>
-          </p:blipFill>
-          <p:spPr>
-            <a:xfrm>
-              <a:off x="0" y="0"/>
-              <a:ext cx="12188825" cy="6856214"/>
-            </a:xfrm>
-            <a:prstGeom prst="rect">
-              <a:avLst/>
-            </a:prstGeom>
-          </p:spPr>
-        </p:pic>
-        <p:sp>
-          <p:nvSpPr>
-            <p:cNvPr id="11" name="Rectangle 10">
-              <a:extLst>
-                <a:ext uri="{FF2B5EF4-FFF2-40B4-BE49-F238E27FC236}">
-                  <a16:creationId xmlns:a16="http://schemas.microsoft.com/office/drawing/2014/main" id="{AC6F623B-2003-4AED-B02F-541A150EC143}"/>
-                </a:ext>
-              </a:extLst>
-            </p:cNvPr>
-            <p:cNvSpPr/>
-            <p:nvPr>
-              <p:extLst>
-                <p:ext uri="{386F3935-93C4-4BCD-93E2-E3B085C9AB24}">
-                  <p16:designElem xmlns:p16="http://schemas.microsoft.com/office/powerpoint/2015/main" val="1"/>
-                </p:ext>
-              </p:extLst>
-            </p:nvPr>
-          </p:nvSpPr>
-          <p:spPr>
-            <a:xfrm>
-              <a:off x="2328332" y="1540931"/>
-              <a:ext cx="7543802" cy="3835401"/>
-            </a:xfrm>
-            <a:prstGeom prst="rect">
-              <a:avLst/>
-            </a:prstGeom>
-            <a:noFill/>
-            <a:ln w="15875">
-              <a:miter lim="800000"/>
-            </a:ln>
-          </p:spPr>
-          <p:style>
-            <a:lnRef idx="1">
-              <a:schemeClr val="accent1"/>
-            </a:lnRef>
-            <a:fillRef idx="3">
-              <a:schemeClr val="accent1"/>
-            </a:fillRef>
-            <a:effectRef idx="2">
-              <a:schemeClr val="accent1"/>
-            </a:effectRef>
-            <a:fontRef idx="minor">
-              <a:schemeClr val="lt1"/>
-            </a:fontRef>
-          </p:style>
-        </p:sp>
-        <p:pic>
-          <p:nvPicPr>
-            <p:cNvPr id="12" name="Picture 11">
-              <a:extLst>
-                <a:ext uri="{FF2B5EF4-FFF2-40B4-BE49-F238E27FC236}">
-                  <a16:creationId xmlns:a16="http://schemas.microsoft.com/office/drawing/2014/main" id="{CD11837A-4F3D-419F-ACE2-E80B1EA2846F}"/>
-                </a:ext>
-              </a:extLst>
-            </p:cNvPr>
-            <p:cNvPicPr>
-              <a:picLocks noChangeAspect="1"/>
-            </p:cNvPicPr>
-            <p:nvPr>
-              <p:extLst>
-                <p:ext uri="{386F3935-93C4-4BCD-93E2-E3B085C9AB24}">
-                  <p16:designElem xmlns:p16="http://schemas.microsoft.com/office/powerpoint/2015/main" val="1"/>
-                </p:ext>
-              </p:extLst>
-            </p:nvPr>
-          </p:nvPicPr>
-          <p:blipFill rotWithShape="1">
-            <a:blip r:embed="rId4">
-              <a:extLst>
-                <a:ext uri="{28A0092B-C50C-407E-A947-70E740481C1C}">
-                  <a14:useLocalDpi xmlns:a14="http://schemas.microsoft.com/office/drawing/2010/main" val="0"/>
-                </a:ext>
-              </a:extLst>
-            </a:blip>
-            <a:srcRect/>
-            <a:stretch/>
-          </p:blipFill>
-          <p:spPr>
-            <a:xfrm>
-              <a:off x="-16934" y="3147609"/>
-              <a:ext cx="2478024" cy="612648"/>
-            </a:xfrm>
-            <a:prstGeom prst="rect">
-              <a:avLst/>
-            </a:prstGeom>
-          </p:spPr>
-        </p:pic>
-        <p:pic>
-          <p:nvPicPr>
-            <p:cNvPr id="13" name="Picture 12">
-              <a:extLst>
-                <a:ext uri="{FF2B5EF4-FFF2-40B4-BE49-F238E27FC236}">
-                  <a16:creationId xmlns:a16="http://schemas.microsoft.com/office/drawing/2014/main" id="{B9411D1A-7E2C-4A36-BE32-BF7A8E130723}"/>
-                </a:ext>
-              </a:extLst>
-            </p:cNvPr>
-            <p:cNvPicPr>
-              <a:picLocks noChangeAspect="1"/>
-            </p:cNvPicPr>
-            <p:nvPr>
-              <p:extLst>
-                <p:ext uri="{386F3935-93C4-4BCD-93E2-E3B085C9AB24}">
-                  <p16:designElem xmlns:p16="http://schemas.microsoft.com/office/powerpoint/2015/main" val="1"/>
-                </p:ext>
-              </p:extLst>
-            </p:nvPr>
-          </p:nvPicPr>
-          <p:blipFill rotWithShape="1">
-            <a:blip r:embed="rId4">
-              <a:extLst>
-                <a:ext uri="{28A0092B-C50C-407E-A947-70E740481C1C}">
-                  <a14:useLocalDpi xmlns:a14="http://schemas.microsoft.com/office/drawing/2010/main" val="0"/>
-                </a:ext>
-              </a:extLst>
-            </a:blip>
-            <a:srcRect/>
-            <a:stretch/>
-          </p:blipFill>
-          <p:spPr>
-            <a:xfrm>
-              <a:off x="9736202" y="3147609"/>
-              <a:ext cx="2478024" cy="612648"/>
-            </a:xfrm>
-            <a:prstGeom prst="rect">
-              <a:avLst/>
-            </a:prstGeom>
-          </p:spPr>
-        </p:pic>
-      </p:grpSp>
-      <p:cxnSp>
-        <p:nvCxnSpPr>
-          <p:cNvPr id="15" name="Straight Connector 14">
-            <a:extLst>
-              <a:ext uri="{FF2B5EF4-FFF2-40B4-BE49-F238E27FC236}">
-                <a16:creationId xmlns:a16="http://schemas.microsoft.com/office/drawing/2014/main" id="{20742BC3-654B-4E41-9A6A-73A42E477639}"/>
-              </a:ext>
-            </a:extLst>
-          </p:cNvPr>
-          <p:cNvCxnSpPr>
-            <a:cxnSpLocks noGrp="1" noRot="1" noChangeAspect="1" noMove="1" noResize="1" noEditPoints="1" noAdjustHandles="1" noChangeArrowheads="1" noChangeShapeType="1"/>
-          </p:cNvCxnSpPr>
-          <p:nvPr>
-            <p:extLst>
-              <p:ext uri="{386F3935-93C4-4BCD-93E2-E3B085C9AB24}">
-                <p16:designElem xmlns:p16="http://schemas.microsoft.com/office/powerpoint/2015/main" val="1"/>
-              </p:ext>
-            </p:extLst>
-          </p:nvPr>
-        </p:nvCxnSpPr>
-        <p:spPr>
-          <a:xfrm>
-            <a:off x="2692399" y="3522131"/>
-            <a:ext cx="6815668" cy="0"/>
-          </a:xfrm>
-          <a:prstGeom prst="line">
-            <a:avLst/>
-          </a:prstGeom>
-        </p:spPr>
-        <p:style>
-          <a:lnRef idx="2">
-            <a:schemeClr val="accent1"/>
-          </a:lnRef>
-          <a:fillRef idx="0">
-            <a:schemeClr val="accent1"/>
-          </a:fillRef>
-          <a:effectRef idx="1">
-            <a:schemeClr val="accent1"/>
-          </a:effectRef>
-          <a:fontRef idx="minor">
-            <a:schemeClr val="tx1"/>
-          </a:fontRef>
-        </p:style>
-      </p:cxnSp>
-      <p:sp useBgFill="1">
-        <p:nvSpPr>
-          <p:cNvPr id="17" name="Rectangle 16">
-            <a:extLst>
-              <a:ext uri="{FF2B5EF4-FFF2-40B4-BE49-F238E27FC236}">
-                <a16:creationId xmlns:a16="http://schemas.microsoft.com/office/drawing/2014/main" id="{575E71FA-50BD-43F8-8C98-04339283A93D}"/>
-              </a:ext>
-            </a:extLst>
-          </p:cNvPr>
-          <p:cNvSpPr>
-            <a:spLocks noGrp="1" noRot="1" noChangeAspect="1" noMove="1" noResize="1" noEditPoints="1" noAdjustHandles="1" noChangeArrowheads="1" noChangeShapeType="1" noTextEdit="1"/>
-          </p:cNvSpPr>
-          <p:nvPr>
-            <p:extLst>
-              <p:ext uri="{386F3935-93C4-4BCD-93E2-E3B085C9AB24}">
-                <p16:designElem xmlns:p16="http://schemas.microsoft.com/office/powerpoint/2015/main" val="1"/>
-              </p:ext>
-            </p:extLst>
-          </p:nvPr>
-        </p:nvSpPr>
-        <p:spPr>
-          <a:xfrm>
-            <a:off x="0" y="0"/>
-            <a:ext cx="12188952" cy="6858000"/>
-          </a:xfrm>
-          <a:prstGeom prst="rect">
-            <a:avLst/>
-          </a:prstGeom>
-          <a:ln>
-            <a:noFill/>
-          </a:ln>
-        </p:spPr>
-        <p:style>
-          <a:lnRef idx="2">
-            <a:schemeClr val="accent1">
-              <a:shade val="50000"/>
-            </a:schemeClr>
-          </a:lnRef>
-          <a:fillRef idx="1">
-            <a:schemeClr val="accent1"/>
-          </a:fillRef>
-          <a:effectRef idx="0">
-            <a:schemeClr val="accent1"/>
-          </a:effectRef>
-          <a:fontRef idx="minor">
-            <a:schemeClr val="lt1"/>
-          </a:fontRef>
-        </p:style>
-        <p:txBody>
-          <a:bodyPr rtlCol="0" anchor="ctr"/>
-          <a:lstStyle/>
-          <a:p>
-            <a:pPr algn="ctr"/>
-            <a:endParaRPr lang="en-US"/>
-          </a:p>
-        </p:txBody>
-      </p:sp>
-      <p:grpSp>
-        <p:nvGrpSpPr>
-          <p:cNvPr id="19" name="Group 18">
-            <a:extLst>
-              <a:ext uri="{FF2B5EF4-FFF2-40B4-BE49-F238E27FC236}">
-                <a16:creationId xmlns:a16="http://schemas.microsoft.com/office/drawing/2014/main" id="{CF1AA7F6-A589-4BC8-BC72-2CA6DC908398}"/>
-              </a:ext>
-            </a:extLst>
-          </p:cNvPr>
-          <p:cNvGrpSpPr>
-            <a:grpSpLocks noGrp="1" noUngrp="1" noRot="1" noChangeAspect="1" noMove="1" noResize="1"/>
-          </p:cNvGrpSpPr>
-          <p:nvPr>
-            <p:extLst>
-              <p:ext uri="{386F3935-93C4-4BCD-93E2-E3B085C9AB24}">
-                <p16:designElem xmlns:p16="http://schemas.microsoft.com/office/powerpoint/2015/main" val="1"/>
-              </p:ext>
-            </p:extLst>
-          </p:nvPr>
-        </p:nvGrpSpPr>
-        <p:grpSpPr>
-          <a:xfrm>
-            <a:off x="-15736" y="0"/>
-            <a:ext cx="12229962" cy="6856214"/>
-            <a:chOff x="-15736" y="0"/>
-            <a:chExt cx="12229962" cy="6856214"/>
-          </a:xfrm>
-        </p:grpSpPr>
-        <p:pic>
-          <p:nvPicPr>
-            <p:cNvPr id="20" name="Picture 19">
-              <a:extLst>
-                <a:ext uri="{FF2B5EF4-FFF2-40B4-BE49-F238E27FC236}">
-                  <a16:creationId xmlns:a16="http://schemas.microsoft.com/office/drawing/2014/main" id="{53F5243F-7E41-439E-8991-C4F246D88F68}"/>
-                </a:ext>
-              </a:extLst>
-            </p:cNvPr>
-            <p:cNvPicPr>
-              <a:picLocks noChangeAspect="1"/>
-            </p:cNvPicPr>
-            <p:nvPr>
-              <p:extLst>
-                <p:ext uri="{386F3935-93C4-4BCD-93E2-E3B085C9AB24}">
-                  <p16:designElem xmlns:p16="http://schemas.microsoft.com/office/powerpoint/2015/main" val="1"/>
-                </p:ext>
-              </p:extLst>
-            </p:nvPr>
-          </p:nvPicPr>
-          <p:blipFill>
-            <a:blip r:embed="rId5">
-              <a:extLst>
-                <a:ext uri="{28A0092B-C50C-407E-A947-70E740481C1C}">
-                  <a14:useLocalDpi xmlns:a14="http://schemas.microsoft.com/office/drawing/2010/main" val="0"/>
-                </a:ext>
-              </a:extLst>
-            </a:blip>
-            <a:stretch>
-              <a:fillRect/>
-            </a:stretch>
-          </p:blipFill>
-          <p:spPr>
-            <a:xfrm>
-              <a:off x="0" y="0"/>
-              <a:ext cx="12188825" cy="6856214"/>
-            </a:xfrm>
-            <a:prstGeom prst="rect">
-              <a:avLst/>
-            </a:prstGeom>
-          </p:spPr>
-        </p:pic>
-        <p:sp>
-          <p:nvSpPr>
-            <p:cNvPr id="21" name="Rectangle 20">
-              <a:extLst>
-                <a:ext uri="{FF2B5EF4-FFF2-40B4-BE49-F238E27FC236}">
-                  <a16:creationId xmlns:a16="http://schemas.microsoft.com/office/drawing/2014/main" id="{401A6B5F-1CF1-43AD-9E85-94E187210CFC}"/>
-                </a:ext>
-              </a:extLst>
-            </p:cNvPr>
-            <p:cNvSpPr/>
-            <p:nvPr>
-              <p:extLst>
-                <p:ext uri="{386F3935-93C4-4BCD-93E2-E3B085C9AB24}">
-                  <p16:designElem xmlns:p16="http://schemas.microsoft.com/office/powerpoint/2015/main" val="1"/>
-                </p:ext>
-              </p:extLst>
-            </p:nvPr>
-          </p:nvSpPr>
-          <p:spPr>
-            <a:xfrm>
-              <a:off x="608012" y="609600"/>
-              <a:ext cx="10972800" cy="5638800"/>
-            </a:xfrm>
-            <a:prstGeom prst="rect">
-              <a:avLst/>
-            </a:prstGeom>
-            <a:noFill/>
-            <a:ln w="15875" cap="flat">
-              <a:miter lim="800000"/>
-            </a:ln>
-          </p:spPr>
-          <p:style>
-            <a:lnRef idx="1">
-              <a:schemeClr val="accent1"/>
-            </a:lnRef>
-            <a:fillRef idx="3">
-              <a:schemeClr val="accent1"/>
-            </a:fillRef>
-            <a:effectRef idx="2">
-              <a:schemeClr val="accent1"/>
-            </a:effectRef>
-            <a:fontRef idx="minor">
-              <a:schemeClr val="lt1"/>
-            </a:fontRef>
-          </p:style>
-        </p:sp>
-        <p:pic>
-          <p:nvPicPr>
-            <p:cNvPr id="22" name="Picture 21">
-              <a:extLst>
-                <a:ext uri="{FF2B5EF4-FFF2-40B4-BE49-F238E27FC236}">
-                  <a16:creationId xmlns:a16="http://schemas.microsoft.com/office/drawing/2014/main" id="{2F682A59-7E20-407C-A7F8-582295AC687C}"/>
-                </a:ext>
-              </a:extLst>
-            </p:cNvPr>
-            <p:cNvPicPr>
-              <a:picLocks noChangeAspect="1"/>
-            </p:cNvPicPr>
-            <p:nvPr>
-              <p:extLst>
-                <p:ext uri="{386F3935-93C4-4BCD-93E2-E3B085C9AB24}">
-                  <p16:designElem xmlns:p16="http://schemas.microsoft.com/office/powerpoint/2015/main" val="1"/>
-                </p:ext>
-              </p:extLst>
-            </p:nvPr>
-          </p:nvPicPr>
-          <p:blipFill rotWithShape="1">
-            <a:blip r:embed="rId6">
-              <a:extLst>
-                <a:ext uri="{28A0092B-C50C-407E-A947-70E740481C1C}">
-                  <a14:useLocalDpi xmlns:a14="http://schemas.microsoft.com/office/drawing/2010/main" val="0"/>
-                </a:ext>
-              </a:extLst>
-            </a:blip>
-            <a:srcRect/>
-            <a:stretch/>
-          </p:blipFill>
-          <p:spPr>
-            <a:xfrm>
-              <a:off x="-15736" y="3153832"/>
-              <a:ext cx="777240" cy="606425"/>
-            </a:xfrm>
-            <a:prstGeom prst="rect">
-              <a:avLst/>
-            </a:prstGeom>
-          </p:spPr>
-        </p:pic>
-        <p:pic>
-          <p:nvPicPr>
-            <p:cNvPr id="23" name="Picture 22">
-              <a:extLst>
-                <a:ext uri="{FF2B5EF4-FFF2-40B4-BE49-F238E27FC236}">
-                  <a16:creationId xmlns:a16="http://schemas.microsoft.com/office/drawing/2014/main" id="{5E4AC24E-0670-406E-822F-AAA6DA2010D3}"/>
-                </a:ext>
-              </a:extLst>
-            </p:cNvPr>
-            <p:cNvPicPr>
-              <a:picLocks noChangeAspect="1"/>
-            </p:cNvPicPr>
-            <p:nvPr>
-              <p:extLst>
-                <p:ext uri="{386F3935-93C4-4BCD-93E2-E3B085C9AB24}">
-                  <p16:designElem xmlns:p16="http://schemas.microsoft.com/office/powerpoint/2015/main" val="1"/>
-                </p:ext>
-              </p:extLst>
-            </p:nvPr>
-          </p:nvPicPr>
-          <p:blipFill rotWithShape="1">
-            <a:blip r:embed="rId6">
-              <a:extLst>
-                <a:ext uri="{28A0092B-C50C-407E-A947-70E740481C1C}">
-                  <a14:useLocalDpi xmlns:a14="http://schemas.microsoft.com/office/drawing/2010/main" val="0"/>
-                </a:ext>
-              </a:extLst>
-            </a:blip>
-            <a:srcRect/>
-            <a:stretch/>
-          </p:blipFill>
-          <p:spPr>
-            <a:xfrm>
-              <a:off x="11436986" y="3153832"/>
-              <a:ext cx="777240" cy="606425"/>
-            </a:xfrm>
-            <a:prstGeom prst="rect">
-              <a:avLst/>
-            </a:prstGeom>
-          </p:spPr>
-        </p:pic>
-      </p:grpSp>
-      <p:sp>
-        <p:nvSpPr>
-          <p:cNvPr id="25" name="Rectangle 24">
+          <p:cNvPr id="78" name="Rectangle 77">
             <a:extLst>
               <a:ext uri="{FF2B5EF4-FFF2-40B4-BE49-F238E27FC236}">
                 <a16:creationId xmlns:a16="http://schemas.microsoft.com/office/drawing/2014/main" id="{E89B1776-F953-4C0F-8E85-E9C66B1EF003}"/>
+              </a:ext>
+              <a:ext uri="{C183D7F6-B498-43B3-948B-1728B52AA6E4}">
+                <adec:decorative xmlns:adec="http://schemas.microsoft.com/office/drawing/2017/decorative" val="1"/>
               </a:ext>
             </a:extLst>
           </p:cNvPr>
@@ -19360,18 +18031,20 @@
       </p:sp>
       <p:pic>
         <p:nvPicPr>
-          <p:cNvPr id="4" name="Billede 6">
+          <p:cNvPr id="5" name="Billede 4" descr="Et billede, der indeholder skærmbillede&#10;&#10;Beskrivelse, der er oprettet med høj sikkerhed">
             <a:extLst>
               <a:ext uri="{FF2B5EF4-FFF2-40B4-BE49-F238E27FC236}">
-                <a16:creationId xmlns:a16="http://schemas.microsoft.com/office/drawing/2014/main" id="{BB719191-E8C7-4E49-B65E-16DA97C3731D}"/>
+                <a16:creationId xmlns:a16="http://schemas.microsoft.com/office/drawing/2014/main" id="{4F29FE0D-21B6-411C-80A1-B5F5CEBC8E82}"/>
               </a:ext>
             </a:extLst>
           </p:cNvPr>
-          <p:cNvPicPr/>
+          <p:cNvPicPr>
+            <a:picLocks noChangeAspect="1"/>
+          </p:cNvPicPr>
           <p:nvPr/>
         </p:nvPicPr>
         <p:blipFill>
-          <a:blip r:embed="rId7" cstate="print">
+          <a:blip r:embed="rId7">
             <a:extLst>
               <a:ext uri="{28A0092B-C50C-407E-A947-70E740481C1C}">
                 <a14:useLocalDpi xmlns:a14="http://schemas.microsoft.com/office/drawing/2010/main" val="0"/>
@@ -19384,8 +18057,8 @@
         </p:blipFill>
         <p:spPr>
           <a:xfrm>
-            <a:off x="1412683" y="1850197"/>
-            <a:ext cx="5784083" cy="2978801"/>
+            <a:off x="1219375" y="1250696"/>
+            <a:ext cx="6172043" cy="4215384"/>
           </a:xfrm>
           <a:prstGeom prst="rect">
             <a:avLst/>
@@ -19394,10 +18067,1553 @@
       </p:pic>
       <p:cxnSp>
         <p:nvCxnSpPr>
-          <p:cNvPr id="27" name="Straight Connector 26">
+          <p:cNvPr id="80" name="Straight Connector 79">
             <a:extLst>
               <a:ext uri="{FF2B5EF4-FFF2-40B4-BE49-F238E27FC236}">
                 <a16:creationId xmlns:a16="http://schemas.microsoft.com/office/drawing/2014/main" id="{997356D0-D934-42B9-8291-DF34A3AC0CFE}"/>
+              </a:ext>
+              <a:ext uri="{C183D7F6-B498-43B3-948B-1728B52AA6E4}">
+                <adec:decorative xmlns:adec="http://schemas.microsoft.com/office/drawing/2017/decorative" val="1"/>
+              </a:ext>
+            </a:extLst>
+          </p:cNvPr>
+          <p:cNvCxnSpPr>
+            <a:cxnSpLocks noGrp="1" noRot="1" noChangeAspect="1" noMove="1" noResize="1" noEditPoints="1" noAdjustHandles="1" noChangeArrowheads="1" noChangeShapeType="1"/>
+          </p:cNvCxnSpPr>
+          <p:nvPr>
+            <p:extLst>
+              <p:ext uri="{386F3935-93C4-4BCD-93E2-E3B085C9AB24}">
+                <p16:designElem xmlns:p16="http://schemas.microsoft.com/office/powerpoint/2015/main" val="1"/>
+              </p:ext>
+            </p:extLst>
+          </p:nvPr>
+        </p:nvCxnSpPr>
+        <p:spPr>
+          <a:xfrm>
+            <a:off x="7999431" y="3509772"/>
+            <a:ext cx="3074977" cy="12359"/>
+          </a:xfrm>
+          <a:prstGeom prst="line">
+            <a:avLst/>
+          </a:prstGeom>
+        </p:spPr>
+        <p:style>
+          <a:lnRef idx="2">
+            <a:schemeClr val="accent1"/>
+          </a:lnRef>
+          <a:fillRef idx="0">
+            <a:schemeClr val="accent1"/>
+          </a:fillRef>
+          <a:effectRef idx="1">
+            <a:schemeClr val="accent1"/>
+          </a:effectRef>
+          <a:fontRef idx="minor">
+            <a:schemeClr val="tx1"/>
+          </a:fontRef>
+        </p:style>
+      </p:cxnSp>
+      <p:sp>
+        <p:nvSpPr>
+          <p:cNvPr id="2" name="Title 1">
+            <a:extLst>
+              <a:ext uri="{FF2B5EF4-FFF2-40B4-BE49-F238E27FC236}">
+                <a16:creationId xmlns:a16="http://schemas.microsoft.com/office/drawing/2014/main" id="{562308BA-7D7D-40A4-BB40-4B95E4FD1A21}"/>
+              </a:ext>
+            </a:extLst>
+          </p:cNvPr>
+          <p:cNvSpPr>
+            <a:spLocks noGrp="1"/>
+          </p:cNvSpPr>
+          <p:nvPr>
+            <p:ph type="title"/>
+          </p:nvPr>
+        </p:nvSpPr>
+        <p:spPr>
+          <a:xfrm>
+            <a:off x="8013290" y="1041401"/>
+            <a:ext cx="3079006" cy="2345264"/>
+          </a:xfrm>
+        </p:spPr>
+        <p:txBody>
+          <a:bodyPr vert="horz" lIns="91440" tIns="45720" rIns="91440" bIns="45720" rtlCol="0" anchor="b">
+            <a:normAutofit/>
+          </a:bodyPr>
+          <a:lstStyle/>
+          <a:p>
+            <a:r>
+              <a:rPr lang="en-US" b="1">
+                <a:solidFill>
+                  <a:srgbClr val="262626"/>
+                </a:solidFill>
+              </a:rPr>
+              <a:t>Singleton</a:t>
+            </a:r>
+          </a:p>
+        </p:txBody>
+      </p:sp>
+    </p:spTree>
+    <p:extLst>
+      <p:ext uri="{BB962C8B-B14F-4D97-AF65-F5344CB8AC3E}">
+        <p14:creationId xmlns:p14="http://schemas.microsoft.com/office/powerpoint/2010/main" val="3841609833"/>
+      </p:ext>
+    </p:extLst>
+  </p:cSld>
+  <p:clrMapOvr>
+    <a:masterClrMapping/>
+  </p:clrMapOvr>
+  <p:transition spd="med">
+    <p:pull/>
+  </p:transition>
+</p:sld>
+</file>
+
+<file path=ppt/slides/slide13.xml><?xml version="1.0" encoding="utf-8"?>
+<p:sld xmlns:a="http://schemas.openxmlformats.org/drawingml/2006/main" xmlns:r="http://schemas.openxmlformats.org/officeDocument/2006/relationships" xmlns:p="http://schemas.openxmlformats.org/presentationml/2006/main">
+  <p:cSld>
+    <p:bg>
+      <p:bgPr>
+        <a:blipFill>
+          <a:blip r:embed="rId2">
+            <a:extLst/>
+          </a:blip>
+          <a:stretch/>
+        </a:blipFill>
+        <a:effectLst/>
+      </p:bgPr>
+    </p:bg>
+    <p:spTree>
+      <p:nvGrpSpPr>
+        <p:cNvPr id="1" name=""/>
+        <p:cNvGrpSpPr/>
+        <p:nvPr/>
+      </p:nvGrpSpPr>
+      <p:grpSpPr>
+        <a:xfrm>
+          <a:off x="0" y="0"/>
+          <a:ext cx="0" cy="0"/>
+          <a:chOff x="0" y="0"/>
+          <a:chExt cx="0" cy="0"/>
+        </a:xfrm>
+      </p:grpSpPr>
+      <p:grpSp>
+        <p:nvGrpSpPr>
+          <p:cNvPr id="78" name="Group 77">
+            <a:extLst>
+              <a:ext uri="{FF2B5EF4-FFF2-40B4-BE49-F238E27FC236}">
+                <a16:creationId xmlns:a16="http://schemas.microsoft.com/office/drawing/2014/main" id="{749C117F-F390-437B-ADB0-57E87EFF34F5}"/>
+              </a:ext>
+              <a:ext uri="{C183D7F6-B498-43B3-948B-1728B52AA6E4}">
+                <adec:decorative xmlns:adec="http://schemas.microsoft.com/office/drawing/2017/decorative" val="1"/>
+              </a:ext>
+            </a:extLst>
+          </p:cNvPr>
+          <p:cNvGrpSpPr>
+            <a:grpSpLocks noGrp="1" noUngrp="1" noRot="1" noChangeAspect="1" noMove="1" noResize="1"/>
+          </p:cNvGrpSpPr>
+          <p:nvPr>
+            <p:extLst>
+              <p:ext uri="{386F3935-93C4-4BCD-93E2-E3B085C9AB24}">
+                <p16:designElem xmlns:p16="http://schemas.microsoft.com/office/powerpoint/2015/main" val="1"/>
+              </p:ext>
+            </p:extLst>
+          </p:nvPr>
+        </p:nvGrpSpPr>
+        <p:grpSpPr>
+          <a:xfrm>
+            <a:off x="-16934" y="0"/>
+            <a:ext cx="12231160" cy="6856214"/>
+            <a:chOff x="-16934" y="0"/>
+            <a:chExt cx="12231160" cy="6856214"/>
+          </a:xfrm>
+        </p:grpSpPr>
+        <p:pic>
+          <p:nvPicPr>
+            <p:cNvPr id="79" name="Picture 78">
+              <a:extLst>
+                <a:ext uri="{FF2B5EF4-FFF2-40B4-BE49-F238E27FC236}">
+                  <a16:creationId xmlns:a16="http://schemas.microsoft.com/office/drawing/2014/main" id="{A7EF42F8-2417-49A6-95CE-DE9503B0AA66}"/>
+                </a:ext>
+                <a:ext uri="{C183D7F6-B498-43B3-948B-1728B52AA6E4}">
+                  <adec:decorative xmlns:adec="http://schemas.microsoft.com/office/drawing/2017/decorative" val="1"/>
+                </a:ext>
+              </a:extLst>
+            </p:cNvPr>
+            <p:cNvPicPr>
+              <a:picLocks noChangeAspect="1"/>
+            </p:cNvPicPr>
+            <p:nvPr>
+              <p:extLst>
+                <p:ext uri="{386F3935-93C4-4BCD-93E2-E3B085C9AB24}">
+                  <p16:designElem xmlns:p16="http://schemas.microsoft.com/office/powerpoint/2015/main" val="1"/>
+                </p:ext>
+              </p:extLst>
+            </p:nvPr>
+          </p:nvPicPr>
+          <p:blipFill>
+            <a:blip r:embed="rId3">
+              <a:extLst>
+                <a:ext uri="{28A0092B-C50C-407E-A947-70E740481C1C}">
+                  <a14:useLocalDpi xmlns:a14="http://schemas.microsoft.com/office/drawing/2010/main" val="0"/>
+                </a:ext>
+              </a:extLst>
+            </a:blip>
+            <a:stretch>
+              <a:fillRect/>
+            </a:stretch>
+          </p:blipFill>
+          <p:spPr>
+            <a:xfrm>
+              <a:off x="0" y="0"/>
+              <a:ext cx="12188825" cy="6856214"/>
+            </a:xfrm>
+            <a:prstGeom prst="rect">
+              <a:avLst/>
+            </a:prstGeom>
+          </p:spPr>
+        </p:pic>
+        <p:sp>
+          <p:nvSpPr>
+            <p:cNvPr id="80" name="Rectangle 79">
+              <a:extLst>
+                <a:ext uri="{FF2B5EF4-FFF2-40B4-BE49-F238E27FC236}">
+                  <a16:creationId xmlns:a16="http://schemas.microsoft.com/office/drawing/2014/main" id="{AC6F623B-2003-4AED-B02F-541A150EC143}"/>
+                </a:ext>
+                <a:ext uri="{C183D7F6-B498-43B3-948B-1728B52AA6E4}">
+                  <adec:decorative xmlns:adec="http://schemas.microsoft.com/office/drawing/2017/decorative" val="1"/>
+                </a:ext>
+              </a:extLst>
+            </p:cNvPr>
+            <p:cNvSpPr/>
+            <p:nvPr>
+              <p:extLst>
+                <p:ext uri="{386F3935-93C4-4BCD-93E2-E3B085C9AB24}">
+                  <p16:designElem xmlns:p16="http://schemas.microsoft.com/office/powerpoint/2015/main" val="1"/>
+                </p:ext>
+              </p:extLst>
+            </p:nvPr>
+          </p:nvSpPr>
+          <p:spPr>
+            <a:xfrm>
+              <a:off x="2328332" y="1540931"/>
+              <a:ext cx="7543802" cy="3835401"/>
+            </a:xfrm>
+            <a:prstGeom prst="rect">
+              <a:avLst/>
+            </a:prstGeom>
+            <a:noFill/>
+            <a:ln w="15875">
+              <a:miter lim="800000"/>
+            </a:ln>
+          </p:spPr>
+          <p:style>
+            <a:lnRef idx="1">
+              <a:schemeClr val="accent1"/>
+            </a:lnRef>
+            <a:fillRef idx="3">
+              <a:schemeClr val="accent1"/>
+            </a:fillRef>
+            <a:effectRef idx="2">
+              <a:schemeClr val="accent1"/>
+            </a:effectRef>
+            <a:fontRef idx="minor">
+              <a:schemeClr val="lt1"/>
+            </a:fontRef>
+          </p:style>
+        </p:sp>
+        <p:pic>
+          <p:nvPicPr>
+            <p:cNvPr id="81" name="Picture 80">
+              <a:extLst>
+                <a:ext uri="{FF2B5EF4-FFF2-40B4-BE49-F238E27FC236}">
+                  <a16:creationId xmlns:a16="http://schemas.microsoft.com/office/drawing/2014/main" id="{CD11837A-4F3D-419F-ACE2-E80B1EA2846F}"/>
+                </a:ext>
+                <a:ext uri="{C183D7F6-B498-43B3-948B-1728B52AA6E4}">
+                  <adec:decorative xmlns:adec="http://schemas.microsoft.com/office/drawing/2017/decorative" val="1"/>
+                </a:ext>
+              </a:extLst>
+            </p:cNvPr>
+            <p:cNvPicPr>
+              <a:picLocks noChangeAspect="1"/>
+            </p:cNvPicPr>
+            <p:nvPr>
+              <p:extLst>
+                <p:ext uri="{386F3935-93C4-4BCD-93E2-E3B085C9AB24}">
+                  <p16:designElem xmlns:p16="http://schemas.microsoft.com/office/powerpoint/2015/main" val="1"/>
+                </p:ext>
+              </p:extLst>
+            </p:nvPr>
+          </p:nvPicPr>
+          <p:blipFill rotWithShape="1">
+            <a:blip r:embed="rId4">
+              <a:extLst>
+                <a:ext uri="{28A0092B-C50C-407E-A947-70E740481C1C}">
+                  <a14:useLocalDpi xmlns:a14="http://schemas.microsoft.com/office/drawing/2010/main" val="0"/>
+                </a:ext>
+              </a:extLst>
+            </a:blip>
+            <a:srcRect/>
+            <a:stretch/>
+          </p:blipFill>
+          <p:spPr>
+            <a:xfrm>
+              <a:off x="-16934" y="3147609"/>
+              <a:ext cx="2478024" cy="612648"/>
+            </a:xfrm>
+            <a:prstGeom prst="rect">
+              <a:avLst/>
+            </a:prstGeom>
+          </p:spPr>
+        </p:pic>
+        <p:pic>
+          <p:nvPicPr>
+            <p:cNvPr id="82" name="Picture 81">
+              <a:extLst>
+                <a:ext uri="{FF2B5EF4-FFF2-40B4-BE49-F238E27FC236}">
+                  <a16:creationId xmlns:a16="http://schemas.microsoft.com/office/drawing/2014/main" id="{B9411D1A-7E2C-4A36-BE32-BF7A8E130723}"/>
+                </a:ext>
+                <a:ext uri="{C183D7F6-B498-43B3-948B-1728B52AA6E4}">
+                  <adec:decorative xmlns:adec="http://schemas.microsoft.com/office/drawing/2017/decorative" val="1"/>
+                </a:ext>
+              </a:extLst>
+            </p:cNvPr>
+            <p:cNvPicPr>
+              <a:picLocks noChangeAspect="1"/>
+            </p:cNvPicPr>
+            <p:nvPr>
+              <p:extLst>
+                <p:ext uri="{386F3935-93C4-4BCD-93E2-E3B085C9AB24}">
+                  <p16:designElem xmlns:p16="http://schemas.microsoft.com/office/powerpoint/2015/main" val="1"/>
+                </p:ext>
+              </p:extLst>
+            </p:nvPr>
+          </p:nvPicPr>
+          <p:blipFill rotWithShape="1">
+            <a:blip r:embed="rId4">
+              <a:extLst>
+                <a:ext uri="{28A0092B-C50C-407E-A947-70E740481C1C}">
+                  <a14:useLocalDpi xmlns:a14="http://schemas.microsoft.com/office/drawing/2010/main" val="0"/>
+                </a:ext>
+              </a:extLst>
+            </a:blip>
+            <a:srcRect/>
+            <a:stretch/>
+          </p:blipFill>
+          <p:spPr>
+            <a:xfrm>
+              <a:off x="9736202" y="3147609"/>
+              <a:ext cx="2478024" cy="612648"/>
+            </a:xfrm>
+            <a:prstGeom prst="rect">
+              <a:avLst/>
+            </a:prstGeom>
+          </p:spPr>
+        </p:pic>
+      </p:grpSp>
+      <p:cxnSp>
+        <p:nvCxnSpPr>
+          <p:cNvPr id="84" name="Straight Connector 83">
+            <a:extLst>
+              <a:ext uri="{FF2B5EF4-FFF2-40B4-BE49-F238E27FC236}">
+                <a16:creationId xmlns:a16="http://schemas.microsoft.com/office/drawing/2014/main" id="{20742BC3-654B-4E41-9A6A-73A42E477639}"/>
+              </a:ext>
+              <a:ext uri="{C183D7F6-B498-43B3-948B-1728B52AA6E4}">
+                <adec:decorative xmlns:adec="http://schemas.microsoft.com/office/drawing/2017/decorative" val="1"/>
+              </a:ext>
+            </a:extLst>
+          </p:cNvPr>
+          <p:cNvCxnSpPr>
+            <a:cxnSpLocks noGrp="1" noRot="1" noChangeAspect="1" noMove="1" noResize="1" noEditPoints="1" noAdjustHandles="1" noChangeArrowheads="1" noChangeShapeType="1"/>
+          </p:cNvCxnSpPr>
+          <p:nvPr>
+            <p:extLst>
+              <p:ext uri="{386F3935-93C4-4BCD-93E2-E3B085C9AB24}">
+                <p16:designElem xmlns:p16="http://schemas.microsoft.com/office/powerpoint/2015/main" val="1"/>
+              </p:ext>
+            </p:extLst>
+          </p:nvPr>
+        </p:nvCxnSpPr>
+        <p:spPr>
+          <a:xfrm>
+            <a:off x="2692399" y="3522131"/>
+            <a:ext cx="6815668" cy="0"/>
+          </a:xfrm>
+          <a:prstGeom prst="line">
+            <a:avLst/>
+          </a:prstGeom>
+        </p:spPr>
+        <p:style>
+          <a:lnRef idx="2">
+            <a:schemeClr val="accent1"/>
+          </a:lnRef>
+          <a:fillRef idx="0">
+            <a:schemeClr val="accent1"/>
+          </a:fillRef>
+          <a:effectRef idx="1">
+            <a:schemeClr val="accent1"/>
+          </a:effectRef>
+          <a:fontRef idx="minor">
+            <a:schemeClr val="tx1"/>
+          </a:fontRef>
+        </p:style>
+      </p:cxnSp>
+      <p:sp useBgFill="1">
+        <p:nvSpPr>
+          <p:cNvPr id="86" name="Rectangle 85">
+            <a:extLst>
+              <a:ext uri="{FF2B5EF4-FFF2-40B4-BE49-F238E27FC236}">
+                <a16:creationId xmlns:a16="http://schemas.microsoft.com/office/drawing/2014/main" id="{575E71FA-50BD-43F8-8C98-04339283A93D}"/>
+              </a:ext>
+              <a:ext uri="{C183D7F6-B498-43B3-948B-1728B52AA6E4}">
+                <adec:decorative xmlns:adec="http://schemas.microsoft.com/office/drawing/2017/decorative" val="1"/>
+              </a:ext>
+            </a:extLst>
+          </p:cNvPr>
+          <p:cNvSpPr>
+            <a:spLocks noGrp="1" noRot="1" noChangeAspect="1" noMove="1" noResize="1" noEditPoints="1" noAdjustHandles="1" noChangeArrowheads="1" noChangeShapeType="1" noTextEdit="1"/>
+          </p:cNvSpPr>
+          <p:nvPr>
+            <p:extLst>
+              <p:ext uri="{386F3935-93C4-4BCD-93E2-E3B085C9AB24}">
+                <p16:designElem xmlns:p16="http://schemas.microsoft.com/office/powerpoint/2015/main" val="1"/>
+              </p:ext>
+            </p:extLst>
+          </p:nvPr>
+        </p:nvSpPr>
+        <p:spPr>
+          <a:xfrm>
+            <a:off x="0" y="0"/>
+            <a:ext cx="12188952" cy="6858000"/>
+          </a:xfrm>
+          <a:prstGeom prst="rect">
+            <a:avLst/>
+          </a:prstGeom>
+          <a:ln>
+            <a:noFill/>
+          </a:ln>
+        </p:spPr>
+        <p:style>
+          <a:lnRef idx="2">
+            <a:schemeClr val="accent1">
+              <a:shade val="50000"/>
+            </a:schemeClr>
+          </a:lnRef>
+          <a:fillRef idx="1">
+            <a:schemeClr val="accent1"/>
+          </a:fillRef>
+          <a:effectRef idx="0">
+            <a:schemeClr val="accent1"/>
+          </a:effectRef>
+          <a:fontRef idx="minor">
+            <a:schemeClr val="lt1"/>
+          </a:fontRef>
+        </p:style>
+        <p:txBody>
+          <a:bodyPr rtlCol="0" anchor="ctr"/>
+          <a:lstStyle/>
+          <a:p>
+            <a:pPr algn="ctr"/>
+            <a:endParaRPr lang="en-US"/>
+          </a:p>
+        </p:txBody>
+      </p:sp>
+      <p:grpSp>
+        <p:nvGrpSpPr>
+          <p:cNvPr id="88" name="Group 87">
+            <a:extLst>
+              <a:ext uri="{FF2B5EF4-FFF2-40B4-BE49-F238E27FC236}">
+                <a16:creationId xmlns:a16="http://schemas.microsoft.com/office/drawing/2014/main" id="{CF1AA7F6-A589-4BC8-BC72-2CA6DC908398}"/>
+              </a:ext>
+              <a:ext uri="{C183D7F6-B498-43B3-948B-1728B52AA6E4}">
+                <adec:decorative xmlns:adec="http://schemas.microsoft.com/office/drawing/2017/decorative" val="1"/>
+              </a:ext>
+            </a:extLst>
+          </p:cNvPr>
+          <p:cNvGrpSpPr>
+            <a:grpSpLocks noGrp="1" noUngrp="1" noRot="1" noChangeAspect="1" noMove="1" noResize="1"/>
+          </p:cNvGrpSpPr>
+          <p:nvPr>
+            <p:extLst>
+              <p:ext uri="{386F3935-93C4-4BCD-93E2-E3B085C9AB24}">
+                <p16:designElem xmlns:p16="http://schemas.microsoft.com/office/powerpoint/2015/main" val="1"/>
+              </p:ext>
+            </p:extLst>
+          </p:nvPr>
+        </p:nvGrpSpPr>
+        <p:grpSpPr>
+          <a:xfrm>
+            <a:off x="-15736" y="0"/>
+            <a:ext cx="12229962" cy="6856214"/>
+            <a:chOff x="-15736" y="0"/>
+            <a:chExt cx="12229962" cy="6856214"/>
+          </a:xfrm>
+        </p:grpSpPr>
+        <p:pic>
+          <p:nvPicPr>
+            <p:cNvPr id="89" name="Picture 88">
+              <a:extLst>
+                <a:ext uri="{FF2B5EF4-FFF2-40B4-BE49-F238E27FC236}">
+                  <a16:creationId xmlns:a16="http://schemas.microsoft.com/office/drawing/2014/main" id="{53F5243F-7E41-439E-8991-C4F246D88F68}"/>
+                </a:ext>
+                <a:ext uri="{C183D7F6-B498-43B3-948B-1728B52AA6E4}">
+                  <adec:decorative xmlns:adec="http://schemas.microsoft.com/office/drawing/2017/decorative" val="1"/>
+                </a:ext>
+              </a:extLst>
+            </p:cNvPr>
+            <p:cNvPicPr>
+              <a:picLocks noChangeAspect="1"/>
+            </p:cNvPicPr>
+            <p:nvPr>
+              <p:extLst>
+                <p:ext uri="{386F3935-93C4-4BCD-93E2-E3B085C9AB24}">
+                  <p16:designElem xmlns:p16="http://schemas.microsoft.com/office/powerpoint/2015/main" val="1"/>
+                </p:ext>
+              </p:extLst>
+            </p:nvPr>
+          </p:nvPicPr>
+          <p:blipFill>
+            <a:blip r:embed="rId5">
+              <a:extLst>
+                <a:ext uri="{28A0092B-C50C-407E-A947-70E740481C1C}">
+                  <a14:useLocalDpi xmlns:a14="http://schemas.microsoft.com/office/drawing/2010/main" val="0"/>
+                </a:ext>
+              </a:extLst>
+            </a:blip>
+            <a:stretch>
+              <a:fillRect/>
+            </a:stretch>
+          </p:blipFill>
+          <p:spPr>
+            <a:xfrm>
+              <a:off x="0" y="0"/>
+              <a:ext cx="12188825" cy="6856214"/>
+            </a:xfrm>
+            <a:prstGeom prst="rect">
+              <a:avLst/>
+            </a:prstGeom>
+          </p:spPr>
+        </p:pic>
+        <p:sp>
+          <p:nvSpPr>
+            <p:cNvPr id="90" name="Rectangle 89">
+              <a:extLst>
+                <a:ext uri="{FF2B5EF4-FFF2-40B4-BE49-F238E27FC236}">
+                  <a16:creationId xmlns:a16="http://schemas.microsoft.com/office/drawing/2014/main" id="{401A6B5F-1CF1-43AD-9E85-94E187210CFC}"/>
+                </a:ext>
+                <a:ext uri="{C183D7F6-B498-43B3-948B-1728B52AA6E4}">
+                  <adec:decorative xmlns:adec="http://schemas.microsoft.com/office/drawing/2017/decorative" val="1"/>
+                </a:ext>
+              </a:extLst>
+            </p:cNvPr>
+            <p:cNvSpPr/>
+            <p:nvPr>
+              <p:extLst>
+                <p:ext uri="{386F3935-93C4-4BCD-93E2-E3B085C9AB24}">
+                  <p16:designElem xmlns:p16="http://schemas.microsoft.com/office/powerpoint/2015/main" val="1"/>
+                </p:ext>
+              </p:extLst>
+            </p:nvPr>
+          </p:nvSpPr>
+          <p:spPr>
+            <a:xfrm>
+              <a:off x="608012" y="609600"/>
+              <a:ext cx="10972800" cy="5638800"/>
+            </a:xfrm>
+            <a:prstGeom prst="rect">
+              <a:avLst/>
+            </a:prstGeom>
+            <a:noFill/>
+            <a:ln w="15875" cap="flat">
+              <a:miter lim="800000"/>
+            </a:ln>
+          </p:spPr>
+          <p:style>
+            <a:lnRef idx="1">
+              <a:schemeClr val="accent1"/>
+            </a:lnRef>
+            <a:fillRef idx="3">
+              <a:schemeClr val="accent1"/>
+            </a:fillRef>
+            <a:effectRef idx="2">
+              <a:schemeClr val="accent1"/>
+            </a:effectRef>
+            <a:fontRef idx="minor">
+              <a:schemeClr val="lt1"/>
+            </a:fontRef>
+          </p:style>
+        </p:sp>
+        <p:pic>
+          <p:nvPicPr>
+            <p:cNvPr id="91" name="Picture 90">
+              <a:extLst>
+                <a:ext uri="{FF2B5EF4-FFF2-40B4-BE49-F238E27FC236}">
+                  <a16:creationId xmlns:a16="http://schemas.microsoft.com/office/drawing/2014/main" id="{2F682A59-7E20-407C-A7F8-582295AC687C}"/>
+                </a:ext>
+                <a:ext uri="{C183D7F6-B498-43B3-948B-1728B52AA6E4}">
+                  <adec:decorative xmlns:adec="http://schemas.microsoft.com/office/drawing/2017/decorative" val="1"/>
+                </a:ext>
+              </a:extLst>
+            </p:cNvPr>
+            <p:cNvPicPr>
+              <a:picLocks noChangeAspect="1"/>
+            </p:cNvPicPr>
+            <p:nvPr>
+              <p:extLst>
+                <p:ext uri="{386F3935-93C4-4BCD-93E2-E3B085C9AB24}">
+                  <p16:designElem xmlns:p16="http://schemas.microsoft.com/office/powerpoint/2015/main" val="1"/>
+                </p:ext>
+              </p:extLst>
+            </p:nvPr>
+          </p:nvPicPr>
+          <p:blipFill rotWithShape="1">
+            <a:blip r:embed="rId6">
+              <a:extLst>
+                <a:ext uri="{28A0092B-C50C-407E-A947-70E740481C1C}">
+                  <a14:useLocalDpi xmlns:a14="http://schemas.microsoft.com/office/drawing/2010/main" val="0"/>
+                </a:ext>
+              </a:extLst>
+            </a:blip>
+            <a:srcRect/>
+            <a:stretch/>
+          </p:blipFill>
+          <p:spPr>
+            <a:xfrm>
+              <a:off x="-15736" y="3153832"/>
+              <a:ext cx="777240" cy="606425"/>
+            </a:xfrm>
+            <a:prstGeom prst="rect">
+              <a:avLst/>
+            </a:prstGeom>
+          </p:spPr>
+        </p:pic>
+        <p:pic>
+          <p:nvPicPr>
+            <p:cNvPr id="92" name="Picture 91">
+              <a:extLst>
+                <a:ext uri="{FF2B5EF4-FFF2-40B4-BE49-F238E27FC236}">
+                  <a16:creationId xmlns:a16="http://schemas.microsoft.com/office/drawing/2014/main" id="{5E4AC24E-0670-406E-822F-AAA6DA2010D3}"/>
+                </a:ext>
+                <a:ext uri="{C183D7F6-B498-43B3-948B-1728B52AA6E4}">
+                  <adec:decorative xmlns:adec="http://schemas.microsoft.com/office/drawing/2017/decorative" val="1"/>
+                </a:ext>
+              </a:extLst>
+            </p:cNvPr>
+            <p:cNvPicPr>
+              <a:picLocks noChangeAspect="1"/>
+            </p:cNvPicPr>
+            <p:nvPr>
+              <p:extLst>
+                <p:ext uri="{386F3935-93C4-4BCD-93E2-E3B085C9AB24}">
+                  <p16:designElem xmlns:p16="http://schemas.microsoft.com/office/powerpoint/2015/main" val="1"/>
+                </p:ext>
+              </p:extLst>
+            </p:nvPr>
+          </p:nvPicPr>
+          <p:blipFill rotWithShape="1">
+            <a:blip r:embed="rId6">
+              <a:extLst>
+                <a:ext uri="{28A0092B-C50C-407E-A947-70E740481C1C}">
+                  <a14:useLocalDpi xmlns:a14="http://schemas.microsoft.com/office/drawing/2010/main" val="0"/>
+                </a:ext>
+              </a:extLst>
+            </a:blip>
+            <a:srcRect/>
+            <a:stretch/>
+          </p:blipFill>
+          <p:spPr>
+            <a:xfrm>
+              <a:off x="11436986" y="3153832"/>
+              <a:ext cx="777240" cy="606425"/>
+            </a:xfrm>
+            <a:prstGeom prst="rect">
+              <a:avLst/>
+            </a:prstGeom>
+          </p:spPr>
+        </p:pic>
+      </p:grpSp>
+      <p:sp>
+        <p:nvSpPr>
+          <p:cNvPr id="94" name="Rectangle 93">
+            <a:extLst>
+              <a:ext uri="{FF2B5EF4-FFF2-40B4-BE49-F238E27FC236}">
+                <a16:creationId xmlns:a16="http://schemas.microsoft.com/office/drawing/2014/main" id="{E89B1776-F953-4C0F-8E85-E9C66B1EF003}"/>
+              </a:ext>
+              <a:ext uri="{C183D7F6-B498-43B3-948B-1728B52AA6E4}">
+                <adec:decorative xmlns:adec="http://schemas.microsoft.com/office/drawing/2017/decorative" val="1"/>
+              </a:ext>
+            </a:extLst>
+          </p:cNvPr>
+          <p:cNvSpPr>
+            <a:spLocks noGrp="1" noRot="1" noChangeAspect="1" noMove="1" noResize="1" noEditPoints="1" noAdjustHandles="1" noChangeArrowheads="1" noChangeShapeType="1" noTextEdit="1"/>
+          </p:cNvSpPr>
+          <p:nvPr>
+            <p:extLst>
+              <p:ext uri="{386F3935-93C4-4BCD-93E2-E3B085C9AB24}">
+                <p16:designElem xmlns:p16="http://schemas.microsoft.com/office/powerpoint/2015/main" val="1"/>
+              </p:ext>
+            </p:extLst>
+          </p:nvPr>
+        </p:nvSpPr>
+        <p:spPr>
+          <a:xfrm>
+            <a:off x="1092644" y="1092200"/>
+            <a:ext cx="6432130" cy="4515104"/>
+          </a:xfrm>
+          <a:prstGeom prst="rect">
+            <a:avLst/>
+          </a:prstGeom>
+          <a:solidFill>
+            <a:schemeClr val="bg1"/>
+          </a:solidFill>
+          <a:ln w="57150" cmpd="thickThin">
+            <a:solidFill>
+              <a:schemeClr val="tx1">
+                <a:lumMod val="50000"/>
+                <a:lumOff val="50000"/>
+              </a:schemeClr>
+            </a:solidFill>
+            <a:miter lim="800000"/>
+          </a:ln>
+        </p:spPr>
+        <p:style>
+          <a:lnRef idx="2">
+            <a:schemeClr val="accent1">
+              <a:shade val="50000"/>
+            </a:schemeClr>
+          </a:lnRef>
+          <a:fillRef idx="1">
+            <a:schemeClr val="accent1"/>
+          </a:fillRef>
+          <a:effectRef idx="0">
+            <a:schemeClr val="accent1"/>
+          </a:effectRef>
+          <a:fontRef idx="minor">
+            <a:schemeClr val="lt1"/>
+          </a:fontRef>
+        </p:style>
+        <p:txBody>
+          <a:bodyPr rtlCol="0" anchor="ctr"/>
+          <a:lstStyle/>
+          <a:p>
+            <a:pPr algn="ctr"/>
+            <a:endParaRPr lang="en-US"/>
+          </a:p>
+        </p:txBody>
+      </p:sp>
+      <p:pic>
+        <p:nvPicPr>
+          <p:cNvPr id="18" name="Billede 17" descr="Et billede, der indeholder skærmbillede&#10;&#10;Beskrivelse, der er oprettet med høj sikkerhed">
+            <a:extLst>
+              <a:ext uri="{FF2B5EF4-FFF2-40B4-BE49-F238E27FC236}">
+                <a16:creationId xmlns:a16="http://schemas.microsoft.com/office/drawing/2014/main" id="{18CF91A7-D7EB-4D60-8A27-ECAFC4C924F4}"/>
+              </a:ext>
+            </a:extLst>
+          </p:cNvPr>
+          <p:cNvPicPr>
+            <a:picLocks noChangeAspect="1"/>
+          </p:cNvPicPr>
+          <p:nvPr/>
+        </p:nvPicPr>
+        <p:blipFill>
+          <a:blip r:embed="rId7">
+            <a:extLst>
+              <a:ext uri="{28A0092B-C50C-407E-A947-70E740481C1C}">
+                <a14:useLocalDpi xmlns:a14="http://schemas.microsoft.com/office/drawing/2010/main" val="0"/>
+              </a:ext>
+            </a:extLst>
+          </a:blip>
+          <a:stretch>
+            <a:fillRect/>
+          </a:stretch>
+        </p:blipFill>
+        <p:spPr>
+          <a:xfrm>
+            <a:off x="1246137" y="1250696"/>
+            <a:ext cx="6159140" cy="4311989"/>
+          </a:xfrm>
+          <a:prstGeom prst="rect">
+            <a:avLst/>
+          </a:prstGeom>
+        </p:spPr>
+      </p:pic>
+      <p:cxnSp>
+        <p:nvCxnSpPr>
+          <p:cNvPr id="96" name="Straight Connector 95">
+            <a:extLst>
+              <a:ext uri="{FF2B5EF4-FFF2-40B4-BE49-F238E27FC236}">
+                <a16:creationId xmlns:a16="http://schemas.microsoft.com/office/drawing/2014/main" id="{997356D0-D934-42B9-8291-DF34A3AC0CFE}"/>
+              </a:ext>
+              <a:ext uri="{C183D7F6-B498-43B3-948B-1728B52AA6E4}">
+                <adec:decorative xmlns:adec="http://schemas.microsoft.com/office/drawing/2017/decorative" val="1"/>
+              </a:ext>
+            </a:extLst>
+          </p:cNvPr>
+          <p:cNvCxnSpPr>
+            <a:cxnSpLocks noGrp="1" noRot="1" noChangeAspect="1" noMove="1" noResize="1" noEditPoints="1" noAdjustHandles="1" noChangeArrowheads="1" noChangeShapeType="1"/>
+          </p:cNvCxnSpPr>
+          <p:nvPr>
+            <p:extLst>
+              <p:ext uri="{386F3935-93C4-4BCD-93E2-E3B085C9AB24}">
+                <p16:designElem xmlns:p16="http://schemas.microsoft.com/office/powerpoint/2015/main" val="1"/>
+              </p:ext>
+            </p:extLst>
+          </p:nvPr>
+        </p:nvCxnSpPr>
+        <p:spPr>
+          <a:xfrm>
+            <a:off x="7999431" y="3509772"/>
+            <a:ext cx="3074977" cy="12359"/>
+          </a:xfrm>
+          <a:prstGeom prst="line">
+            <a:avLst/>
+          </a:prstGeom>
+        </p:spPr>
+        <p:style>
+          <a:lnRef idx="2">
+            <a:schemeClr val="accent1"/>
+          </a:lnRef>
+          <a:fillRef idx="0">
+            <a:schemeClr val="accent1"/>
+          </a:fillRef>
+          <a:effectRef idx="1">
+            <a:schemeClr val="accent1"/>
+          </a:effectRef>
+          <a:fontRef idx="minor">
+            <a:schemeClr val="tx1"/>
+          </a:fontRef>
+        </p:style>
+      </p:cxnSp>
+      <p:sp>
+        <p:nvSpPr>
+          <p:cNvPr id="2" name="Title 1">
+            <a:extLst>
+              <a:ext uri="{FF2B5EF4-FFF2-40B4-BE49-F238E27FC236}">
+                <a16:creationId xmlns:a16="http://schemas.microsoft.com/office/drawing/2014/main" id="{13438430-C715-4EE2-BFA8-D9B41F760649}"/>
+              </a:ext>
+            </a:extLst>
+          </p:cNvPr>
+          <p:cNvSpPr>
+            <a:spLocks noGrp="1"/>
+          </p:cNvSpPr>
+          <p:nvPr>
+            <p:ph type="title"/>
+          </p:nvPr>
+        </p:nvSpPr>
+        <p:spPr>
+          <a:xfrm>
+            <a:off x="8013290" y="1041401"/>
+            <a:ext cx="3079006" cy="2345264"/>
+          </a:xfrm>
+        </p:spPr>
+        <p:txBody>
+          <a:bodyPr vert="horz" lIns="91440" tIns="45720" rIns="91440" bIns="45720" rtlCol="0" anchor="b">
+            <a:normAutofit/>
+          </a:bodyPr>
+          <a:lstStyle/>
+          <a:p>
+            <a:r>
+              <a:rPr lang="en-US" b="1">
+                <a:solidFill>
+                  <a:srgbClr val="262626"/>
+                </a:solidFill>
+              </a:rPr>
+              <a:t>Facade</a:t>
+            </a:r>
+          </a:p>
+        </p:txBody>
+      </p:sp>
+    </p:spTree>
+    <p:extLst>
+      <p:ext uri="{BB962C8B-B14F-4D97-AF65-F5344CB8AC3E}">
+        <p14:creationId xmlns:p14="http://schemas.microsoft.com/office/powerpoint/2010/main" val="732939086"/>
+      </p:ext>
+    </p:extLst>
+  </p:cSld>
+  <p:clrMapOvr>
+    <a:masterClrMapping/>
+  </p:clrMapOvr>
+  <p:transition spd="med">
+    <p:pull/>
+  </p:transition>
+</p:sld>
+</file>
+
+<file path=ppt/slides/slide14.xml><?xml version="1.0" encoding="utf-8"?>
+<p:sld xmlns:a="http://schemas.openxmlformats.org/drawingml/2006/main" xmlns:r="http://schemas.openxmlformats.org/officeDocument/2006/relationships" xmlns:p="http://schemas.openxmlformats.org/presentationml/2006/main">
+  <p:cSld>
+    <p:bg>
+      <p:bgPr>
+        <a:blipFill>
+          <a:blip r:embed="rId2">
+            <a:extLst/>
+          </a:blip>
+          <a:stretch/>
+        </a:blipFill>
+        <a:effectLst/>
+      </p:bgPr>
+    </p:bg>
+    <p:spTree>
+      <p:nvGrpSpPr>
+        <p:cNvPr id="1" name=""/>
+        <p:cNvGrpSpPr/>
+        <p:nvPr/>
+      </p:nvGrpSpPr>
+      <p:grpSpPr>
+        <a:xfrm>
+          <a:off x="0" y="0"/>
+          <a:ext cx="0" cy="0"/>
+          <a:chOff x="0" y="0"/>
+          <a:chExt cx="0" cy="0"/>
+        </a:xfrm>
+      </p:grpSpPr>
+      <p:grpSp>
+        <p:nvGrpSpPr>
+          <p:cNvPr id="32" name="Group 31">
+            <a:extLst>
+              <a:ext uri="{FF2B5EF4-FFF2-40B4-BE49-F238E27FC236}">
+                <a16:creationId xmlns:a16="http://schemas.microsoft.com/office/drawing/2014/main" id="{749C117F-F390-437B-ADB0-57E87EFF34F5}"/>
+              </a:ext>
+              <a:ext uri="{C183D7F6-B498-43B3-948B-1728B52AA6E4}">
+                <adec:decorative xmlns:adec="http://schemas.microsoft.com/office/drawing/2017/decorative" val="1"/>
+              </a:ext>
+            </a:extLst>
+          </p:cNvPr>
+          <p:cNvGrpSpPr>
+            <a:grpSpLocks noGrp="1" noUngrp="1" noRot="1" noChangeAspect="1" noMove="1" noResize="1"/>
+          </p:cNvGrpSpPr>
+          <p:nvPr>
+            <p:extLst>
+              <p:ext uri="{386F3935-93C4-4BCD-93E2-E3B085C9AB24}">
+                <p16:designElem xmlns:p16="http://schemas.microsoft.com/office/powerpoint/2015/main" val="1"/>
+              </p:ext>
+            </p:extLst>
+          </p:nvPr>
+        </p:nvGrpSpPr>
+        <p:grpSpPr>
+          <a:xfrm>
+            <a:off x="-16934" y="0"/>
+            <a:ext cx="12231160" cy="6856214"/>
+            <a:chOff x="-16934" y="0"/>
+            <a:chExt cx="12231160" cy="6856214"/>
+          </a:xfrm>
+        </p:grpSpPr>
+        <p:pic>
+          <p:nvPicPr>
+            <p:cNvPr id="33" name="Picture 32">
+              <a:extLst>
+                <a:ext uri="{FF2B5EF4-FFF2-40B4-BE49-F238E27FC236}">
+                  <a16:creationId xmlns:a16="http://schemas.microsoft.com/office/drawing/2014/main" id="{A7EF42F8-2417-49A6-95CE-DE9503B0AA66}"/>
+                </a:ext>
+                <a:ext uri="{C183D7F6-B498-43B3-948B-1728B52AA6E4}">
+                  <adec:decorative xmlns:adec="http://schemas.microsoft.com/office/drawing/2017/decorative" val="1"/>
+                </a:ext>
+              </a:extLst>
+            </p:cNvPr>
+            <p:cNvPicPr>
+              <a:picLocks noChangeAspect="1"/>
+            </p:cNvPicPr>
+            <p:nvPr>
+              <p:extLst>
+                <p:ext uri="{386F3935-93C4-4BCD-93E2-E3B085C9AB24}">
+                  <p16:designElem xmlns:p16="http://schemas.microsoft.com/office/powerpoint/2015/main" val="1"/>
+                </p:ext>
+              </p:extLst>
+            </p:nvPr>
+          </p:nvPicPr>
+          <p:blipFill>
+            <a:blip r:embed="rId3">
+              <a:extLst>
+                <a:ext uri="{28A0092B-C50C-407E-A947-70E740481C1C}">
+                  <a14:useLocalDpi xmlns:a14="http://schemas.microsoft.com/office/drawing/2010/main" val="0"/>
+                </a:ext>
+              </a:extLst>
+            </a:blip>
+            <a:stretch>
+              <a:fillRect/>
+            </a:stretch>
+          </p:blipFill>
+          <p:spPr>
+            <a:xfrm>
+              <a:off x="0" y="0"/>
+              <a:ext cx="12188825" cy="6856214"/>
+            </a:xfrm>
+            <a:prstGeom prst="rect">
+              <a:avLst/>
+            </a:prstGeom>
+          </p:spPr>
+        </p:pic>
+        <p:sp>
+          <p:nvSpPr>
+            <p:cNvPr id="34" name="Rectangle 33">
+              <a:extLst>
+                <a:ext uri="{FF2B5EF4-FFF2-40B4-BE49-F238E27FC236}">
+                  <a16:creationId xmlns:a16="http://schemas.microsoft.com/office/drawing/2014/main" id="{AC6F623B-2003-4AED-B02F-541A150EC143}"/>
+                </a:ext>
+                <a:ext uri="{C183D7F6-B498-43B3-948B-1728B52AA6E4}">
+                  <adec:decorative xmlns:adec="http://schemas.microsoft.com/office/drawing/2017/decorative" val="1"/>
+                </a:ext>
+              </a:extLst>
+            </p:cNvPr>
+            <p:cNvSpPr/>
+            <p:nvPr>
+              <p:extLst>
+                <p:ext uri="{386F3935-93C4-4BCD-93E2-E3B085C9AB24}">
+                  <p16:designElem xmlns:p16="http://schemas.microsoft.com/office/powerpoint/2015/main" val="1"/>
+                </p:ext>
+              </p:extLst>
+            </p:nvPr>
+          </p:nvSpPr>
+          <p:spPr>
+            <a:xfrm>
+              <a:off x="2328332" y="1540931"/>
+              <a:ext cx="7543802" cy="3835401"/>
+            </a:xfrm>
+            <a:prstGeom prst="rect">
+              <a:avLst/>
+            </a:prstGeom>
+            <a:noFill/>
+            <a:ln w="15875">
+              <a:miter lim="800000"/>
+            </a:ln>
+          </p:spPr>
+          <p:style>
+            <a:lnRef idx="1">
+              <a:schemeClr val="accent1"/>
+            </a:lnRef>
+            <a:fillRef idx="3">
+              <a:schemeClr val="accent1"/>
+            </a:fillRef>
+            <a:effectRef idx="2">
+              <a:schemeClr val="accent1"/>
+            </a:effectRef>
+            <a:fontRef idx="minor">
+              <a:schemeClr val="lt1"/>
+            </a:fontRef>
+          </p:style>
+        </p:sp>
+        <p:pic>
+          <p:nvPicPr>
+            <p:cNvPr id="35" name="Picture 34">
+              <a:extLst>
+                <a:ext uri="{FF2B5EF4-FFF2-40B4-BE49-F238E27FC236}">
+                  <a16:creationId xmlns:a16="http://schemas.microsoft.com/office/drawing/2014/main" id="{CD11837A-4F3D-419F-ACE2-E80B1EA2846F}"/>
+                </a:ext>
+                <a:ext uri="{C183D7F6-B498-43B3-948B-1728B52AA6E4}">
+                  <adec:decorative xmlns:adec="http://schemas.microsoft.com/office/drawing/2017/decorative" val="1"/>
+                </a:ext>
+              </a:extLst>
+            </p:cNvPr>
+            <p:cNvPicPr>
+              <a:picLocks noChangeAspect="1"/>
+            </p:cNvPicPr>
+            <p:nvPr>
+              <p:extLst>
+                <p:ext uri="{386F3935-93C4-4BCD-93E2-E3B085C9AB24}">
+                  <p16:designElem xmlns:p16="http://schemas.microsoft.com/office/powerpoint/2015/main" val="1"/>
+                </p:ext>
+              </p:extLst>
+            </p:nvPr>
+          </p:nvPicPr>
+          <p:blipFill rotWithShape="1">
+            <a:blip r:embed="rId4">
+              <a:extLst>
+                <a:ext uri="{28A0092B-C50C-407E-A947-70E740481C1C}">
+                  <a14:useLocalDpi xmlns:a14="http://schemas.microsoft.com/office/drawing/2010/main" val="0"/>
+                </a:ext>
+              </a:extLst>
+            </a:blip>
+            <a:srcRect/>
+            <a:stretch/>
+          </p:blipFill>
+          <p:spPr>
+            <a:xfrm>
+              <a:off x="-16934" y="3147609"/>
+              <a:ext cx="2478024" cy="612648"/>
+            </a:xfrm>
+            <a:prstGeom prst="rect">
+              <a:avLst/>
+            </a:prstGeom>
+          </p:spPr>
+        </p:pic>
+        <p:pic>
+          <p:nvPicPr>
+            <p:cNvPr id="36" name="Picture 35">
+              <a:extLst>
+                <a:ext uri="{FF2B5EF4-FFF2-40B4-BE49-F238E27FC236}">
+                  <a16:creationId xmlns:a16="http://schemas.microsoft.com/office/drawing/2014/main" id="{B9411D1A-7E2C-4A36-BE32-BF7A8E130723}"/>
+                </a:ext>
+                <a:ext uri="{C183D7F6-B498-43B3-948B-1728B52AA6E4}">
+                  <adec:decorative xmlns:adec="http://schemas.microsoft.com/office/drawing/2017/decorative" val="1"/>
+                </a:ext>
+              </a:extLst>
+            </p:cNvPr>
+            <p:cNvPicPr>
+              <a:picLocks noChangeAspect="1"/>
+            </p:cNvPicPr>
+            <p:nvPr>
+              <p:extLst>
+                <p:ext uri="{386F3935-93C4-4BCD-93E2-E3B085C9AB24}">
+                  <p16:designElem xmlns:p16="http://schemas.microsoft.com/office/powerpoint/2015/main" val="1"/>
+                </p:ext>
+              </p:extLst>
+            </p:nvPr>
+          </p:nvPicPr>
+          <p:blipFill rotWithShape="1">
+            <a:blip r:embed="rId4">
+              <a:extLst>
+                <a:ext uri="{28A0092B-C50C-407E-A947-70E740481C1C}">
+                  <a14:useLocalDpi xmlns:a14="http://schemas.microsoft.com/office/drawing/2010/main" val="0"/>
+                </a:ext>
+              </a:extLst>
+            </a:blip>
+            <a:srcRect/>
+            <a:stretch/>
+          </p:blipFill>
+          <p:spPr>
+            <a:xfrm>
+              <a:off x="9736202" y="3147609"/>
+              <a:ext cx="2478024" cy="612648"/>
+            </a:xfrm>
+            <a:prstGeom prst="rect">
+              <a:avLst/>
+            </a:prstGeom>
+          </p:spPr>
+        </p:pic>
+      </p:grpSp>
+      <p:cxnSp>
+        <p:nvCxnSpPr>
+          <p:cNvPr id="38" name="Straight Connector 37">
+            <a:extLst>
+              <a:ext uri="{FF2B5EF4-FFF2-40B4-BE49-F238E27FC236}">
+                <a16:creationId xmlns:a16="http://schemas.microsoft.com/office/drawing/2014/main" id="{20742BC3-654B-4E41-9A6A-73A42E477639}"/>
+              </a:ext>
+              <a:ext uri="{C183D7F6-B498-43B3-948B-1728B52AA6E4}">
+                <adec:decorative xmlns:adec="http://schemas.microsoft.com/office/drawing/2017/decorative" val="1"/>
+              </a:ext>
+            </a:extLst>
+          </p:cNvPr>
+          <p:cNvCxnSpPr>
+            <a:cxnSpLocks noGrp="1" noRot="1" noChangeAspect="1" noMove="1" noResize="1" noEditPoints="1" noAdjustHandles="1" noChangeArrowheads="1" noChangeShapeType="1"/>
+          </p:cNvCxnSpPr>
+          <p:nvPr>
+            <p:extLst>
+              <p:ext uri="{386F3935-93C4-4BCD-93E2-E3B085C9AB24}">
+                <p16:designElem xmlns:p16="http://schemas.microsoft.com/office/powerpoint/2015/main" val="1"/>
+              </p:ext>
+            </p:extLst>
+          </p:nvPr>
+        </p:nvCxnSpPr>
+        <p:spPr>
+          <a:xfrm>
+            <a:off x="2692399" y="3522131"/>
+            <a:ext cx="6815668" cy="0"/>
+          </a:xfrm>
+          <a:prstGeom prst="line">
+            <a:avLst/>
+          </a:prstGeom>
+        </p:spPr>
+        <p:style>
+          <a:lnRef idx="2">
+            <a:schemeClr val="accent1"/>
+          </a:lnRef>
+          <a:fillRef idx="0">
+            <a:schemeClr val="accent1"/>
+          </a:fillRef>
+          <a:effectRef idx="1">
+            <a:schemeClr val="accent1"/>
+          </a:effectRef>
+          <a:fontRef idx="minor">
+            <a:schemeClr val="tx1"/>
+          </a:fontRef>
+        </p:style>
+      </p:cxnSp>
+      <p:sp useBgFill="1">
+        <p:nvSpPr>
+          <p:cNvPr id="40" name="Rectangle 39">
+            <a:extLst>
+              <a:ext uri="{FF2B5EF4-FFF2-40B4-BE49-F238E27FC236}">
+                <a16:creationId xmlns:a16="http://schemas.microsoft.com/office/drawing/2014/main" id="{575E71FA-50BD-43F8-8C98-04339283A93D}"/>
+              </a:ext>
+              <a:ext uri="{C183D7F6-B498-43B3-948B-1728B52AA6E4}">
+                <adec:decorative xmlns:adec="http://schemas.microsoft.com/office/drawing/2017/decorative" val="1"/>
+              </a:ext>
+            </a:extLst>
+          </p:cNvPr>
+          <p:cNvSpPr>
+            <a:spLocks noGrp="1" noRot="1" noChangeAspect="1" noMove="1" noResize="1" noEditPoints="1" noAdjustHandles="1" noChangeArrowheads="1" noChangeShapeType="1" noTextEdit="1"/>
+          </p:cNvSpPr>
+          <p:nvPr>
+            <p:extLst>
+              <p:ext uri="{386F3935-93C4-4BCD-93E2-E3B085C9AB24}">
+                <p16:designElem xmlns:p16="http://schemas.microsoft.com/office/powerpoint/2015/main" val="1"/>
+              </p:ext>
+            </p:extLst>
+          </p:nvPr>
+        </p:nvSpPr>
+        <p:spPr>
+          <a:xfrm>
+            <a:off x="0" y="0"/>
+            <a:ext cx="12188952" cy="6858000"/>
+          </a:xfrm>
+          <a:prstGeom prst="rect">
+            <a:avLst/>
+          </a:prstGeom>
+          <a:ln>
+            <a:noFill/>
+          </a:ln>
+        </p:spPr>
+        <p:style>
+          <a:lnRef idx="2">
+            <a:schemeClr val="accent1">
+              <a:shade val="50000"/>
+            </a:schemeClr>
+          </a:lnRef>
+          <a:fillRef idx="1">
+            <a:schemeClr val="accent1"/>
+          </a:fillRef>
+          <a:effectRef idx="0">
+            <a:schemeClr val="accent1"/>
+          </a:effectRef>
+          <a:fontRef idx="minor">
+            <a:schemeClr val="lt1"/>
+          </a:fontRef>
+        </p:style>
+        <p:txBody>
+          <a:bodyPr rtlCol="0" anchor="ctr"/>
+          <a:lstStyle/>
+          <a:p>
+            <a:pPr algn="ctr"/>
+            <a:endParaRPr lang="en-US"/>
+          </a:p>
+        </p:txBody>
+      </p:sp>
+      <p:grpSp>
+        <p:nvGrpSpPr>
+          <p:cNvPr id="42" name="Group 41">
+            <a:extLst>
+              <a:ext uri="{FF2B5EF4-FFF2-40B4-BE49-F238E27FC236}">
+                <a16:creationId xmlns:a16="http://schemas.microsoft.com/office/drawing/2014/main" id="{CF1AA7F6-A589-4BC8-BC72-2CA6DC908398}"/>
+              </a:ext>
+              <a:ext uri="{C183D7F6-B498-43B3-948B-1728B52AA6E4}">
+                <adec:decorative xmlns:adec="http://schemas.microsoft.com/office/drawing/2017/decorative" val="1"/>
+              </a:ext>
+            </a:extLst>
+          </p:cNvPr>
+          <p:cNvGrpSpPr>
+            <a:grpSpLocks noGrp="1" noUngrp="1" noRot="1" noChangeAspect="1" noMove="1" noResize="1"/>
+          </p:cNvGrpSpPr>
+          <p:nvPr>
+            <p:extLst>
+              <p:ext uri="{386F3935-93C4-4BCD-93E2-E3B085C9AB24}">
+                <p16:designElem xmlns:p16="http://schemas.microsoft.com/office/powerpoint/2015/main" val="1"/>
+              </p:ext>
+            </p:extLst>
+          </p:nvPr>
+        </p:nvGrpSpPr>
+        <p:grpSpPr>
+          <a:xfrm>
+            <a:off x="-15736" y="0"/>
+            <a:ext cx="12229962" cy="6856214"/>
+            <a:chOff x="-15736" y="0"/>
+            <a:chExt cx="12229962" cy="6856214"/>
+          </a:xfrm>
+        </p:grpSpPr>
+        <p:pic>
+          <p:nvPicPr>
+            <p:cNvPr id="43" name="Picture 42">
+              <a:extLst>
+                <a:ext uri="{FF2B5EF4-FFF2-40B4-BE49-F238E27FC236}">
+                  <a16:creationId xmlns:a16="http://schemas.microsoft.com/office/drawing/2014/main" id="{53F5243F-7E41-439E-8991-C4F246D88F68}"/>
+                </a:ext>
+                <a:ext uri="{C183D7F6-B498-43B3-948B-1728B52AA6E4}">
+                  <adec:decorative xmlns:adec="http://schemas.microsoft.com/office/drawing/2017/decorative" val="1"/>
+                </a:ext>
+              </a:extLst>
+            </p:cNvPr>
+            <p:cNvPicPr>
+              <a:picLocks noChangeAspect="1"/>
+            </p:cNvPicPr>
+            <p:nvPr>
+              <p:extLst>
+                <p:ext uri="{386F3935-93C4-4BCD-93E2-E3B085C9AB24}">
+                  <p16:designElem xmlns:p16="http://schemas.microsoft.com/office/powerpoint/2015/main" val="1"/>
+                </p:ext>
+              </p:extLst>
+            </p:nvPr>
+          </p:nvPicPr>
+          <p:blipFill>
+            <a:blip r:embed="rId5">
+              <a:extLst>
+                <a:ext uri="{28A0092B-C50C-407E-A947-70E740481C1C}">
+                  <a14:useLocalDpi xmlns:a14="http://schemas.microsoft.com/office/drawing/2010/main" val="0"/>
+                </a:ext>
+              </a:extLst>
+            </a:blip>
+            <a:stretch>
+              <a:fillRect/>
+            </a:stretch>
+          </p:blipFill>
+          <p:spPr>
+            <a:xfrm>
+              <a:off x="0" y="0"/>
+              <a:ext cx="12188825" cy="6856214"/>
+            </a:xfrm>
+            <a:prstGeom prst="rect">
+              <a:avLst/>
+            </a:prstGeom>
+          </p:spPr>
+        </p:pic>
+        <p:sp>
+          <p:nvSpPr>
+            <p:cNvPr id="44" name="Rectangle 43">
+              <a:extLst>
+                <a:ext uri="{FF2B5EF4-FFF2-40B4-BE49-F238E27FC236}">
+                  <a16:creationId xmlns:a16="http://schemas.microsoft.com/office/drawing/2014/main" id="{401A6B5F-1CF1-43AD-9E85-94E187210CFC}"/>
+                </a:ext>
+                <a:ext uri="{C183D7F6-B498-43B3-948B-1728B52AA6E4}">
+                  <adec:decorative xmlns:adec="http://schemas.microsoft.com/office/drawing/2017/decorative" val="1"/>
+                </a:ext>
+              </a:extLst>
+            </p:cNvPr>
+            <p:cNvSpPr/>
+            <p:nvPr>
+              <p:extLst>
+                <p:ext uri="{386F3935-93C4-4BCD-93E2-E3B085C9AB24}">
+                  <p16:designElem xmlns:p16="http://schemas.microsoft.com/office/powerpoint/2015/main" val="1"/>
+                </p:ext>
+              </p:extLst>
+            </p:nvPr>
+          </p:nvSpPr>
+          <p:spPr>
+            <a:xfrm>
+              <a:off x="608012" y="609600"/>
+              <a:ext cx="10972800" cy="5638800"/>
+            </a:xfrm>
+            <a:prstGeom prst="rect">
+              <a:avLst/>
+            </a:prstGeom>
+            <a:noFill/>
+            <a:ln w="15875" cap="flat">
+              <a:miter lim="800000"/>
+            </a:ln>
+          </p:spPr>
+          <p:style>
+            <a:lnRef idx="1">
+              <a:schemeClr val="accent1"/>
+            </a:lnRef>
+            <a:fillRef idx="3">
+              <a:schemeClr val="accent1"/>
+            </a:fillRef>
+            <a:effectRef idx="2">
+              <a:schemeClr val="accent1"/>
+            </a:effectRef>
+            <a:fontRef idx="minor">
+              <a:schemeClr val="lt1"/>
+            </a:fontRef>
+          </p:style>
+        </p:sp>
+        <p:pic>
+          <p:nvPicPr>
+            <p:cNvPr id="45" name="Picture 44">
+              <a:extLst>
+                <a:ext uri="{FF2B5EF4-FFF2-40B4-BE49-F238E27FC236}">
+                  <a16:creationId xmlns:a16="http://schemas.microsoft.com/office/drawing/2014/main" id="{2F682A59-7E20-407C-A7F8-582295AC687C}"/>
+                </a:ext>
+                <a:ext uri="{C183D7F6-B498-43B3-948B-1728B52AA6E4}">
+                  <adec:decorative xmlns:adec="http://schemas.microsoft.com/office/drawing/2017/decorative" val="1"/>
+                </a:ext>
+              </a:extLst>
+            </p:cNvPr>
+            <p:cNvPicPr>
+              <a:picLocks noChangeAspect="1"/>
+            </p:cNvPicPr>
+            <p:nvPr>
+              <p:extLst>
+                <p:ext uri="{386F3935-93C4-4BCD-93E2-E3B085C9AB24}">
+                  <p16:designElem xmlns:p16="http://schemas.microsoft.com/office/powerpoint/2015/main" val="1"/>
+                </p:ext>
+              </p:extLst>
+            </p:nvPr>
+          </p:nvPicPr>
+          <p:blipFill rotWithShape="1">
+            <a:blip r:embed="rId6">
+              <a:extLst>
+                <a:ext uri="{28A0092B-C50C-407E-A947-70E740481C1C}">
+                  <a14:useLocalDpi xmlns:a14="http://schemas.microsoft.com/office/drawing/2010/main" val="0"/>
+                </a:ext>
+              </a:extLst>
+            </a:blip>
+            <a:srcRect/>
+            <a:stretch/>
+          </p:blipFill>
+          <p:spPr>
+            <a:xfrm>
+              <a:off x="-15736" y="3153832"/>
+              <a:ext cx="777240" cy="606425"/>
+            </a:xfrm>
+            <a:prstGeom prst="rect">
+              <a:avLst/>
+            </a:prstGeom>
+          </p:spPr>
+        </p:pic>
+        <p:pic>
+          <p:nvPicPr>
+            <p:cNvPr id="46" name="Picture 45">
+              <a:extLst>
+                <a:ext uri="{FF2B5EF4-FFF2-40B4-BE49-F238E27FC236}">
+                  <a16:creationId xmlns:a16="http://schemas.microsoft.com/office/drawing/2014/main" id="{5E4AC24E-0670-406E-822F-AAA6DA2010D3}"/>
+                </a:ext>
+                <a:ext uri="{C183D7F6-B498-43B3-948B-1728B52AA6E4}">
+                  <adec:decorative xmlns:adec="http://schemas.microsoft.com/office/drawing/2017/decorative" val="1"/>
+                </a:ext>
+              </a:extLst>
+            </p:cNvPr>
+            <p:cNvPicPr>
+              <a:picLocks noChangeAspect="1"/>
+            </p:cNvPicPr>
+            <p:nvPr>
+              <p:extLst>
+                <p:ext uri="{386F3935-93C4-4BCD-93E2-E3B085C9AB24}">
+                  <p16:designElem xmlns:p16="http://schemas.microsoft.com/office/powerpoint/2015/main" val="1"/>
+                </p:ext>
+              </p:extLst>
+            </p:nvPr>
+          </p:nvPicPr>
+          <p:blipFill rotWithShape="1">
+            <a:blip r:embed="rId6">
+              <a:extLst>
+                <a:ext uri="{28A0092B-C50C-407E-A947-70E740481C1C}">
+                  <a14:useLocalDpi xmlns:a14="http://schemas.microsoft.com/office/drawing/2010/main" val="0"/>
+                </a:ext>
+              </a:extLst>
+            </a:blip>
+            <a:srcRect/>
+            <a:stretch/>
+          </p:blipFill>
+          <p:spPr>
+            <a:xfrm>
+              <a:off x="11436986" y="3153832"/>
+              <a:ext cx="777240" cy="606425"/>
+            </a:xfrm>
+            <a:prstGeom prst="rect">
+              <a:avLst/>
+            </a:prstGeom>
+          </p:spPr>
+        </p:pic>
+      </p:grpSp>
+      <p:sp>
+        <p:nvSpPr>
+          <p:cNvPr id="48" name="Rectangle 47">
+            <a:extLst>
+              <a:ext uri="{FF2B5EF4-FFF2-40B4-BE49-F238E27FC236}">
+                <a16:creationId xmlns:a16="http://schemas.microsoft.com/office/drawing/2014/main" id="{E89B1776-F953-4C0F-8E85-E9C66B1EF003}"/>
+              </a:ext>
+              <a:ext uri="{C183D7F6-B498-43B3-948B-1728B52AA6E4}">
+                <adec:decorative xmlns:adec="http://schemas.microsoft.com/office/drawing/2017/decorative" val="1"/>
+              </a:ext>
+            </a:extLst>
+          </p:cNvPr>
+          <p:cNvSpPr>
+            <a:spLocks noGrp="1" noRot="1" noChangeAspect="1" noMove="1" noResize="1" noEditPoints="1" noAdjustHandles="1" noChangeArrowheads="1" noChangeShapeType="1" noTextEdit="1"/>
+          </p:cNvSpPr>
+          <p:nvPr>
+            <p:extLst>
+              <p:ext uri="{386F3935-93C4-4BCD-93E2-E3B085C9AB24}">
+                <p16:designElem xmlns:p16="http://schemas.microsoft.com/office/powerpoint/2015/main" val="1"/>
+              </p:ext>
+            </p:extLst>
+          </p:nvPr>
+        </p:nvSpPr>
+        <p:spPr>
+          <a:xfrm>
+            <a:off x="1092644" y="1092200"/>
+            <a:ext cx="6432130" cy="4515104"/>
+          </a:xfrm>
+          <a:prstGeom prst="rect">
+            <a:avLst/>
+          </a:prstGeom>
+          <a:solidFill>
+            <a:schemeClr val="bg1"/>
+          </a:solidFill>
+          <a:ln w="57150" cmpd="thickThin">
+            <a:solidFill>
+              <a:schemeClr val="tx1">
+                <a:lumMod val="50000"/>
+                <a:lumOff val="50000"/>
+              </a:schemeClr>
+            </a:solidFill>
+            <a:miter lim="800000"/>
+          </a:ln>
+        </p:spPr>
+        <p:style>
+          <a:lnRef idx="2">
+            <a:schemeClr val="accent1">
+              <a:shade val="50000"/>
+            </a:schemeClr>
+          </a:lnRef>
+          <a:fillRef idx="1">
+            <a:schemeClr val="accent1"/>
+          </a:fillRef>
+          <a:effectRef idx="0">
+            <a:schemeClr val="accent1"/>
+          </a:effectRef>
+          <a:fontRef idx="minor">
+            <a:schemeClr val="lt1"/>
+          </a:fontRef>
+        </p:style>
+        <p:txBody>
+          <a:bodyPr rtlCol="0" anchor="ctr"/>
+          <a:lstStyle/>
+          <a:p>
+            <a:pPr algn="ctr"/>
+            <a:endParaRPr lang="en-US"/>
+          </a:p>
+        </p:txBody>
+      </p:sp>
+      <p:pic>
+        <p:nvPicPr>
+          <p:cNvPr id="5" name="Billede 4" descr="Et billede, der indeholder skærmbillede&#10;&#10;Beskrivelse, der er oprettet med meget høj sikkerhed">
+            <a:extLst>
+              <a:ext uri="{FF2B5EF4-FFF2-40B4-BE49-F238E27FC236}">
+                <a16:creationId xmlns:a16="http://schemas.microsoft.com/office/drawing/2014/main" id="{D5908C14-3E45-4337-BFAE-32EF621B1E05}"/>
+              </a:ext>
+            </a:extLst>
+          </p:cNvPr>
+          <p:cNvPicPr>
+            <a:picLocks noChangeAspect="1"/>
+          </p:cNvPicPr>
+          <p:nvPr/>
+        </p:nvPicPr>
+        <p:blipFill>
+          <a:blip r:embed="rId7">
+            <a:extLst>
+              <a:ext uri="{28A0092B-C50C-407E-A947-70E740481C1C}">
+                <a14:useLocalDpi xmlns:a14="http://schemas.microsoft.com/office/drawing/2010/main" val="0"/>
+              </a:ext>
+            </a:extLst>
+          </a:blip>
+          <a:stretch>
+            <a:fillRect/>
+          </a:stretch>
+        </p:blipFill>
+        <p:spPr>
+          <a:xfrm>
+            <a:off x="1185447" y="1250696"/>
+            <a:ext cx="6219830" cy="4205221"/>
+          </a:xfrm>
+          <a:prstGeom prst="rect">
+            <a:avLst/>
+          </a:prstGeom>
+        </p:spPr>
+      </p:pic>
+      <p:cxnSp>
+        <p:nvCxnSpPr>
+          <p:cNvPr id="50" name="Straight Connector 49">
+            <a:extLst>
+              <a:ext uri="{FF2B5EF4-FFF2-40B4-BE49-F238E27FC236}">
+                <a16:creationId xmlns:a16="http://schemas.microsoft.com/office/drawing/2014/main" id="{997356D0-D934-42B9-8291-DF34A3AC0CFE}"/>
+              </a:ext>
+              <a:ext uri="{C183D7F6-B498-43B3-948B-1728B52AA6E4}">
+                <adec:decorative xmlns:adec="http://schemas.microsoft.com/office/drawing/2017/decorative" val="1"/>
               </a:ext>
             </a:extLst>
           </p:cNvPr>
@@ -19615,12 +19831,412 @@
   <p:cSld>
     <p:bg>
       <p:bgPr>
-        <a:blipFill>
-          <a:blip r:embed="rId3">
-            <a:extLst/>
+        <a:solidFill>
+          <a:schemeClr val="bg1"/>
+        </a:solidFill>
+        <a:effectLst/>
+      </p:bgPr>
+    </p:bg>
+    <p:spTree>
+      <p:nvGrpSpPr>
+        <p:cNvPr id="1" name=""/>
+        <p:cNvGrpSpPr/>
+        <p:nvPr/>
+      </p:nvGrpSpPr>
+      <p:grpSpPr>
+        <a:xfrm>
+          <a:off x="0" y="0"/>
+          <a:ext cx="0" cy="0"/>
+          <a:chOff x="0" y="0"/>
+          <a:chExt cx="0" cy="0"/>
+        </a:xfrm>
+      </p:grpSpPr>
+      <p:grpSp>
+        <p:nvGrpSpPr>
+          <p:cNvPr id="82" name="Group 81">
+            <a:extLst>
+              <a:ext uri="{FF2B5EF4-FFF2-40B4-BE49-F238E27FC236}">
+                <a16:creationId xmlns:a16="http://schemas.microsoft.com/office/drawing/2014/main" id="{5066F8AE-A5C7-4B3E-B1DA-D0B624059BED}"/>
+              </a:ext>
+              <a:ext uri="{C183D7F6-B498-43B3-948B-1728B52AA6E4}">
+                <adec:decorative xmlns:adec="http://schemas.microsoft.com/office/drawing/2017/decorative" val="1"/>
+              </a:ext>
+            </a:extLst>
+          </p:cNvPr>
+          <p:cNvGrpSpPr>
+            <a:grpSpLocks noGrp="1" noUngrp="1" noRot="1" noChangeAspect="1" noMove="1" noResize="1"/>
+          </p:cNvGrpSpPr>
+          <p:nvPr>
+            <p:extLst>
+              <p:ext uri="{386F3935-93C4-4BCD-93E2-E3B085C9AB24}">
+                <p16:designElem xmlns:p16="http://schemas.microsoft.com/office/powerpoint/2015/main" val="1"/>
+              </p:ext>
+            </p:extLst>
+          </p:nvPr>
+        </p:nvGrpSpPr>
+        <p:grpSpPr>
+          <a:xfrm>
+            <a:off x="-15736" y="0"/>
+            <a:ext cx="12229962" cy="6856214"/>
+            <a:chOff x="-15736" y="0"/>
+            <a:chExt cx="12229962" cy="6856214"/>
+          </a:xfrm>
+        </p:grpSpPr>
+        <p:pic>
+          <p:nvPicPr>
+            <p:cNvPr id="83" name="Picture 82">
+              <a:extLst>
+                <a:ext uri="{FF2B5EF4-FFF2-40B4-BE49-F238E27FC236}">
+                  <a16:creationId xmlns:a16="http://schemas.microsoft.com/office/drawing/2014/main" id="{F78E901E-6697-44E3-9533-1457FA4F0488}"/>
+                </a:ext>
+                <a:ext uri="{C183D7F6-B498-43B3-948B-1728B52AA6E4}">
+                  <adec:decorative xmlns:adec="http://schemas.microsoft.com/office/drawing/2017/decorative" val="1"/>
+                </a:ext>
+              </a:extLst>
+            </p:cNvPr>
+            <p:cNvPicPr>
+              <a:picLocks noChangeAspect="1"/>
+            </p:cNvPicPr>
+            <p:nvPr>
+              <p:extLst>
+                <p:ext uri="{386F3935-93C4-4BCD-93E2-E3B085C9AB24}">
+                  <p16:designElem xmlns:p16="http://schemas.microsoft.com/office/powerpoint/2015/main" val="1"/>
+                </p:ext>
+              </p:extLst>
+            </p:nvPr>
+          </p:nvPicPr>
+          <p:blipFill>
+            <a:blip r:embed="rId3">
+              <a:extLst>
+                <a:ext uri="{28A0092B-C50C-407E-A947-70E740481C1C}">
+                  <a14:useLocalDpi xmlns:a14="http://schemas.microsoft.com/office/drawing/2010/main" val="0"/>
+                </a:ext>
+              </a:extLst>
+            </a:blip>
+            <a:stretch>
+              <a:fillRect/>
+            </a:stretch>
+          </p:blipFill>
+          <p:spPr>
+            <a:xfrm>
+              <a:off x="0" y="0"/>
+              <a:ext cx="12188825" cy="6856214"/>
+            </a:xfrm>
+            <a:prstGeom prst="rect">
+              <a:avLst/>
+            </a:prstGeom>
+          </p:spPr>
+        </p:pic>
+        <p:sp>
+          <p:nvSpPr>
+            <p:cNvPr id="84" name="Rectangle 83">
+              <a:extLst>
+                <a:ext uri="{FF2B5EF4-FFF2-40B4-BE49-F238E27FC236}">
+                  <a16:creationId xmlns:a16="http://schemas.microsoft.com/office/drawing/2014/main" id="{C515452A-514A-4763-9932-37302A8D6DBA}"/>
+                </a:ext>
+                <a:ext uri="{C183D7F6-B498-43B3-948B-1728B52AA6E4}">
+                  <adec:decorative xmlns:adec="http://schemas.microsoft.com/office/drawing/2017/decorative" val="1"/>
+                </a:ext>
+              </a:extLst>
+            </p:cNvPr>
+            <p:cNvSpPr/>
+            <p:nvPr>
+              <p:extLst>
+                <p:ext uri="{386F3935-93C4-4BCD-93E2-E3B085C9AB24}">
+                  <p16:designElem xmlns:p16="http://schemas.microsoft.com/office/powerpoint/2015/main" val="1"/>
+                </p:ext>
+              </p:extLst>
+            </p:nvPr>
+          </p:nvSpPr>
+          <p:spPr>
+            <a:xfrm>
+              <a:off x="608012" y="609600"/>
+              <a:ext cx="10972800" cy="5638800"/>
+            </a:xfrm>
+            <a:prstGeom prst="rect">
+              <a:avLst/>
+            </a:prstGeom>
+            <a:noFill/>
+            <a:ln w="15875" cap="flat">
+              <a:miter lim="800000"/>
+            </a:ln>
+          </p:spPr>
+          <p:style>
+            <a:lnRef idx="1">
+              <a:schemeClr val="accent1"/>
+            </a:lnRef>
+            <a:fillRef idx="3">
+              <a:schemeClr val="accent1"/>
+            </a:fillRef>
+            <a:effectRef idx="2">
+              <a:schemeClr val="accent1"/>
+            </a:effectRef>
+            <a:fontRef idx="minor">
+              <a:schemeClr val="lt1"/>
+            </a:fontRef>
+          </p:style>
+        </p:sp>
+        <p:pic>
+          <p:nvPicPr>
+            <p:cNvPr id="85" name="Picture 84">
+              <a:extLst>
+                <a:ext uri="{FF2B5EF4-FFF2-40B4-BE49-F238E27FC236}">
+                  <a16:creationId xmlns:a16="http://schemas.microsoft.com/office/drawing/2014/main" id="{D0EC146D-CF08-4B34-ADEB-2F0296F98A14}"/>
+                </a:ext>
+                <a:ext uri="{C183D7F6-B498-43B3-948B-1728B52AA6E4}">
+                  <adec:decorative xmlns:adec="http://schemas.microsoft.com/office/drawing/2017/decorative" val="1"/>
+                </a:ext>
+              </a:extLst>
+            </p:cNvPr>
+            <p:cNvPicPr>
+              <a:picLocks noChangeAspect="1"/>
+            </p:cNvPicPr>
+            <p:nvPr>
+              <p:extLst>
+                <p:ext uri="{386F3935-93C4-4BCD-93E2-E3B085C9AB24}">
+                  <p16:designElem xmlns:p16="http://schemas.microsoft.com/office/powerpoint/2015/main" val="1"/>
+                </p:ext>
+              </p:extLst>
+            </p:nvPr>
+          </p:nvPicPr>
+          <p:blipFill rotWithShape="1">
+            <a:blip r:embed="rId4">
+              <a:extLst>
+                <a:ext uri="{28A0092B-C50C-407E-A947-70E740481C1C}">
+                  <a14:useLocalDpi xmlns:a14="http://schemas.microsoft.com/office/drawing/2010/main" val="0"/>
+                </a:ext>
+              </a:extLst>
+            </a:blip>
+            <a:srcRect/>
+            <a:stretch/>
+          </p:blipFill>
+          <p:spPr>
+            <a:xfrm>
+              <a:off x="-15736" y="3153832"/>
+              <a:ext cx="777240" cy="606425"/>
+            </a:xfrm>
+            <a:prstGeom prst="rect">
+              <a:avLst/>
+            </a:prstGeom>
+          </p:spPr>
+        </p:pic>
+        <p:pic>
+          <p:nvPicPr>
+            <p:cNvPr id="86" name="Picture 85">
+              <a:extLst>
+                <a:ext uri="{FF2B5EF4-FFF2-40B4-BE49-F238E27FC236}">
+                  <a16:creationId xmlns:a16="http://schemas.microsoft.com/office/drawing/2014/main" id="{E1FBA240-87AB-400A-9292-7DC6F3E55215}"/>
+                </a:ext>
+                <a:ext uri="{C183D7F6-B498-43B3-948B-1728B52AA6E4}">
+                  <adec:decorative xmlns:adec="http://schemas.microsoft.com/office/drawing/2017/decorative" val="1"/>
+                </a:ext>
+              </a:extLst>
+            </p:cNvPr>
+            <p:cNvPicPr>
+              <a:picLocks noChangeAspect="1"/>
+            </p:cNvPicPr>
+            <p:nvPr>
+              <p:extLst>
+                <p:ext uri="{386F3935-93C4-4BCD-93E2-E3B085C9AB24}">
+                  <p16:designElem xmlns:p16="http://schemas.microsoft.com/office/powerpoint/2015/main" val="1"/>
+                </p:ext>
+              </p:extLst>
+            </p:nvPr>
+          </p:nvPicPr>
+          <p:blipFill rotWithShape="1">
+            <a:blip r:embed="rId4">
+              <a:extLst>
+                <a:ext uri="{28A0092B-C50C-407E-A947-70E740481C1C}">
+                  <a14:useLocalDpi xmlns:a14="http://schemas.microsoft.com/office/drawing/2010/main" val="0"/>
+                </a:ext>
+              </a:extLst>
+            </a:blip>
+            <a:srcRect/>
+            <a:stretch/>
+          </p:blipFill>
+          <p:spPr>
+            <a:xfrm>
+              <a:off x="11436986" y="3153832"/>
+              <a:ext cx="777240" cy="606425"/>
+            </a:xfrm>
+            <a:prstGeom prst="rect">
+              <a:avLst/>
+            </a:prstGeom>
+          </p:spPr>
+        </p:pic>
+      </p:grpSp>
+      <p:sp useBgFill="1">
+        <p:nvSpPr>
+          <p:cNvPr id="88" name="Rectangle 87">
+            <a:extLst>
+              <a:ext uri="{FF2B5EF4-FFF2-40B4-BE49-F238E27FC236}">
+                <a16:creationId xmlns:a16="http://schemas.microsoft.com/office/drawing/2014/main" id="{7193F1A9-EED8-46C5-A64D-C219BE030BE1}"/>
+              </a:ext>
+              <a:ext uri="{C183D7F6-B498-43B3-948B-1728B52AA6E4}">
+                <adec:decorative xmlns:adec="http://schemas.microsoft.com/office/drawing/2017/decorative" val="1"/>
+              </a:ext>
+            </a:extLst>
+          </p:cNvPr>
+          <p:cNvSpPr>
+            <a:spLocks noGrp="1" noRot="1" noChangeAspect="1" noMove="1" noResize="1" noEditPoints="1" noAdjustHandles="1" noChangeArrowheads="1" noChangeShapeType="1" noTextEdit="1"/>
+          </p:cNvSpPr>
+          <p:nvPr>
+            <p:extLst>
+              <p:ext uri="{386F3935-93C4-4BCD-93E2-E3B085C9AB24}">
+                <p16:designElem xmlns:p16="http://schemas.microsoft.com/office/powerpoint/2015/main" val="1"/>
+              </p:ext>
+            </p:extLst>
+          </p:nvPr>
+        </p:nvSpPr>
+        <p:spPr>
+          <a:xfrm>
+            <a:off x="0" y="0"/>
+            <a:ext cx="12192000" cy="6858000"/>
+          </a:xfrm>
+          <a:prstGeom prst="rect">
+            <a:avLst/>
+          </a:prstGeom>
+          <a:ln>
+            <a:noFill/>
+          </a:ln>
+        </p:spPr>
+        <p:style>
+          <a:lnRef idx="2">
+            <a:schemeClr val="accent1">
+              <a:shade val="50000"/>
+            </a:schemeClr>
+          </a:lnRef>
+          <a:fillRef idx="1">
+            <a:schemeClr val="accent1"/>
+          </a:fillRef>
+          <a:effectRef idx="0">
+            <a:schemeClr val="accent1"/>
+          </a:effectRef>
+          <a:fontRef idx="minor">
+            <a:schemeClr val="lt1"/>
+          </a:fontRef>
+        </p:style>
+        <p:txBody>
+          <a:bodyPr rtlCol="0" anchor="ctr"/>
+          <a:lstStyle/>
+          <a:p>
+            <a:pPr algn="ctr"/>
+            <a:endParaRPr lang="en-US"/>
+          </a:p>
+        </p:txBody>
+      </p:sp>
+      <p:pic>
+        <p:nvPicPr>
+          <p:cNvPr id="3" name="Billede 2" descr="Et billede, der indeholder skærmbillede&#10;&#10;Beskrivelse, der er oprettet med meget høj sikkerhed">
+            <a:extLst>
+              <a:ext uri="{FF2B5EF4-FFF2-40B4-BE49-F238E27FC236}">
+                <a16:creationId xmlns:a16="http://schemas.microsoft.com/office/drawing/2014/main" id="{EE51DB15-42B9-413E-B433-91D001B6430C}"/>
+              </a:ext>
+            </a:extLst>
+          </p:cNvPr>
+          <p:cNvPicPr>
+            <a:picLocks noChangeAspect="1"/>
+          </p:cNvPicPr>
+          <p:nvPr/>
+        </p:nvPicPr>
+        <p:blipFill rotWithShape="1">
+          <a:blip r:embed="rId5">
+            <a:extLst>
+              <a:ext uri="{28A0092B-C50C-407E-A947-70E740481C1C}">
+                <a14:useLocalDpi xmlns:a14="http://schemas.microsoft.com/office/drawing/2010/main" val="0"/>
+              </a:ext>
+            </a:extLst>
           </a:blip>
+          <a:srcRect r="25402" b="-1"/>
           <a:stretch/>
-        </a:blipFill>
+        </p:blipFill>
+        <p:spPr>
+          <a:xfrm>
+            <a:off x="804334" y="804334"/>
+            <a:ext cx="10583332" cy="5249332"/>
+          </a:xfrm>
+          <a:prstGeom prst="rect">
+            <a:avLst/>
+          </a:prstGeom>
+        </p:spPr>
+      </p:pic>
+      <p:sp>
+        <p:nvSpPr>
+          <p:cNvPr id="90" name="Rectangle 89">
+            <a:extLst>
+              <a:ext uri="{FF2B5EF4-FFF2-40B4-BE49-F238E27FC236}">
+                <a16:creationId xmlns:a16="http://schemas.microsoft.com/office/drawing/2014/main" id="{ECE6865D-C104-4F99-86B8-B6E914940FF5}"/>
+              </a:ext>
+              <a:ext uri="{C183D7F6-B498-43B3-948B-1728B52AA6E4}">
+                <adec:decorative xmlns:adec="http://schemas.microsoft.com/office/drawing/2017/decorative" val="1"/>
+              </a:ext>
+            </a:extLst>
+          </p:cNvPr>
+          <p:cNvSpPr>
+            <a:spLocks noGrp="1" noRot="1" noChangeAspect="1" noMove="1" noResize="1" noEditPoints="1" noAdjustHandles="1" noChangeArrowheads="1" noChangeShapeType="1" noTextEdit="1"/>
+          </p:cNvSpPr>
+          <p:nvPr>
+            <p:extLst>
+              <p:ext uri="{386F3935-93C4-4BCD-93E2-E3B085C9AB24}">
+                <p16:designElem xmlns:p16="http://schemas.microsoft.com/office/powerpoint/2015/main" val="1"/>
+              </p:ext>
+            </p:extLst>
+          </p:nvPr>
+        </p:nvSpPr>
+        <p:spPr>
+          <a:xfrm>
+            <a:off x="324611" y="350556"/>
+            <a:ext cx="11542779" cy="6156888"/>
+          </a:xfrm>
+          <a:prstGeom prst="rect">
+            <a:avLst/>
+          </a:prstGeom>
+          <a:noFill/>
+          <a:ln>
+            <a:solidFill>
+              <a:srgbClr val="6FCFF3"/>
+            </a:solidFill>
+          </a:ln>
+        </p:spPr>
+        <p:style>
+          <a:lnRef idx="1">
+            <a:schemeClr val="accent1"/>
+          </a:lnRef>
+          <a:fillRef idx="3">
+            <a:schemeClr val="accent1"/>
+          </a:fillRef>
+          <a:effectRef idx="2">
+            <a:schemeClr val="accent1"/>
+          </a:effectRef>
+          <a:fontRef idx="minor">
+            <a:schemeClr val="lt1"/>
+          </a:fontRef>
+        </p:style>
+      </p:sp>
+    </p:spTree>
+    <p:extLst>
+      <p:ext uri="{BB962C8B-B14F-4D97-AF65-F5344CB8AC3E}">
+        <p14:creationId xmlns:p14="http://schemas.microsoft.com/office/powerpoint/2010/main" val="3537916646"/>
+      </p:ext>
+    </p:extLst>
+  </p:cSld>
+  <p:clrMapOvr>
+    <a:masterClrMapping/>
+  </p:clrMapOvr>
+  <p:transition spd="med">
+    <p:pull/>
+  </p:transition>
+</p:sld>
+</file>
+
+<file path=ppt/slides/slide17.xml><?xml version="1.0" encoding="utf-8"?>
+<p:sld xmlns:a="http://schemas.openxmlformats.org/drawingml/2006/main" xmlns:r="http://schemas.openxmlformats.org/officeDocument/2006/relationships" xmlns:p="http://schemas.openxmlformats.org/presentationml/2006/main">
+  <p:cSld>
+    <p:bg>
+      <p:bgPr>
+        <a:solidFill>
+          <a:schemeClr val="bg1"/>
+        </a:solidFill>
         <a:effectLst/>
       </p:bgPr>
     </p:bg>
@@ -19644,6 +20260,9 @@
             <a:extLst>
               <a:ext uri="{FF2B5EF4-FFF2-40B4-BE49-F238E27FC236}">
                 <a16:creationId xmlns:a16="http://schemas.microsoft.com/office/drawing/2014/main" id="{B77576E5-E7DB-46C7-B0D9-A0AB18787301}"/>
+              </a:ext>
+              <a:ext uri="{C183D7F6-B498-43B3-948B-1728B52AA6E4}">
+                <adec:decorative xmlns:adec="http://schemas.microsoft.com/office/drawing/2017/decorative" val="1"/>
               </a:ext>
             </a:extLst>
           </p:cNvPr>
@@ -19673,6 +20292,9 @@
                 <a:ext uri="{FF2B5EF4-FFF2-40B4-BE49-F238E27FC236}">
                   <a16:creationId xmlns:a16="http://schemas.microsoft.com/office/drawing/2014/main" id="{A2C244BC-AB19-460B-9A7B-5BAFE9DEAB00}"/>
                 </a:ext>
+                <a:ext uri="{C183D7F6-B498-43B3-948B-1728B52AA6E4}">
+                  <adec:decorative xmlns:adec="http://schemas.microsoft.com/office/drawing/2017/decorative" val="1"/>
+                </a:ext>
               </a:extLst>
             </p:cNvPr>
             <p:cNvPicPr>
@@ -19687,7 +20309,7 @@
             </p:nvPr>
           </p:nvPicPr>
           <p:blipFill>
-            <a:blip r:embed="rId4">
+            <a:blip r:embed="rId2">
               <a:extLst>
                 <a:ext uri="{28A0092B-C50C-407E-A947-70E740481C1C}">
                   <a14:useLocalDpi xmlns:a14="http://schemas.microsoft.com/office/drawing/2010/main" val="0"/>
@@ -19714,6 +20336,9 @@
               <a:extLst>
                 <a:ext uri="{FF2B5EF4-FFF2-40B4-BE49-F238E27FC236}">
                   <a16:creationId xmlns:a16="http://schemas.microsoft.com/office/drawing/2014/main" id="{C2D7728D-2CB0-4ADE-B6BF-4BA8ED772A31}"/>
+                </a:ext>
+                <a:ext uri="{C183D7F6-B498-43B3-948B-1728B52AA6E4}">
+                  <adec:decorative xmlns:adec="http://schemas.microsoft.com/office/drawing/2017/decorative" val="1"/>
                 </a:ext>
               </a:extLst>
             </p:cNvPr>
@@ -19761,6 +20386,9 @@
                 <a:ext uri="{FF2B5EF4-FFF2-40B4-BE49-F238E27FC236}">
                   <a16:creationId xmlns:a16="http://schemas.microsoft.com/office/drawing/2014/main" id="{A3E0EDB8-8162-4D16-9521-52415777B0B4}"/>
                 </a:ext>
+                <a:ext uri="{C183D7F6-B498-43B3-948B-1728B52AA6E4}">
+                  <adec:decorative xmlns:adec="http://schemas.microsoft.com/office/drawing/2017/decorative" val="1"/>
+                </a:ext>
               </a:extLst>
             </p:cNvPr>
             <p:cNvPicPr>
@@ -19775,7 +20403,7 @@
             </p:nvPr>
           </p:nvPicPr>
           <p:blipFill rotWithShape="1">
-            <a:blip r:embed="rId5">
+            <a:blip r:embed="rId3">
               <a:extLst>
                 <a:ext uri="{28A0092B-C50C-407E-A947-70E740481C1C}">
                   <a14:useLocalDpi xmlns:a14="http://schemas.microsoft.com/office/drawing/2010/main" val="0"/>
@@ -19802,6 +20430,9 @@
                 <a:ext uri="{FF2B5EF4-FFF2-40B4-BE49-F238E27FC236}">
                   <a16:creationId xmlns:a16="http://schemas.microsoft.com/office/drawing/2014/main" id="{27060CB3-C139-4548-A73F-74689C9292D0}"/>
                 </a:ext>
+                <a:ext uri="{C183D7F6-B498-43B3-948B-1728B52AA6E4}">
+                  <adec:decorative xmlns:adec="http://schemas.microsoft.com/office/drawing/2017/decorative" val="1"/>
+                </a:ext>
               </a:extLst>
             </p:cNvPr>
             <p:cNvPicPr>
@@ -19816,7 +20447,7 @@
             </p:nvPr>
           </p:nvPicPr>
           <p:blipFill rotWithShape="1">
-            <a:blip r:embed="rId5">
+            <a:blip r:embed="rId3">
               <a:extLst>
                 <a:ext uri="{28A0092B-C50C-407E-A947-70E740481C1C}">
                   <a14:useLocalDpi xmlns:a14="http://schemas.microsoft.com/office/drawing/2010/main" val="0"/>
@@ -19837,12 +20468,15 @@
           </p:spPr>
         </p:pic>
       </p:grpSp>
-      <p:sp>
+      <p:sp useBgFill="1">
         <p:nvSpPr>
           <p:cNvPr id="16" name="Rectangle 15">
             <a:extLst>
               <a:ext uri="{FF2B5EF4-FFF2-40B4-BE49-F238E27FC236}">
-                <a16:creationId xmlns:a16="http://schemas.microsoft.com/office/drawing/2014/main" id="{E6B80853-775B-47C1-A508-0AAD6FCE5ADB}"/>
+                <a16:creationId xmlns:a16="http://schemas.microsoft.com/office/drawing/2014/main" id="{38181A50-C8BE-4392-983D-C06579080585}"/>
+              </a:ext>
+              <a:ext uri="{C183D7F6-B498-43B3-948B-1728B52AA6E4}">
+                <adec:decorative xmlns:adec="http://schemas.microsoft.com/office/drawing/2017/decorative" val="1"/>
               </a:ext>
             </a:extLst>
           </p:cNvPr>
@@ -19865,12 +20499,6 @@
           <a:prstGeom prst="rect">
             <a:avLst/>
           </a:prstGeom>
-          <a:solidFill>
-            <a:schemeClr val="tx2">
-              <a:lumMod val="75000"/>
-              <a:lumOff val="25000"/>
-            </a:schemeClr>
-          </a:solidFill>
           <a:ln>
             <a:noFill/>
           </a:ln>
@@ -19900,69 +20528,12 @@
           </a:p>
         </p:txBody>
       </p:sp>
-      <p:sp>
-        <p:nvSpPr>
-          <p:cNvPr id="18" name="Rectangle 17">
+      <p:pic>
+        <p:nvPicPr>
+          <p:cNvPr id="5" name="Billede 4" descr="Et billede, der indeholder skærmbillede&#10;&#10;Beskrivelse, der er oprettet med meget høj sikkerhed">
             <a:extLst>
               <a:ext uri="{FF2B5EF4-FFF2-40B4-BE49-F238E27FC236}">
-                <a16:creationId xmlns:a16="http://schemas.microsoft.com/office/drawing/2014/main" id="{9BF62520-0403-497A-958B-FD6E8037E8FA}"/>
-              </a:ext>
-            </a:extLst>
-          </p:cNvPr>
-          <p:cNvSpPr>
-            <a:spLocks noGrp="1" noRot="1" noChangeAspect="1" noMove="1" noResize="1" noEditPoints="1" noAdjustHandles="1" noChangeArrowheads="1" noChangeShapeType="1" noTextEdit="1"/>
-          </p:cNvSpPr>
-          <p:nvPr>
-            <p:extLst>
-              <p:ext uri="{386F3935-93C4-4BCD-93E2-E3B085C9AB24}">
-                <p16:designElem xmlns:p16="http://schemas.microsoft.com/office/powerpoint/2015/main" val="1"/>
-              </p:ext>
-            </p:extLst>
-          </p:nvPr>
-        </p:nvSpPr>
-        <p:spPr>
-          <a:xfrm>
-            <a:off x="463685" y="471792"/>
-            <a:ext cx="11264630" cy="5914417"/>
-          </a:xfrm>
-          <a:prstGeom prst="rect">
-            <a:avLst/>
-          </a:prstGeom>
-          <a:solidFill>
-            <a:schemeClr val="bg1"/>
-          </a:solidFill>
-        </p:spPr>
-        <p:style>
-          <a:lnRef idx="2">
-            <a:schemeClr val="accent1">
-              <a:shade val="50000"/>
-            </a:schemeClr>
-          </a:lnRef>
-          <a:fillRef idx="1">
-            <a:schemeClr val="accent1"/>
-          </a:fillRef>
-          <a:effectRef idx="0">
-            <a:schemeClr val="accent1"/>
-          </a:effectRef>
-          <a:fontRef idx="minor">
-            <a:schemeClr val="lt1"/>
-          </a:fontRef>
-        </p:style>
-        <p:txBody>
-          <a:bodyPr rtlCol="0" anchor="ctr"/>
-          <a:lstStyle/>
-          <a:p>
-            <a:pPr algn="ctr"/>
-            <a:endParaRPr lang="en-US"/>
-          </a:p>
-        </p:txBody>
-      </p:sp>
-      <p:pic>
-        <p:nvPicPr>
-          <p:cNvPr id="5" name="Picture 4" descr="A screenshot of a cell phone&#10;&#10;Description generated with very high confidence">
-            <a:extLst>
-              <a:ext uri="{FF2B5EF4-FFF2-40B4-BE49-F238E27FC236}">
-                <a16:creationId xmlns:a16="http://schemas.microsoft.com/office/drawing/2014/main" id="{107FEA5A-714F-4121-9962-1671D7DA3F95}"/>
+                <a16:creationId xmlns:a16="http://schemas.microsoft.com/office/drawing/2014/main" id="{3AEC5BD4-2144-4E9D-9571-CD13126BF82D}"/>
               </a:ext>
             </a:extLst>
           </p:cNvPr>
@@ -19972,7 +20543,7 @@
           <p:nvPr/>
         </p:nvPicPr>
         <p:blipFill>
-          <a:blip r:embed="rId6">
+          <a:blip r:embed="rId4">
             <a:extLst>
               <a:ext uri="{28A0092B-C50C-407E-A947-70E740481C1C}">
                 <a14:useLocalDpi xmlns:a14="http://schemas.microsoft.com/office/drawing/2010/main" val="0"/>
@@ -19985,129 +20556,8 @@
         </p:blipFill>
         <p:spPr>
           <a:xfrm>
-            <a:off x="1105514" y="1619949"/>
-            <a:ext cx="9980973" cy="3618102"/>
-          </a:xfrm>
-          <a:prstGeom prst="rect">
-            <a:avLst/>
-          </a:prstGeom>
-        </p:spPr>
-      </p:pic>
-      <p:sp>
-        <p:nvSpPr>
-          <p:cNvPr id="20" name="Rectangle 19">
-            <a:extLst>
-              <a:ext uri="{FF2B5EF4-FFF2-40B4-BE49-F238E27FC236}">
-                <a16:creationId xmlns:a16="http://schemas.microsoft.com/office/drawing/2014/main" id="{BB3A422A-21ED-464B-B2EF-EE5B061BED4A}"/>
-              </a:ext>
-            </a:extLst>
-          </p:cNvPr>
-          <p:cNvSpPr>
-            <a:spLocks noGrp="1" noRot="1" noChangeAspect="1" noMove="1" noResize="1" noEditPoints="1" noAdjustHandles="1" noChangeArrowheads="1" noChangeShapeType="1" noTextEdit="1"/>
-          </p:cNvSpPr>
-          <p:nvPr>
-            <p:extLst>
-              <p:ext uri="{386F3935-93C4-4BCD-93E2-E3B085C9AB24}">
-                <p16:designElem xmlns:p16="http://schemas.microsoft.com/office/powerpoint/2015/main" val="1"/>
-              </p:ext>
-            </p:extLst>
-          </p:nvPr>
-        </p:nvSpPr>
-        <p:spPr>
-          <a:xfrm>
-            <a:off x="618744" y="635508"/>
-            <a:ext cx="10954512" cy="5586984"/>
-          </a:xfrm>
-          <a:prstGeom prst="rect">
-            <a:avLst/>
-          </a:prstGeom>
-          <a:noFill/>
-          <a:ln>
-            <a:solidFill>
-              <a:srgbClr val="5C4A9E"/>
-            </a:solidFill>
-          </a:ln>
-        </p:spPr>
-        <p:style>
-          <a:lnRef idx="1">
-            <a:schemeClr val="accent1"/>
-          </a:lnRef>
-          <a:fillRef idx="3">
-            <a:schemeClr val="accent1"/>
-          </a:fillRef>
-          <a:effectRef idx="2">
-            <a:schemeClr val="accent1"/>
-          </a:effectRef>
-          <a:fontRef idx="minor">
-            <a:schemeClr val="lt1"/>
-          </a:fontRef>
-        </p:style>
-      </p:sp>
-    </p:spTree>
-    <p:extLst>
-      <p:ext uri="{BB962C8B-B14F-4D97-AF65-F5344CB8AC3E}">
-        <p14:creationId xmlns:p14="http://schemas.microsoft.com/office/powerpoint/2010/main" val="3537916646"/>
-      </p:ext>
-    </p:extLst>
-  </p:cSld>
-  <p:clrMapOvr>
-    <a:masterClrMapping/>
-  </p:clrMapOvr>
-  <p:transition spd="med">
-    <p:pull/>
-  </p:transition>
-</p:sld>
-</file>
-
-<file path=ppt/slides/slide17.xml><?xml version="1.0" encoding="utf-8"?>
-<p:sld xmlns:a="http://schemas.openxmlformats.org/drawingml/2006/main" xmlns:r="http://schemas.openxmlformats.org/officeDocument/2006/relationships" xmlns:p="http://schemas.openxmlformats.org/presentationml/2006/main">
-  <p:cSld>
-    <p:spTree>
-      <p:nvGrpSpPr>
-        <p:cNvPr id="1" name=""/>
-        <p:cNvGrpSpPr/>
-        <p:nvPr/>
-      </p:nvGrpSpPr>
-      <p:grpSpPr>
-        <a:xfrm>
-          <a:off x="0" y="0"/>
-          <a:ext cx="0" cy="0"/>
-          <a:chOff x="0" y="0"/>
-          <a:chExt cx="0" cy="0"/>
-        </a:xfrm>
-      </p:grpSpPr>
-      <p:pic>
-        <p:nvPicPr>
-          <p:cNvPr id="4" name="Picture 5" descr="A screenshot of a social media post&#10;&#10;Description generated with very high confidence">
-            <a:extLst>
-              <a:ext uri="{FF2B5EF4-FFF2-40B4-BE49-F238E27FC236}">
-                <a16:creationId xmlns:a16="http://schemas.microsoft.com/office/drawing/2014/main" id="{113672A1-777C-47FC-B7D1-3C32117C205C}"/>
-              </a:ext>
-            </a:extLst>
-          </p:cNvPr>
-          <p:cNvPicPr>
-            <a:picLocks noGrp="1" noChangeAspect="1"/>
-          </p:cNvPicPr>
-          <p:nvPr>
-            <p:ph idx="1"/>
-          </p:nvPr>
-        </p:nvPicPr>
-        <p:blipFill>
-          <a:blip r:embed="rId2">
-            <a:extLst>
-              <a:ext uri="{28A0092B-C50C-407E-A947-70E740481C1C}">
-                <a14:useLocalDpi xmlns:a14="http://schemas.microsoft.com/office/drawing/2010/main" val="0"/>
-              </a:ext>
-            </a:extLst>
-          </a:blip>
-          <a:stretch>
-            <a:fillRect/>
-          </a:stretch>
-        </p:blipFill>
-        <p:spPr>
-          <a:xfrm>
-            <a:off x="1111250" y="1731724"/>
-            <a:ext cx="10295748" cy="3561636"/>
+            <a:off x="2720224" y="804334"/>
+            <a:ext cx="6751552" cy="5249332"/>
           </a:xfrm>
           <a:prstGeom prst="rect">
             <a:avLst/>
@@ -20117,7 +20567,7 @@
     </p:spTree>
     <p:extLst>
       <p:ext uri="{BB962C8B-B14F-4D97-AF65-F5344CB8AC3E}">
-        <p14:creationId xmlns:p14="http://schemas.microsoft.com/office/powerpoint/2010/main" val="3680886145"/>
+        <p14:creationId xmlns:p14="http://schemas.microsoft.com/office/powerpoint/2010/main" val="3045699795"/>
       </p:ext>
     </p:extLst>
   </p:cSld>
@@ -20217,13 +20667,8 @@
           <a:p>
             <a:r>
               <a:rPr lang="en-US" dirty="0"/>
-              <a:t>To test the functionality we have tested each and every </a:t>
+              <a:t>To test the functionality we have tested each and every method in</a:t>
             </a:r>
-            <a:r>
-              <a:rPr lang="en-US"/>
-              <a:t>method in</a:t>
-            </a:r>
-            <a:endParaRPr lang="en-US" dirty="0"/>
           </a:p>
           <a:p>
             <a:pPr marL="0" indent="0">
@@ -24634,42 +25079,6 @@
           </a:p>
         </p:txBody>
       </p:sp>
-      <p:pic>
-        <p:nvPicPr>
-          <p:cNvPr id="5" name="Picture 4">
-            <a:extLst>
-              <a:ext uri="{FF2B5EF4-FFF2-40B4-BE49-F238E27FC236}">
-                <a16:creationId xmlns:a16="http://schemas.microsoft.com/office/drawing/2014/main" id="{0B68B590-EA03-49FF-87C1-2DE6050638A1}"/>
-              </a:ext>
-            </a:extLst>
-          </p:cNvPr>
-          <p:cNvPicPr>
-            <a:picLocks noChangeAspect="1"/>
-          </p:cNvPicPr>
-          <p:nvPr/>
-        </p:nvPicPr>
-        <p:blipFill>
-          <a:blip r:embed="rId7" cstate="print">
-            <a:extLst>
-              <a:ext uri="{28A0092B-C50C-407E-A947-70E740481C1C}">
-                <a14:useLocalDpi xmlns:a14="http://schemas.microsoft.com/office/drawing/2010/main" val="0"/>
-              </a:ext>
-            </a:extLst>
-          </a:blip>
-          <a:stretch>
-            <a:fillRect/>
-          </a:stretch>
-        </p:blipFill>
-        <p:spPr>
-          <a:xfrm>
-            <a:off x="1412683" y="2089282"/>
-            <a:ext cx="4348925" cy="2500631"/>
-          </a:xfrm>
-          <a:prstGeom prst="rect">
-            <a:avLst/>
-          </a:prstGeom>
-        </p:spPr>
-      </p:pic>
       <p:cxnSp>
         <p:nvCxnSpPr>
           <p:cNvPr id="35" name="Straight Connector 27">
@@ -24732,8 +25141,8 @@
         </p:nvSpPr>
         <p:spPr>
           <a:xfrm>
-            <a:off x="6553770" y="1041401"/>
-            <a:ext cx="4538526" cy="2345264"/>
+            <a:off x="6884636" y="1323692"/>
+            <a:ext cx="3697670" cy="2104415"/>
           </a:xfrm>
         </p:spPr>
         <p:txBody>
@@ -24743,7 +25152,7 @@
           <a:lstStyle/>
           <a:p>
             <a:r>
-              <a:rPr lang="en-US" sz="5400" b="1">
+              <a:rPr lang="en-US" sz="4000" b="1" dirty="0">
                 <a:solidFill>
                   <a:srgbClr val="262626"/>
                 </a:solidFill>
@@ -24753,6 +25162,42 @@
           </a:p>
         </p:txBody>
       </p:sp>
+      <p:pic>
+        <p:nvPicPr>
+          <p:cNvPr id="4" name="Billede 3">
+            <a:extLst>
+              <a:ext uri="{FF2B5EF4-FFF2-40B4-BE49-F238E27FC236}">
+                <a16:creationId xmlns:a16="http://schemas.microsoft.com/office/drawing/2014/main" id="{42F0E877-A5B9-4CE8-B028-8B8ACA3F9000}"/>
+              </a:ext>
+            </a:extLst>
+          </p:cNvPr>
+          <p:cNvPicPr>
+            <a:picLocks noChangeAspect="1"/>
+          </p:cNvPicPr>
+          <p:nvPr/>
+        </p:nvPicPr>
+        <p:blipFill>
+          <a:blip r:embed="rId7">
+            <a:extLst>
+              <a:ext uri="{28A0092B-C50C-407E-A947-70E740481C1C}">
+                <a14:useLocalDpi xmlns:a14="http://schemas.microsoft.com/office/drawing/2010/main" val="0"/>
+              </a:ext>
+            </a:extLst>
+          </a:blip>
+          <a:stretch>
+            <a:fillRect/>
+          </a:stretch>
+        </p:blipFill>
+        <p:spPr>
+          <a:xfrm>
+            <a:off x="1153756" y="1250696"/>
+            <a:ext cx="4792001" cy="4276344"/>
+          </a:xfrm>
+          <a:prstGeom prst="rect">
+            <a:avLst/>
+          </a:prstGeom>
+        </p:spPr>
+      </p:pic>
     </p:spTree>
     <p:extLst>
       <p:ext uri="{BB962C8B-B14F-4D97-AF65-F5344CB8AC3E}">

</xml_diff>